<commit_message>
change some in presentation
</commit_message>
<xml_diff>
--- a/presentation/presentation_v1.pptx
+++ b/presentation/presentation_v1.pptx
@@ -1,11 +1,12 @@
 
 <file path=ppt/presentation.xml><?xml version="1.0" encoding="utf-8"?>
-<p:presentation xmlns:a="http://schemas.openxmlformats.org/drawingml/2006/main" xmlns:p="http://schemas.openxmlformats.org/presentationml/2006/main" xmlns:r="http://schemas.openxmlformats.org/officeDocument/2006/relationships" xmlns:p14="http://schemas.microsoft.com/office/powerpoint/2010/main" xmlns:p15="http://schemas.microsoft.com/office/powerpoint/2012/main" xmlns:mc="http://schemas.openxmlformats.org/markup-compatibility/2006">
+<p:presentation xmlns:a="http://schemas.openxmlformats.org/drawingml/2006/main" xmlns:r="http://schemas.openxmlformats.org/officeDocument/2006/relationships" xmlns:p="http://schemas.openxmlformats.org/presentationml/2006/main">
   <p:sldMasterIdLst>
-    <p:sldMasterId id="2147483648" r:id="rId2"/>
+    <p:sldMasterId id="2147483648" r:id="rId1"/>
   </p:sldMasterIdLst>
   <p:sldIdLst>
-    <p:sldId id="256" r:id="rId3"/>
+    <p:sldId id="256" r:id="rId2"/>
+    <p:sldId id="263" r:id="rId3"/>
     <p:sldId id="257" r:id="rId4"/>
     <p:sldId id="258" r:id="rId5"/>
     <p:sldId id="259" r:id="rId6"/>
@@ -14,12 +15,107 @@
     <p:sldId id="262" r:id="rId9"/>
   </p:sldIdLst>
   <p:sldSz cx="10080625" cy="5670550"/>
-  <p:notesSz cx="7559675" cy="10691812"/>
+  <p:notesSz cx="7559675" cy="10691813"/>
+  <p:defaultTextStyle>
+    <a:defPPr>
+      <a:defRPr lang="en-US"/>
+    </a:defPPr>
+    <a:lvl1pPr marL="0" algn="l" defTabSz="914400" rtl="0" eaLnBrk="1" latinLnBrk="0" hangingPunct="1">
+      <a:defRPr sz="1800" kern="1200">
+        <a:solidFill>
+          <a:schemeClr val="tx1"/>
+        </a:solidFill>
+        <a:latin typeface="+mn-lt"/>
+        <a:ea typeface="+mn-ea"/>
+        <a:cs typeface="+mn-cs"/>
+      </a:defRPr>
+    </a:lvl1pPr>
+    <a:lvl2pPr marL="457200" algn="l" defTabSz="914400" rtl="0" eaLnBrk="1" latinLnBrk="0" hangingPunct="1">
+      <a:defRPr sz="1800" kern="1200">
+        <a:solidFill>
+          <a:schemeClr val="tx1"/>
+        </a:solidFill>
+        <a:latin typeface="+mn-lt"/>
+        <a:ea typeface="+mn-ea"/>
+        <a:cs typeface="+mn-cs"/>
+      </a:defRPr>
+    </a:lvl2pPr>
+    <a:lvl3pPr marL="914400" algn="l" defTabSz="914400" rtl="0" eaLnBrk="1" latinLnBrk="0" hangingPunct="1">
+      <a:defRPr sz="1800" kern="1200">
+        <a:solidFill>
+          <a:schemeClr val="tx1"/>
+        </a:solidFill>
+        <a:latin typeface="+mn-lt"/>
+        <a:ea typeface="+mn-ea"/>
+        <a:cs typeface="+mn-cs"/>
+      </a:defRPr>
+    </a:lvl3pPr>
+    <a:lvl4pPr marL="1371600" algn="l" defTabSz="914400" rtl="0" eaLnBrk="1" latinLnBrk="0" hangingPunct="1">
+      <a:defRPr sz="1800" kern="1200">
+        <a:solidFill>
+          <a:schemeClr val="tx1"/>
+        </a:solidFill>
+        <a:latin typeface="+mn-lt"/>
+        <a:ea typeface="+mn-ea"/>
+        <a:cs typeface="+mn-cs"/>
+      </a:defRPr>
+    </a:lvl4pPr>
+    <a:lvl5pPr marL="1828800" algn="l" defTabSz="914400" rtl="0" eaLnBrk="1" latinLnBrk="0" hangingPunct="1">
+      <a:defRPr sz="1800" kern="1200">
+        <a:solidFill>
+          <a:schemeClr val="tx1"/>
+        </a:solidFill>
+        <a:latin typeface="+mn-lt"/>
+        <a:ea typeface="+mn-ea"/>
+        <a:cs typeface="+mn-cs"/>
+      </a:defRPr>
+    </a:lvl5pPr>
+    <a:lvl6pPr marL="2286000" algn="l" defTabSz="914400" rtl="0" eaLnBrk="1" latinLnBrk="0" hangingPunct="1">
+      <a:defRPr sz="1800" kern="1200">
+        <a:solidFill>
+          <a:schemeClr val="tx1"/>
+        </a:solidFill>
+        <a:latin typeface="+mn-lt"/>
+        <a:ea typeface="+mn-ea"/>
+        <a:cs typeface="+mn-cs"/>
+      </a:defRPr>
+    </a:lvl6pPr>
+    <a:lvl7pPr marL="2743200" algn="l" defTabSz="914400" rtl="0" eaLnBrk="1" latinLnBrk="0" hangingPunct="1">
+      <a:defRPr sz="1800" kern="1200">
+        <a:solidFill>
+          <a:schemeClr val="tx1"/>
+        </a:solidFill>
+        <a:latin typeface="+mn-lt"/>
+        <a:ea typeface="+mn-ea"/>
+        <a:cs typeface="+mn-cs"/>
+      </a:defRPr>
+    </a:lvl7pPr>
+    <a:lvl8pPr marL="3200400" algn="l" defTabSz="914400" rtl="0" eaLnBrk="1" latinLnBrk="0" hangingPunct="1">
+      <a:defRPr sz="1800" kern="1200">
+        <a:solidFill>
+          <a:schemeClr val="tx1"/>
+        </a:solidFill>
+        <a:latin typeface="+mn-lt"/>
+        <a:ea typeface="+mn-ea"/>
+        <a:cs typeface="+mn-cs"/>
+      </a:defRPr>
+    </a:lvl8pPr>
+    <a:lvl9pPr marL="3657600" algn="l" defTabSz="914400" rtl="0" eaLnBrk="1" latinLnBrk="0" hangingPunct="1">
+      <a:defRPr sz="1800" kern="1200">
+        <a:solidFill>
+          <a:schemeClr val="tx1"/>
+        </a:solidFill>
+        <a:latin typeface="+mn-lt"/>
+        <a:ea typeface="+mn-ea"/>
+        <a:cs typeface="+mn-cs"/>
+      </a:defRPr>
+    </a:lvl9pPr>
+  </p:defaultTextStyle>
 </p:presentation>
 </file>
 
 <file path=ppt/slideLayouts/slideLayout1.xml><?xml version="1.0" encoding="utf-8"?>
-<p:sldLayout xmlns:a="http://schemas.openxmlformats.org/drawingml/2006/main" xmlns:p="http://schemas.openxmlformats.org/presentationml/2006/main" xmlns:r="http://schemas.openxmlformats.org/officeDocument/2006/relationships" xmlns:p14="http://schemas.microsoft.com/office/powerpoint/2010/main" xmlns:p15="http://schemas.microsoft.com/office/powerpoint/2012/main" xmlns:mc="http://schemas.openxmlformats.org/markup-compatibility/2006" type="blank" preserve="1">
+<p:sldLayout xmlns:a="http://schemas.openxmlformats.org/drawingml/2006/main" xmlns:r="http://schemas.openxmlformats.org/officeDocument/2006/relationships" xmlns:p="http://schemas.openxmlformats.org/presentationml/2006/main" type="blank" preserve="1">
   <p:cSld name="Blank Slide">
     <p:spTree>
       <p:nvGrpSpPr>
@@ -37,11 +133,14 @@
       </p:grpSpPr>
     </p:spTree>
   </p:cSld>
+  <p:clrMapOvr>
+    <a:masterClrMapping/>
+  </p:clrMapOvr>
 </p:sldLayout>
 </file>
 
 <file path=ppt/slideLayouts/slideLayout10.xml><?xml version="1.0" encoding="utf-8"?>
-<p:sldLayout xmlns:a="http://schemas.openxmlformats.org/drawingml/2006/main" xmlns:p="http://schemas.openxmlformats.org/presentationml/2006/main" xmlns:r="http://schemas.openxmlformats.org/officeDocument/2006/relationships" xmlns:p14="http://schemas.microsoft.com/office/powerpoint/2010/main" xmlns:p15="http://schemas.microsoft.com/office/powerpoint/2012/main" xmlns:mc="http://schemas.openxmlformats.org/markup-compatibility/2006" type="objOverTx" preserve="1">
+<p:sldLayout xmlns:a="http://schemas.openxmlformats.org/drawingml/2006/main" xmlns:r="http://schemas.openxmlformats.org/officeDocument/2006/relationships" xmlns:p="http://schemas.openxmlformats.org/presentationml/2006/main" type="objOverTx" preserve="1">
   <p:cSld name="Title, Content over Content">
     <p:spTree>
       <p:nvGrpSpPr>
@@ -77,13 +176,14 @@
           </a:prstGeom>
         </p:spPr>
         <p:txBody>
-          <a:bodyPr lIns="0" rIns="0" tIns="0" bIns="0" anchor="ctr">
+          <a:bodyPr lIns="0" tIns="0" rIns="0" bIns="0" anchor="ctr">
             <a:noAutofit/>
           </a:bodyPr>
-          <a:p>
-            <a:endParaRPr b="0" lang="de-DE" sz="2000" spc="-1" strike="noStrike">
-              <a:solidFill>
-                <a:srgbClr val="ffffff"/>
+          <a:lstStyle/>
+          <a:p>
+            <a:endParaRPr lang="de-DE" sz="2000" b="0" strike="noStrike" spc="-1">
+              <a:solidFill>
+                <a:srgbClr val="FFFFFF"/>
               </a:solidFill>
               <a:latin typeface="Open Sans"/>
             </a:endParaRPr>
@@ -110,13 +210,14 @@
           </a:prstGeom>
         </p:spPr>
         <p:txBody>
-          <a:bodyPr lIns="0" rIns="0" tIns="0" bIns="0">
+          <a:bodyPr lIns="0" tIns="0" rIns="0" bIns="0">
             <a:normAutofit/>
           </a:bodyPr>
-          <a:p>
-            <a:endParaRPr b="0" lang="de-DE" sz="1800" spc="-1" strike="noStrike">
-              <a:solidFill>
-                <a:srgbClr val="d9d9d9"/>
+          <a:lstStyle/>
+          <a:p>
+            <a:endParaRPr lang="de-DE" sz="1800" b="0" strike="noStrike" spc="-1">
+              <a:solidFill>
+                <a:srgbClr val="D9D9D9"/>
               </a:solidFill>
               <a:latin typeface="Open Sans"/>
             </a:endParaRPr>
@@ -143,13 +244,14 @@
           </a:prstGeom>
         </p:spPr>
         <p:txBody>
-          <a:bodyPr lIns="0" rIns="0" tIns="0" bIns="0">
+          <a:bodyPr lIns="0" tIns="0" rIns="0" bIns="0">
             <a:normAutofit/>
           </a:bodyPr>
-          <a:p>
-            <a:endParaRPr b="0" lang="de-DE" sz="1800" spc="-1" strike="noStrike">
-              <a:solidFill>
-                <a:srgbClr val="d9d9d9"/>
+          <a:lstStyle/>
+          <a:p>
+            <a:endParaRPr lang="de-DE" sz="1800" b="0" strike="noStrike" spc="-1">
+              <a:solidFill>
+                <a:srgbClr val="D9D9D9"/>
               </a:solidFill>
               <a:latin typeface="Open Sans"/>
             </a:endParaRPr>
@@ -158,11 +260,14 @@
       </p:sp>
     </p:spTree>
   </p:cSld>
+  <p:clrMapOvr>
+    <a:masterClrMapping/>
+  </p:clrMapOvr>
 </p:sldLayout>
 </file>
 
 <file path=ppt/slideLayouts/slideLayout11.xml><?xml version="1.0" encoding="utf-8"?>
-<p:sldLayout xmlns:a="http://schemas.openxmlformats.org/drawingml/2006/main" xmlns:p="http://schemas.openxmlformats.org/presentationml/2006/main" xmlns:r="http://schemas.openxmlformats.org/officeDocument/2006/relationships" xmlns:p14="http://schemas.microsoft.com/office/powerpoint/2010/main" xmlns:p15="http://schemas.microsoft.com/office/powerpoint/2012/main" xmlns:mc="http://schemas.openxmlformats.org/markup-compatibility/2006" type="fourObj" preserve="1">
+<p:sldLayout xmlns:a="http://schemas.openxmlformats.org/drawingml/2006/main" xmlns:r="http://schemas.openxmlformats.org/officeDocument/2006/relationships" xmlns:p="http://schemas.openxmlformats.org/presentationml/2006/main" type="fourObj" preserve="1">
   <p:cSld name="Title, 4 Content">
     <p:spTree>
       <p:nvGrpSpPr>
@@ -198,13 +303,14 @@
           </a:prstGeom>
         </p:spPr>
         <p:txBody>
-          <a:bodyPr lIns="0" rIns="0" tIns="0" bIns="0" anchor="ctr">
+          <a:bodyPr lIns="0" tIns="0" rIns="0" bIns="0" anchor="ctr">
             <a:noAutofit/>
           </a:bodyPr>
-          <a:p>
-            <a:endParaRPr b="0" lang="de-DE" sz="2000" spc="-1" strike="noStrike">
-              <a:solidFill>
-                <a:srgbClr val="ffffff"/>
+          <a:lstStyle/>
+          <a:p>
+            <a:endParaRPr lang="de-DE" sz="2000" b="0" strike="noStrike" spc="-1">
+              <a:solidFill>
+                <a:srgbClr val="FFFFFF"/>
               </a:solidFill>
               <a:latin typeface="Open Sans"/>
             </a:endParaRPr>
@@ -231,13 +337,14 @@
           </a:prstGeom>
         </p:spPr>
         <p:txBody>
-          <a:bodyPr lIns="0" rIns="0" tIns="0" bIns="0">
+          <a:bodyPr lIns="0" tIns="0" rIns="0" bIns="0">
             <a:normAutofit/>
           </a:bodyPr>
-          <a:p>
-            <a:endParaRPr b="0" lang="de-DE" sz="1800" spc="-1" strike="noStrike">
-              <a:solidFill>
-                <a:srgbClr val="d9d9d9"/>
+          <a:lstStyle/>
+          <a:p>
+            <a:endParaRPr lang="de-DE" sz="1800" b="0" strike="noStrike" spc="-1">
+              <a:solidFill>
+                <a:srgbClr val="D9D9D9"/>
               </a:solidFill>
               <a:latin typeface="Open Sans"/>
             </a:endParaRPr>
@@ -264,13 +371,14 @@
           </a:prstGeom>
         </p:spPr>
         <p:txBody>
-          <a:bodyPr lIns="0" rIns="0" tIns="0" bIns="0">
+          <a:bodyPr lIns="0" tIns="0" rIns="0" bIns="0">
             <a:normAutofit/>
           </a:bodyPr>
-          <a:p>
-            <a:endParaRPr b="0" lang="de-DE" sz="1800" spc="-1" strike="noStrike">
-              <a:solidFill>
-                <a:srgbClr val="d9d9d9"/>
+          <a:lstStyle/>
+          <a:p>
+            <a:endParaRPr lang="de-DE" sz="1800" b="0" strike="noStrike" spc="-1">
+              <a:solidFill>
+                <a:srgbClr val="D9D9D9"/>
               </a:solidFill>
               <a:latin typeface="Open Sans"/>
             </a:endParaRPr>
@@ -297,13 +405,14 @@
           </a:prstGeom>
         </p:spPr>
         <p:txBody>
-          <a:bodyPr lIns="0" rIns="0" tIns="0" bIns="0">
+          <a:bodyPr lIns="0" tIns="0" rIns="0" bIns="0">
             <a:normAutofit/>
           </a:bodyPr>
-          <a:p>
-            <a:endParaRPr b="0" lang="de-DE" sz="1800" spc="-1" strike="noStrike">
-              <a:solidFill>
-                <a:srgbClr val="d9d9d9"/>
+          <a:lstStyle/>
+          <a:p>
+            <a:endParaRPr lang="de-DE" sz="1800" b="0" strike="noStrike" spc="-1">
+              <a:solidFill>
+                <a:srgbClr val="D9D9D9"/>
               </a:solidFill>
               <a:latin typeface="Open Sans"/>
             </a:endParaRPr>
@@ -330,13 +439,14 @@
           </a:prstGeom>
         </p:spPr>
         <p:txBody>
-          <a:bodyPr lIns="0" rIns="0" tIns="0" bIns="0">
+          <a:bodyPr lIns="0" tIns="0" rIns="0" bIns="0">
             <a:normAutofit/>
           </a:bodyPr>
-          <a:p>
-            <a:endParaRPr b="0" lang="de-DE" sz="1800" spc="-1" strike="noStrike">
-              <a:solidFill>
-                <a:srgbClr val="d9d9d9"/>
+          <a:lstStyle/>
+          <a:p>
+            <a:endParaRPr lang="de-DE" sz="1800" b="0" strike="noStrike" spc="-1">
+              <a:solidFill>
+                <a:srgbClr val="D9D9D9"/>
               </a:solidFill>
               <a:latin typeface="Open Sans"/>
             </a:endParaRPr>
@@ -345,11 +455,14 @@
       </p:sp>
     </p:spTree>
   </p:cSld>
+  <p:clrMapOvr>
+    <a:masterClrMapping/>
+  </p:clrMapOvr>
 </p:sldLayout>
 </file>
 
 <file path=ppt/slideLayouts/slideLayout12.xml><?xml version="1.0" encoding="utf-8"?>
-<p:sldLayout xmlns:a="http://schemas.openxmlformats.org/drawingml/2006/main" xmlns:p="http://schemas.openxmlformats.org/presentationml/2006/main" xmlns:r="http://schemas.openxmlformats.org/officeDocument/2006/relationships" xmlns:p14="http://schemas.microsoft.com/office/powerpoint/2010/main" xmlns:p15="http://schemas.microsoft.com/office/powerpoint/2012/main" xmlns:mc="http://schemas.openxmlformats.org/markup-compatibility/2006" type="blank" preserve="1">
+<p:sldLayout xmlns:a="http://schemas.openxmlformats.org/drawingml/2006/main" xmlns:r="http://schemas.openxmlformats.org/officeDocument/2006/relationships" xmlns:p="http://schemas.openxmlformats.org/presentationml/2006/main" type="blank" preserve="1">
   <p:cSld name="Title, 6 Content">
     <p:spTree>
       <p:nvGrpSpPr>
@@ -385,13 +498,14 @@
           </a:prstGeom>
         </p:spPr>
         <p:txBody>
-          <a:bodyPr lIns="0" rIns="0" tIns="0" bIns="0" anchor="ctr">
+          <a:bodyPr lIns="0" tIns="0" rIns="0" bIns="0" anchor="ctr">
             <a:noAutofit/>
           </a:bodyPr>
-          <a:p>
-            <a:endParaRPr b="0" lang="de-DE" sz="2000" spc="-1" strike="noStrike">
-              <a:solidFill>
-                <a:srgbClr val="ffffff"/>
+          <a:lstStyle/>
+          <a:p>
+            <a:endParaRPr lang="de-DE" sz="2000" b="0" strike="noStrike" spc="-1">
+              <a:solidFill>
+                <a:srgbClr val="FFFFFF"/>
               </a:solidFill>
               <a:latin typeface="Open Sans"/>
             </a:endParaRPr>
@@ -418,13 +532,14 @@
           </a:prstGeom>
         </p:spPr>
         <p:txBody>
-          <a:bodyPr lIns="0" rIns="0" tIns="0" bIns="0">
+          <a:bodyPr lIns="0" tIns="0" rIns="0" bIns="0">
             <a:normAutofit/>
           </a:bodyPr>
-          <a:p>
-            <a:endParaRPr b="0" lang="de-DE" sz="1800" spc="-1" strike="noStrike">
-              <a:solidFill>
-                <a:srgbClr val="d9d9d9"/>
+          <a:lstStyle/>
+          <a:p>
+            <a:endParaRPr lang="de-DE" sz="1800" b="0" strike="noStrike" spc="-1">
+              <a:solidFill>
+                <a:srgbClr val="D9D9D9"/>
               </a:solidFill>
               <a:latin typeface="Open Sans"/>
             </a:endParaRPr>
@@ -451,13 +566,14 @@
           </a:prstGeom>
         </p:spPr>
         <p:txBody>
-          <a:bodyPr lIns="0" rIns="0" tIns="0" bIns="0">
+          <a:bodyPr lIns="0" tIns="0" rIns="0" bIns="0">
             <a:normAutofit/>
           </a:bodyPr>
-          <a:p>
-            <a:endParaRPr b="0" lang="de-DE" sz="1800" spc="-1" strike="noStrike">
-              <a:solidFill>
-                <a:srgbClr val="d9d9d9"/>
+          <a:lstStyle/>
+          <a:p>
+            <a:endParaRPr lang="de-DE" sz="1800" b="0" strike="noStrike" spc="-1">
+              <a:solidFill>
+                <a:srgbClr val="D9D9D9"/>
               </a:solidFill>
               <a:latin typeface="Open Sans"/>
             </a:endParaRPr>
@@ -484,13 +600,14 @@
           </a:prstGeom>
         </p:spPr>
         <p:txBody>
-          <a:bodyPr lIns="0" rIns="0" tIns="0" bIns="0">
+          <a:bodyPr lIns="0" tIns="0" rIns="0" bIns="0">
             <a:normAutofit/>
           </a:bodyPr>
-          <a:p>
-            <a:endParaRPr b="0" lang="de-DE" sz="1800" spc="-1" strike="noStrike">
-              <a:solidFill>
-                <a:srgbClr val="d9d9d9"/>
+          <a:lstStyle/>
+          <a:p>
+            <a:endParaRPr lang="de-DE" sz="1800" b="0" strike="noStrike" spc="-1">
+              <a:solidFill>
+                <a:srgbClr val="D9D9D9"/>
               </a:solidFill>
               <a:latin typeface="Open Sans"/>
             </a:endParaRPr>
@@ -517,13 +634,14 @@
           </a:prstGeom>
         </p:spPr>
         <p:txBody>
-          <a:bodyPr lIns="0" rIns="0" tIns="0" bIns="0">
+          <a:bodyPr lIns="0" tIns="0" rIns="0" bIns="0">
             <a:normAutofit/>
           </a:bodyPr>
-          <a:p>
-            <a:endParaRPr b="0" lang="de-DE" sz="1800" spc="-1" strike="noStrike">
-              <a:solidFill>
-                <a:srgbClr val="d9d9d9"/>
+          <a:lstStyle/>
+          <a:p>
+            <a:endParaRPr lang="de-DE" sz="1800" b="0" strike="noStrike" spc="-1">
+              <a:solidFill>
+                <a:srgbClr val="D9D9D9"/>
               </a:solidFill>
               <a:latin typeface="Open Sans"/>
             </a:endParaRPr>
@@ -550,13 +668,14 @@
           </a:prstGeom>
         </p:spPr>
         <p:txBody>
-          <a:bodyPr lIns="0" rIns="0" tIns="0" bIns="0">
+          <a:bodyPr lIns="0" tIns="0" rIns="0" bIns="0">
             <a:normAutofit/>
           </a:bodyPr>
-          <a:p>
-            <a:endParaRPr b="0" lang="de-DE" sz="1800" spc="-1" strike="noStrike">
-              <a:solidFill>
-                <a:srgbClr val="d9d9d9"/>
+          <a:lstStyle/>
+          <a:p>
+            <a:endParaRPr lang="de-DE" sz="1800" b="0" strike="noStrike" spc="-1">
+              <a:solidFill>
+                <a:srgbClr val="D9D9D9"/>
               </a:solidFill>
               <a:latin typeface="Open Sans"/>
             </a:endParaRPr>
@@ -583,13 +702,14 @@
           </a:prstGeom>
         </p:spPr>
         <p:txBody>
-          <a:bodyPr lIns="0" rIns="0" tIns="0" bIns="0">
+          <a:bodyPr lIns="0" tIns="0" rIns="0" bIns="0">
             <a:normAutofit/>
           </a:bodyPr>
-          <a:p>
-            <a:endParaRPr b="0" lang="de-DE" sz="1800" spc="-1" strike="noStrike">
-              <a:solidFill>
-                <a:srgbClr val="d9d9d9"/>
+          <a:lstStyle/>
+          <a:p>
+            <a:endParaRPr lang="de-DE" sz="1800" b="0" strike="noStrike" spc="-1">
+              <a:solidFill>
+                <a:srgbClr val="D9D9D9"/>
               </a:solidFill>
               <a:latin typeface="Open Sans"/>
             </a:endParaRPr>
@@ -598,11 +718,14 @@
       </p:sp>
     </p:spTree>
   </p:cSld>
+  <p:clrMapOvr>
+    <a:masterClrMapping/>
+  </p:clrMapOvr>
 </p:sldLayout>
 </file>
 
 <file path=ppt/slideLayouts/slideLayout2.xml><?xml version="1.0" encoding="utf-8"?>
-<p:sldLayout xmlns:a="http://schemas.openxmlformats.org/drawingml/2006/main" xmlns:p="http://schemas.openxmlformats.org/presentationml/2006/main" xmlns:r="http://schemas.openxmlformats.org/officeDocument/2006/relationships" xmlns:p14="http://schemas.microsoft.com/office/powerpoint/2010/main" xmlns:p15="http://schemas.microsoft.com/office/powerpoint/2012/main" xmlns:mc="http://schemas.openxmlformats.org/markup-compatibility/2006" type="tx" preserve="1">
+<p:sldLayout xmlns:a="http://schemas.openxmlformats.org/drawingml/2006/main" xmlns:r="http://schemas.openxmlformats.org/officeDocument/2006/relationships" xmlns:p="http://schemas.openxmlformats.org/presentationml/2006/main" type="tx" preserve="1">
   <p:cSld name="Title Slide">
     <p:spTree>
       <p:nvGrpSpPr>
@@ -638,13 +761,14 @@
           </a:prstGeom>
         </p:spPr>
         <p:txBody>
-          <a:bodyPr lIns="0" rIns="0" tIns="0" bIns="0" anchor="ctr">
+          <a:bodyPr lIns="0" tIns="0" rIns="0" bIns="0" anchor="ctr">
             <a:noAutofit/>
           </a:bodyPr>
-          <a:p>
-            <a:endParaRPr b="0" lang="de-DE" sz="2000" spc="-1" strike="noStrike">
-              <a:solidFill>
-                <a:srgbClr val="ffffff"/>
+          <a:lstStyle/>
+          <a:p>
+            <a:endParaRPr lang="de-DE" sz="2000" b="0" strike="noStrike" spc="-1">
+              <a:solidFill>
+                <a:srgbClr val="FFFFFF"/>
               </a:solidFill>
               <a:latin typeface="Open Sans"/>
             </a:endParaRPr>
@@ -671,12 +795,13 @@
           </a:prstGeom>
         </p:spPr>
         <p:txBody>
-          <a:bodyPr lIns="0" rIns="0" tIns="0" bIns="0" anchor="ctr">
+          <a:bodyPr lIns="0" tIns="0" rIns="0" bIns="0" anchor="ctr">
             <a:noAutofit/>
           </a:bodyPr>
+          <a:lstStyle/>
           <a:p>
             <a:pPr algn="ctr"/>
-            <a:endParaRPr b="0" lang="de-CH" sz="3200" spc="-1" strike="noStrike">
+            <a:endParaRPr lang="de-CH" sz="3200" b="0" strike="noStrike" spc="-1">
               <a:latin typeface="Arial"/>
             </a:endParaRPr>
           </a:p>
@@ -684,11 +809,14 @@
       </p:sp>
     </p:spTree>
   </p:cSld>
+  <p:clrMapOvr>
+    <a:masterClrMapping/>
+  </p:clrMapOvr>
 </p:sldLayout>
 </file>
 
 <file path=ppt/slideLayouts/slideLayout3.xml><?xml version="1.0" encoding="utf-8"?>
-<p:sldLayout xmlns:a="http://schemas.openxmlformats.org/drawingml/2006/main" xmlns:p="http://schemas.openxmlformats.org/presentationml/2006/main" xmlns:r="http://schemas.openxmlformats.org/officeDocument/2006/relationships" xmlns:p14="http://schemas.microsoft.com/office/powerpoint/2010/main" xmlns:p15="http://schemas.microsoft.com/office/powerpoint/2012/main" xmlns:mc="http://schemas.openxmlformats.org/markup-compatibility/2006" type="obj" preserve="1">
+<p:sldLayout xmlns:a="http://schemas.openxmlformats.org/drawingml/2006/main" xmlns:r="http://schemas.openxmlformats.org/officeDocument/2006/relationships" xmlns:p="http://schemas.openxmlformats.org/presentationml/2006/main" type="obj" preserve="1">
   <p:cSld name="Title, Content">
     <p:spTree>
       <p:nvGrpSpPr>
@@ -724,13 +852,14 @@
           </a:prstGeom>
         </p:spPr>
         <p:txBody>
-          <a:bodyPr lIns="0" rIns="0" tIns="0" bIns="0" anchor="ctr">
+          <a:bodyPr lIns="0" tIns="0" rIns="0" bIns="0" anchor="ctr">
             <a:noAutofit/>
           </a:bodyPr>
-          <a:p>
-            <a:endParaRPr b="0" lang="de-DE" sz="2000" spc="-1" strike="noStrike">
-              <a:solidFill>
-                <a:srgbClr val="ffffff"/>
+          <a:lstStyle/>
+          <a:p>
+            <a:endParaRPr lang="de-DE" sz="2000" b="0" strike="noStrike" spc="-1">
+              <a:solidFill>
+                <a:srgbClr val="FFFFFF"/>
               </a:solidFill>
               <a:latin typeface="Open Sans"/>
             </a:endParaRPr>
@@ -757,13 +886,14 @@
           </a:prstGeom>
         </p:spPr>
         <p:txBody>
-          <a:bodyPr lIns="0" rIns="0" tIns="0" bIns="0">
+          <a:bodyPr lIns="0" tIns="0" rIns="0" bIns="0">
             <a:normAutofit/>
           </a:bodyPr>
-          <a:p>
-            <a:endParaRPr b="0" lang="de-DE" sz="1800" spc="-1" strike="noStrike">
-              <a:solidFill>
-                <a:srgbClr val="d9d9d9"/>
+          <a:lstStyle/>
+          <a:p>
+            <a:endParaRPr lang="de-DE" sz="1800" b="0" strike="noStrike" spc="-1">
+              <a:solidFill>
+                <a:srgbClr val="D9D9D9"/>
               </a:solidFill>
               <a:latin typeface="Open Sans"/>
             </a:endParaRPr>
@@ -772,11 +902,14 @@
       </p:sp>
     </p:spTree>
   </p:cSld>
+  <p:clrMapOvr>
+    <a:masterClrMapping/>
+  </p:clrMapOvr>
 </p:sldLayout>
 </file>
 
 <file path=ppt/slideLayouts/slideLayout4.xml><?xml version="1.0" encoding="utf-8"?>
-<p:sldLayout xmlns:a="http://schemas.openxmlformats.org/drawingml/2006/main" xmlns:p="http://schemas.openxmlformats.org/presentationml/2006/main" xmlns:r="http://schemas.openxmlformats.org/officeDocument/2006/relationships" xmlns:p14="http://schemas.microsoft.com/office/powerpoint/2010/main" xmlns:p15="http://schemas.microsoft.com/office/powerpoint/2012/main" xmlns:mc="http://schemas.openxmlformats.org/markup-compatibility/2006" type="twoObj" preserve="1">
+<p:sldLayout xmlns:a="http://schemas.openxmlformats.org/drawingml/2006/main" xmlns:r="http://schemas.openxmlformats.org/officeDocument/2006/relationships" xmlns:p="http://schemas.openxmlformats.org/presentationml/2006/main" type="twoObj" preserve="1">
   <p:cSld name="Title, 2 Content">
     <p:spTree>
       <p:nvGrpSpPr>
@@ -812,13 +945,14 @@
           </a:prstGeom>
         </p:spPr>
         <p:txBody>
-          <a:bodyPr lIns="0" rIns="0" tIns="0" bIns="0" anchor="ctr">
+          <a:bodyPr lIns="0" tIns="0" rIns="0" bIns="0" anchor="ctr">
             <a:noAutofit/>
           </a:bodyPr>
-          <a:p>
-            <a:endParaRPr b="0" lang="de-DE" sz="2000" spc="-1" strike="noStrike">
-              <a:solidFill>
-                <a:srgbClr val="ffffff"/>
+          <a:lstStyle/>
+          <a:p>
+            <a:endParaRPr lang="de-DE" sz="2000" b="0" strike="noStrike" spc="-1">
+              <a:solidFill>
+                <a:srgbClr val="FFFFFF"/>
               </a:solidFill>
               <a:latin typeface="Open Sans"/>
             </a:endParaRPr>
@@ -845,13 +979,14 @@
           </a:prstGeom>
         </p:spPr>
         <p:txBody>
-          <a:bodyPr lIns="0" rIns="0" tIns="0" bIns="0">
+          <a:bodyPr lIns="0" tIns="0" rIns="0" bIns="0">
             <a:normAutofit/>
           </a:bodyPr>
-          <a:p>
-            <a:endParaRPr b="0" lang="de-DE" sz="1800" spc="-1" strike="noStrike">
-              <a:solidFill>
-                <a:srgbClr val="d9d9d9"/>
+          <a:lstStyle/>
+          <a:p>
+            <a:endParaRPr lang="de-DE" sz="1800" b="0" strike="noStrike" spc="-1">
+              <a:solidFill>
+                <a:srgbClr val="D9D9D9"/>
               </a:solidFill>
               <a:latin typeface="Open Sans"/>
             </a:endParaRPr>
@@ -878,13 +1013,14 @@
           </a:prstGeom>
         </p:spPr>
         <p:txBody>
-          <a:bodyPr lIns="0" rIns="0" tIns="0" bIns="0">
+          <a:bodyPr lIns="0" tIns="0" rIns="0" bIns="0">
             <a:normAutofit/>
           </a:bodyPr>
-          <a:p>
-            <a:endParaRPr b="0" lang="de-DE" sz="1800" spc="-1" strike="noStrike">
-              <a:solidFill>
-                <a:srgbClr val="d9d9d9"/>
+          <a:lstStyle/>
+          <a:p>
+            <a:endParaRPr lang="de-DE" sz="1800" b="0" strike="noStrike" spc="-1">
+              <a:solidFill>
+                <a:srgbClr val="D9D9D9"/>
               </a:solidFill>
               <a:latin typeface="Open Sans"/>
             </a:endParaRPr>
@@ -893,11 +1029,14 @@
       </p:sp>
     </p:spTree>
   </p:cSld>
+  <p:clrMapOvr>
+    <a:masterClrMapping/>
+  </p:clrMapOvr>
 </p:sldLayout>
 </file>
 
 <file path=ppt/slideLayouts/slideLayout5.xml><?xml version="1.0" encoding="utf-8"?>
-<p:sldLayout xmlns:a="http://schemas.openxmlformats.org/drawingml/2006/main" xmlns:p="http://schemas.openxmlformats.org/presentationml/2006/main" xmlns:r="http://schemas.openxmlformats.org/officeDocument/2006/relationships" xmlns:p14="http://schemas.microsoft.com/office/powerpoint/2010/main" xmlns:p15="http://schemas.microsoft.com/office/powerpoint/2012/main" xmlns:mc="http://schemas.openxmlformats.org/markup-compatibility/2006" type="titleOnly" preserve="1">
+<p:sldLayout xmlns:a="http://schemas.openxmlformats.org/drawingml/2006/main" xmlns:r="http://schemas.openxmlformats.org/officeDocument/2006/relationships" xmlns:p="http://schemas.openxmlformats.org/presentationml/2006/main" type="titleOnly" preserve="1">
   <p:cSld name="Title Only">
     <p:spTree>
       <p:nvGrpSpPr>
@@ -933,13 +1072,14 @@
           </a:prstGeom>
         </p:spPr>
         <p:txBody>
-          <a:bodyPr lIns="0" rIns="0" tIns="0" bIns="0" anchor="ctr">
+          <a:bodyPr lIns="0" tIns="0" rIns="0" bIns="0" anchor="ctr">
             <a:noAutofit/>
           </a:bodyPr>
-          <a:p>
-            <a:endParaRPr b="0" lang="de-DE" sz="2000" spc="-1" strike="noStrike">
-              <a:solidFill>
-                <a:srgbClr val="ffffff"/>
+          <a:lstStyle/>
+          <a:p>
+            <a:endParaRPr lang="de-DE" sz="2000" b="0" strike="noStrike" spc="-1">
+              <a:solidFill>
+                <a:srgbClr val="FFFFFF"/>
               </a:solidFill>
               <a:latin typeface="Open Sans"/>
             </a:endParaRPr>
@@ -948,11 +1088,14 @@
       </p:sp>
     </p:spTree>
   </p:cSld>
+  <p:clrMapOvr>
+    <a:masterClrMapping/>
+  </p:clrMapOvr>
 </p:sldLayout>
 </file>
 
 <file path=ppt/slideLayouts/slideLayout6.xml><?xml version="1.0" encoding="utf-8"?>
-<p:sldLayout xmlns:a="http://schemas.openxmlformats.org/drawingml/2006/main" xmlns:p="http://schemas.openxmlformats.org/presentationml/2006/main" xmlns:r="http://schemas.openxmlformats.org/officeDocument/2006/relationships" xmlns:p14="http://schemas.microsoft.com/office/powerpoint/2010/main" xmlns:p15="http://schemas.microsoft.com/office/powerpoint/2012/main" xmlns:mc="http://schemas.openxmlformats.org/markup-compatibility/2006" type="objOnly" preserve="1">
+<p:sldLayout xmlns:a="http://schemas.openxmlformats.org/drawingml/2006/main" xmlns:r="http://schemas.openxmlformats.org/officeDocument/2006/relationships" xmlns:p="http://schemas.openxmlformats.org/presentationml/2006/main" type="objOnly" preserve="1">
   <p:cSld name="Centered Text">
     <p:spTree>
       <p:nvGrpSpPr>
@@ -988,12 +1131,13 @@
           </a:prstGeom>
         </p:spPr>
         <p:txBody>
-          <a:bodyPr lIns="0" rIns="0" tIns="0" bIns="0" anchor="ctr">
+          <a:bodyPr lIns="0" tIns="0" rIns="0" bIns="0" anchor="ctr">
             <a:noAutofit/>
           </a:bodyPr>
+          <a:lstStyle/>
           <a:p>
             <a:pPr algn="ctr"/>
-            <a:endParaRPr b="0" lang="de-CH" sz="3200" spc="-1" strike="noStrike">
+            <a:endParaRPr lang="de-CH" sz="3200" b="0" strike="noStrike" spc="-1">
               <a:latin typeface="Arial"/>
             </a:endParaRPr>
           </a:p>
@@ -1001,11 +1145,14 @@
       </p:sp>
     </p:spTree>
   </p:cSld>
+  <p:clrMapOvr>
+    <a:masterClrMapping/>
+  </p:clrMapOvr>
 </p:sldLayout>
 </file>
 
 <file path=ppt/slideLayouts/slideLayout7.xml><?xml version="1.0" encoding="utf-8"?>
-<p:sldLayout xmlns:a="http://schemas.openxmlformats.org/drawingml/2006/main" xmlns:p="http://schemas.openxmlformats.org/presentationml/2006/main" xmlns:r="http://schemas.openxmlformats.org/officeDocument/2006/relationships" xmlns:p14="http://schemas.microsoft.com/office/powerpoint/2010/main" xmlns:p15="http://schemas.microsoft.com/office/powerpoint/2012/main" xmlns:mc="http://schemas.openxmlformats.org/markup-compatibility/2006" type="twoObjAndObj" preserve="1">
+<p:sldLayout xmlns:a="http://schemas.openxmlformats.org/drawingml/2006/main" xmlns:r="http://schemas.openxmlformats.org/officeDocument/2006/relationships" xmlns:p="http://schemas.openxmlformats.org/presentationml/2006/main" type="twoObjAndObj" preserve="1">
   <p:cSld name="Title, 2 Content and Content">
     <p:spTree>
       <p:nvGrpSpPr>
@@ -1041,13 +1188,14 @@
           </a:prstGeom>
         </p:spPr>
         <p:txBody>
-          <a:bodyPr lIns="0" rIns="0" tIns="0" bIns="0" anchor="ctr">
+          <a:bodyPr lIns="0" tIns="0" rIns="0" bIns="0" anchor="ctr">
             <a:noAutofit/>
           </a:bodyPr>
-          <a:p>
-            <a:endParaRPr b="0" lang="de-DE" sz="2000" spc="-1" strike="noStrike">
-              <a:solidFill>
-                <a:srgbClr val="ffffff"/>
+          <a:lstStyle/>
+          <a:p>
+            <a:endParaRPr lang="de-DE" sz="2000" b="0" strike="noStrike" spc="-1">
+              <a:solidFill>
+                <a:srgbClr val="FFFFFF"/>
               </a:solidFill>
               <a:latin typeface="Open Sans"/>
             </a:endParaRPr>
@@ -1074,13 +1222,14 @@
           </a:prstGeom>
         </p:spPr>
         <p:txBody>
-          <a:bodyPr lIns="0" rIns="0" tIns="0" bIns="0">
+          <a:bodyPr lIns="0" tIns="0" rIns="0" bIns="0">
             <a:normAutofit/>
           </a:bodyPr>
-          <a:p>
-            <a:endParaRPr b="0" lang="de-DE" sz="1800" spc="-1" strike="noStrike">
-              <a:solidFill>
-                <a:srgbClr val="d9d9d9"/>
+          <a:lstStyle/>
+          <a:p>
+            <a:endParaRPr lang="de-DE" sz="1800" b="0" strike="noStrike" spc="-1">
+              <a:solidFill>
+                <a:srgbClr val="D9D9D9"/>
               </a:solidFill>
               <a:latin typeface="Open Sans"/>
             </a:endParaRPr>
@@ -1107,13 +1256,14 @@
           </a:prstGeom>
         </p:spPr>
         <p:txBody>
-          <a:bodyPr lIns="0" rIns="0" tIns="0" bIns="0">
+          <a:bodyPr lIns="0" tIns="0" rIns="0" bIns="0">
             <a:normAutofit/>
           </a:bodyPr>
-          <a:p>
-            <a:endParaRPr b="0" lang="de-DE" sz="1800" spc="-1" strike="noStrike">
-              <a:solidFill>
-                <a:srgbClr val="d9d9d9"/>
+          <a:lstStyle/>
+          <a:p>
+            <a:endParaRPr lang="de-DE" sz="1800" b="0" strike="noStrike" spc="-1">
+              <a:solidFill>
+                <a:srgbClr val="D9D9D9"/>
               </a:solidFill>
               <a:latin typeface="Open Sans"/>
             </a:endParaRPr>
@@ -1140,13 +1290,14 @@
           </a:prstGeom>
         </p:spPr>
         <p:txBody>
-          <a:bodyPr lIns="0" rIns="0" tIns="0" bIns="0">
+          <a:bodyPr lIns="0" tIns="0" rIns="0" bIns="0">
             <a:normAutofit/>
           </a:bodyPr>
-          <a:p>
-            <a:endParaRPr b="0" lang="de-DE" sz="1800" spc="-1" strike="noStrike">
-              <a:solidFill>
-                <a:srgbClr val="d9d9d9"/>
+          <a:lstStyle/>
+          <a:p>
+            <a:endParaRPr lang="de-DE" sz="1800" b="0" strike="noStrike" spc="-1">
+              <a:solidFill>
+                <a:srgbClr val="D9D9D9"/>
               </a:solidFill>
               <a:latin typeface="Open Sans"/>
             </a:endParaRPr>
@@ -1155,11 +1306,14 @@
       </p:sp>
     </p:spTree>
   </p:cSld>
+  <p:clrMapOvr>
+    <a:masterClrMapping/>
+  </p:clrMapOvr>
 </p:sldLayout>
 </file>
 
 <file path=ppt/slideLayouts/slideLayout8.xml><?xml version="1.0" encoding="utf-8"?>
-<p:sldLayout xmlns:a="http://schemas.openxmlformats.org/drawingml/2006/main" xmlns:p="http://schemas.openxmlformats.org/presentationml/2006/main" xmlns:r="http://schemas.openxmlformats.org/officeDocument/2006/relationships" xmlns:p14="http://schemas.microsoft.com/office/powerpoint/2010/main" xmlns:p15="http://schemas.microsoft.com/office/powerpoint/2012/main" xmlns:mc="http://schemas.openxmlformats.org/markup-compatibility/2006" type="objAndTwoObj" preserve="1">
+<p:sldLayout xmlns:a="http://schemas.openxmlformats.org/drawingml/2006/main" xmlns:r="http://schemas.openxmlformats.org/officeDocument/2006/relationships" xmlns:p="http://schemas.openxmlformats.org/presentationml/2006/main" type="objAndTwoObj" preserve="1">
   <p:cSld name="Title Content and 2 Content">
     <p:spTree>
       <p:nvGrpSpPr>
@@ -1195,13 +1349,14 @@
           </a:prstGeom>
         </p:spPr>
         <p:txBody>
-          <a:bodyPr lIns="0" rIns="0" tIns="0" bIns="0" anchor="ctr">
+          <a:bodyPr lIns="0" tIns="0" rIns="0" bIns="0" anchor="ctr">
             <a:noAutofit/>
           </a:bodyPr>
-          <a:p>
-            <a:endParaRPr b="0" lang="de-DE" sz="2000" spc="-1" strike="noStrike">
-              <a:solidFill>
-                <a:srgbClr val="ffffff"/>
+          <a:lstStyle/>
+          <a:p>
+            <a:endParaRPr lang="de-DE" sz="2000" b="0" strike="noStrike" spc="-1">
+              <a:solidFill>
+                <a:srgbClr val="FFFFFF"/>
               </a:solidFill>
               <a:latin typeface="Open Sans"/>
             </a:endParaRPr>
@@ -1228,13 +1383,14 @@
           </a:prstGeom>
         </p:spPr>
         <p:txBody>
-          <a:bodyPr lIns="0" rIns="0" tIns="0" bIns="0">
+          <a:bodyPr lIns="0" tIns="0" rIns="0" bIns="0">
             <a:normAutofit/>
           </a:bodyPr>
-          <a:p>
-            <a:endParaRPr b="0" lang="de-DE" sz="1800" spc="-1" strike="noStrike">
-              <a:solidFill>
-                <a:srgbClr val="d9d9d9"/>
+          <a:lstStyle/>
+          <a:p>
+            <a:endParaRPr lang="de-DE" sz="1800" b="0" strike="noStrike" spc="-1">
+              <a:solidFill>
+                <a:srgbClr val="D9D9D9"/>
               </a:solidFill>
               <a:latin typeface="Open Sans"/>
             </a:endParaRPr>
@@ -1261,13 +1417,14 @@
           </a:prstGeom>
         </p:spPr>
         <p:txBody>
-          <a:bodyPr lIns="0" rIns="0" tIns="0" bIns="0">
+          <a:bodyPr lIns="0" tIns="0" rIns="0" bIns="0">
             <a:normAutofit/>
           </a:bodyPr>
-          <a:p>
-            <a:endParaRPr b="0" lang="de-DE" sz="1800" spc="-1" strike="noStrike">
-              <a:solidFill>
-                <a:srgbClr val="d9d9d9"/>
+          <a:lstStyle/>
+          <a:p>
+            <a:endParaRPr lang="de-DE" sz="1800" b="0" strike="noStrike" spc="-1">
+              <a:solidFill>
+                <a:srgbClr val="D9D9D9"/>
               </a:solidFill>
               <a:latin typeface="Open Sans"/>
             </a:endParaRPr>
@@ -1294,13 +1451,14 @@
           </a:prstGeom>
         </p:spPr>
         <p:txBody>
-          <a:bodyPr lIns="0" rIns="0" tIns="0" bIns="0">
+          <a:bodyPr lIns="0" tIns="0" rIns="0" bIns="0">
             <a:normAutofit/>
           </a:bodyPr>
-          <a:p>
-            <a:endParaRPr b="0" lang="de-DE" sz="1800" spc="-1" strike="noStrike">
-              <a:solidFill>
-                <a:srgbClr val="d9d9d9"/>
+          <a:lstStyle/>
+          <a:p>
+            <a:endParaRPr lang="de-DE" sz="1800" b="0" strike="noStrike" spc="-1">
+              <a:solidFill>
+                <a:srgbClr val="D9D9D9"/>
               </a:solidFill>
               <a:latin typeface="Open Sans"/>
             </a:endParaRPr>
@@ -1309,11 +1467,14 @@
       </p:sp>
     </p:spTree>
   </p:cSld>
+  <p:clrMapOvr>
+    <a:masterClrMapping/>
+  </p:clrMapOvr>
 </p:sldLayout>
 </file>
 
 <file path=ppt/slideLayouts/slideLayout9.xml><?xml version="1.0" encoding="utf-8"?>
-<p:sldLayout xmlns:a="http://schemas.openxmlformats.org/drawingml/2006/main" xmlns:p="http://schemas.openxmlformats.org/presentationml/2006/main" xmlns:r="http://schemas.openxmlformats.org/officeDocument/2006/relationships" xmlns:p14="http://schemas.microsoft.com/office/powerpoint/2010/main" xmlns:p15="http://schemas.microsoft.com/office/powerpoint/2012/main" xmlns:mc="http://schemas.openxmlformats.org/markup-compatibility/2006" type="twoObjOverTx" preserve="1">
+<p:sldLayout xmlns:a="http://schemas.openxmlformats.org/drawingml/2006/main" xmlns:r="http://schemas.openxmlformats.org/officeDocument/2006/relationships" xmlns:p="http://schemas.openxmlformats.org/presentationml/2006/main" type="twoObjOverTx" preserve="1">
   <p:cSld name="Title, 2 Content over Content">
     <p:spTree>
       <p:nvGrpSpPr>
@@ -1349,13 +1510,14 @@
           </a:prstGeom>
         </p:spPr>
         <p:txBody>
-          <a:bodyPr lIns="0" rIns="0" tIns="0" bIns="0" anchor="ctr">
+          <a:bodyPr lIns="0" tIns="0" rIns="0" bIns="0" anchor="ctr">
             <a:noAutofit/>
           </a:bodyPr>
-          <a:p>
-            <a:endParaRPr b="0" lang="de-DE" sz="2000" spc="-1" strike="noStrike">
-              <a:solidFill>
-                <a:srgbClr val="ffffff"/>
+          <a:lstStyle/>
+          <a:p>
+            <a:endParaRPr lang="de-DE" sz="2000" b="0" strike="noStrike" spc="-1">
+              <a:solidFill>
+                <a:srgbClr val="FFFFFF"/>
               </a:solidFill>
               <a:latin typeface="Open Sans"/>
             </a:endParaRPr>
@@ -1382,13 +1544,14 @@
           </a:prstGeom>
         </p:spPr>
         <p:txBody>
-          <a:bodyPr lIns="0" rIns="0" tIns="0" bIns="0">
+          <a:bodyPr lIns="0" tIns="0" rIns="0" bIns="0">
             <a:normAutofit/>
           </a:bodyPr>
-          <a:p>
-            <a:endParaRPr b="0" lang="de-DE" sz="1800" spc="-1" strike="noStrike">
-              <a:solidFill>
-                <a:srgbClr val="d9d9d9"/>
+          <a:lstStyle/>
+          <a:p>
+            <a:endParaRPr lang="de-DE" sz="1800" b="0" strike="noStrike" spc="-1">
+              <a:solidFill>
+                <a:srgbClr val="D9D9D9"/>
               </a:solidFill>
               <a:latin typeface="Open Sans"/>
             </a:endParaRPr>
@@ -1415,13 +1578,14 @@
           </a:prstGeom>
         </p:spPr>
         <p:txBody>
-          <a:bodyPr lIns="0" rIns="0" tIns="0" bIns="0">
+          <a:bodyPr lIns="0" tIns="0" rIns="0" bIns="0">
             <a:normAutofit/>
           </a:bodyPr>
-          <a:p>
-            <a:endParaRPr b="0" lang="de-DE" sz="1800" spc="-1" strike="noStrike">
-              <a:solidFill>
-                <a:srgbClr val="d9d9d9"/>
+          <a:lstStyle/>
+          <a:p>
+            <a:endParaRPr lang="de-DE" sz="1800" b="0" strike="noStrike" spc="-1">
+              <a:solidFill>
+                <a:srgbClr val="D9D9D9"/>
               </a:solidFill>
               <a:latin typeface="Open Sans"/>
             </a:endParaRPr>
@@ -1448,13 +1612,14 @@
           </a:prstGeom>
         </p:spPr>
         <p:txBody>
-          <a:bodyPr lIns="0" rIns="0" tIns="0" bIns="0">
+          <a:bodyPr lIns="0" tIns="0" rIns="0" bIns="0">
             <a:normAutofit/>
           </a:bodyPr>
-          <a:p>
-            <a:endParaRPr b="0" lang="de-DE" sz="1800" spc="-1" strike="noStrike">
-              <a:solidFill>
-                <a:srgbClr val="d9d9d9"/>
+          <a:lstStyle/>
+          <a:p>
+            <a:endParaRPr lang="de-DE" sz="1800" b="0" strike="noStrike" spc="-1">
+              <a:solidFill>
+                <a:srgbClr val="D9D9D9"/>
               </a:solidFill>
               <a:latin typeface="Open Sans"/>
             </a:endParaRPr>
@@ -1463,17 +1628,21 @@
       </p:sp>
     </p:spTree>
   </p:cSld>
+  <p:clrMapOvr>
+    <a:masterClrMapping/>
+  </p:clrMapOvr>
 </p:sldLayout>
 </file>
 
 <file path=ppt/slideMasters/slideMaster1.xml><?xml version="1.0" encoding="utf-8"?>
-<p:sldMaster xmlns:a="http://schemas.openxmlformats.org/drawingml/2006/main" xmlns:p="http://schemas.openxmlformats.org/presentationml/2006/main" xmlns:r="http://schemas.openxmlformats.org/officeDocument/2006/relationships" xmlns:p14="http://schemas.microsoft.com/office/powerpoint/2010/main" xmlns:p15="http://schemas.microsoft.com/office/powerpoint/2012/main" xmlns:mc="http://schemas.openxmlformats.org/markup-compatibility/2006">
+<p:sldMaster xmlns:a="http://schemas.openxmlformats.org/drawingml/2006/main" xmlns:r="http://schemas.openxmlformats.org/officeDocument/2006/relationships" xmlns:p="http://schemas.openxmlformats.org/presentationml/2006/main">
   <p:cSld>
     <p:bg>
       <p:bgPr>
         <a:solidFill>
           <a:srgbClr val="000000"/>
         </a:solidFill>
+        <a:effectLst/>
       </p:bgPr>
     </p:bg>
     <p:spTree>
@@ -1492,7 +1661,7 @@
       </p:grpSpPr>
       <p:sp>
         <p:nvSpPr>
-          <p:cNvPr id="0" name="PlaceHolder 1"/>
+          <p:cNvPr id="2" name="PlaceHolder 1"/>
           <p:cNvSpPr>
             <a:spLocks noGrp="1"/>
           </p:cNvSpPr>
@@ -1510,31 +1679,26 @@
           </a:prstGeom>
         </p:spPr>
         <p:txBody>
-          <a:bodyPr lIns="0" rIns="0" tIns="0" bIns="0" anchor="ctr">
+          <a:bodyPr lIns="0" tIns="0" rIns="0" bIns="0" anchor="ctr">
             <a:noAutofit/>
           </a:bodyPr>
+          <a:lstStyle/>
           <a:p>
             <a:r>
-              <a:rPr b="0" lang="de-DE" sz="2000" spc="-1" strike="noStrike">
+              <a:rPr lang="de-DE" sz="2000" b="0" strike="noStrike" spc="-1">
                 <a:solidFill>
-                  <a:srgbClr val="ffffff"/>
+                  <a:srgbClr val="FFFFFF"/>
                 </a:solidFill>
                 <a:latin typeface="Open Sans"/>
               </a:rPr>
               <a:t>Format des Titeltextes durch Klicken bearbeiten</a:t>
             </a:r>
-            <a:endParaRPr b="0" lang="de-DE" sz="2000" spc="-1" strike="noStrike">
-              <a:solidFill>
-                <a:srgbClr val="ffffff"/>
-              </a:solidFill>
-              <a:latin typeface="Open Sans"/>
-            </a:endParaRPr>
-          </a:p>
-        </p:txBody>
-      </p:sp>
-      <p:sp>
-        <p:nvSpPr>
-          <p:cNvPr id="1" name="PlaceHolder 2"/>
+          </a:p>
+        </p:txBody>
+      </p:sp>
+      <p:sp>
+        <p:nvSpPr>
+          <p:cNvPr id="3" name="PlaceHolder 2"/>
           <p:cNvSpPr>
             <a:spLocks noGrp="1"/>
           </p:cNvSpPr>
@@ -1552,229 +1716,468 @@
           </a:prstGeom>
         </p:spPr>
         <p:txBody>
-          <a:bodyPr lIns="0" rIns="0" tIns="0" bIns="0">
+          <a:bodyPr lIns="0" tIns="0" rIns="0" bIns="0">
             <a:normAutofit/>
           </a:bodyPr>
+          <a:lstStyle/>
           <a:p>
             <a:pPr marL="432000" indent="-324000">
               <a:spcBef>
                 <a:spcPts val="1414"/>
               </a:spcBef>
               <a:buClr>
-                <a:srgbClr val="ffffff"/>
+                <a:srgbClr val="FFFFFF"/>
               </a:buClr>
               <a:buSzPct val="45000"/>
               <a:buFont typeface="Wingdings" charset="2"/>
               <a:buChar char=""/>
             </a:pPr>
             <a:r>
-              <a:rPr b="0" lang="de-DE" sz="1800" spc="-1" strike="noStrike">
+              <a:rPr lang="de-DE" sz="1800" b="0" strike="noStrike" spc="-1">
                 <a:solidFill>
-                  <a:srgbClr val="d9d9d9"/>
+                  <a:srgbClr val="D9D9D9"/>
                 </a:solidFill>
                 <a:latin typeface="Open Sans"/>
               </a:rPr>
               <a:t>Format des Gliederungstextes durch Klicken bearbeiten</a:t>
             </a:r>
-            <a:endParaRPr b="0" lang="de-DE" sz="1800" spc="-1" strike="noStrike">
-              <a:solidFill>
-                <a:srgbClr val="d9d9d9"/>
-              </a:solidFill>
-              <a:latin typeface="Open Sans"/>
-            </a:endParaRPr>
-          </a:p>
-          <a:p>
-            <a:pPr lvl="1" marL="864000" indent="-324000">
+          </a:p>
+          <a:p>
+            <a:pPr marL="864000" lvl="1" indent="-324000">
               <a:spcBef>
                 <a:spcPts val="1131"/>
               </a:spcBef>
               <a:buClr>
-                <a:srgbClr val="ffffff"/>
+                <a:srgbClr val="FFFFFF"/>
               </a:buClr>
               <a:buSzPct val="75000"/>
               <a:buFont typeface="Symbol" charset="2"/>
               <a:buChar char=""/>
             </a:pPr>
             <a:r>
-              <a:rPr b="0" lang="de-DE" sz="1800" spc="-1" strike="noStrike">
+              <a:rPr lang="de-DE" sz="1800" b="0" strike="noStrike" spc="-1">
                 <a:solidFill>
-                  <a:srgbClr val="d9d9d9"/>
+                  <a:srgbClr val="D9D9D9"/>
                 </a:solidFill>
                 <a:latin typeface="Open Sans"/>
               </a:rPr>
               <a:t>Zweite Gliederungsebene</a:t>
             </a:r>
-            <a:endParaRPr b="0" lang="de-DE" sz="1800" spc="-1" strike="noStrike">
-              <a:solidFill>
-                <a:srgbClr val="d9d9d9"/>
-              </a:solidFill>
-              <a:latin typeface="Open Sans"/>
-            </a:endParaRPr>
-          </a:p>
-          <a:p>
-            <a:pPr lvl="2" marL="1296000" indent="-288000">
+          </a:p>
+          <a:p>
+            <a:pPr marL="1296000" lvl="2" indent="-288000">
               <a:spcBef>
                 <a:spcPts val="848"/>
               </a:spcBef>
               <a:buClr>
-                <a:srgbClr val="ffffff"/>
+                <a:srgbClr val="FFFFFF"/>
               </a:buClr>
               <a:buSzPct val="45000"/>
               <a:buFont typeface="Wingdings" charset="2"/>
               <a:buChar char=""/>
             </a:pPr>
             <a:r>
-              <a:rPr b="0" lang="de-DE" sz="1800" spc="-1" strike="noStrike">
+              <a:rPr lang="de-DE" sz="1800" b="0" strike="noStrike" spc="-1">
                 <a:solidFill>
-                  <a:srgbClr val="d9d9d9"/>
+                  <a:srgbClr val="D9D9D9"/>
                 </a:solidFill>
                 <a:latin typeface="Open Sans"/>
               </a:rPr>
               <a:t>Dritte Gliederungsebene</a:t>
             </a:r>
-            <a:endParaRPr b="0" lang="de-DE" sz="1800" spc="-1" strike="noStrike">
-              <a:solidFill>
-                <a:srgbClr val="d9d9d9"/>
-              </a:solidFill>
-              <a:latin typeface="Open Sans"/>
-            </a:endParaRPr>
-          </a:p>
-          <a:p>
-            <a:pPr lvl="3" marL="1728000" indent="-216000">
+          </a:p>
+          <a:p>
+            <a:pPr marL="1728000" lvl="3" indent="-216000">
               <a:spcBef>
                 <a:spcPts val="564"/>
               </a:spcBef>
               <a:buClr>
-                <a:srgbClr val="ffffff"/>
+                <a:srgbClr val="FFFFFF"/>
               </a:buClr>
               <a:buSzPct val="75000"/>
               <a:buFont typeface="Symbol" charset="2"/>
               <a:buChar char=""/>
             </a:pPr>
             <a:r>
-              <a:rPr b="0" lang="de-DE" sz="1800" spc="-1" strike="noStrike">
+              <a:rPr lang="de-DE" sz="1800" b="0" strike="noStrike" spc="-1">
                 <a:solidFill>
-                  <a:srgbClr val="d9d9d9"/>
+                  <a:srgbClr val="D9D9D9"/>
                 </a:solidFill>
                 <a:latin typeface="Open Sans"/>
               </a:rPr>
               <a:t>Vierte Gliederungsebene</a:t>
             </a:r>
-            <a:endParaRPr b="0" lang="de-DE" sz="1800" spc="-1" strike="noStrike">
-              <a:solidFill>
-                <a:srgbClr val="d9d9d9"/>
-              </a:solidFill>
-              <a:latin typeface="Open Sans"/>
-            </a:endParaRPr>
-          </a:p>
-          <a:p>
-            <a:pPr lvl="4" marL="2160000" indent="-216000">
+          </a:p>
+          <a:p>
+            <a:pPr marL="2160000" lvl="4" indent="-216000">
               <a:spcBef>
                 <a:spcPts val="281"/>
               </a:spcBef>
               <a:buClr>
-                <a:srgbClr val="ffffff"/>
+                <a:srgbClr val="FFFFFF"/>
               </a:buClr>
               <a:buSzPct val="45000"/>
               <a:buFont typeface="Wingdings" charset="2"/>
               <a:buChar char=""/>
             </a:pPr>
             <a:r>
-              <a:rPr b="0" lang="de-DE" sz="1800" spc="-1" strike="noStrike">
+              <a:rPr lang="de-DE" sz="1800" b="0" strike="noStrike" spc="-1">
                 <a:solidFill>
-                  <a:srgbClr val="d9d9d9"/>
+                  <a:srgbClr val="D9D9D9"/>
                 </a:solidFill>
                 <a:latin typeface="Open Sans"/>
               </a:rPr>
               <a:t>Fünfte Gliederungsebene</a:t>
             </a:r>
-            <a:endParaRPr b="0" lang="de-DE" sz="1800" spc="-1" strike="noStrike">
-              <a:solidFill>
-                <a:srgbClr val="d9d9d9"/>
-              </a:solidFill>
-              <a:latin typeface="Open Sans"/>
-            </a:endParaRPr>
-          </a:p>
-          <a:p>
-            <a:pPr lvl="5" marL="2592000" indent="-216000">
+          </a:p>
+          <a:p>
+            <a:pPr marL="2592000" lvl="5" indent="-216000">
               <a:spcBef>
                 <a:spcPts val="281"/>
               </a:spcBef>
               <a:buClr>
-                <a:srgbClr val="ffffff"/>
+                <a:srgbClr val="FFFFFF"/>
               </a:buClr>
               <a:buSzPct val="45000"/>
               <a:buFont typeface="Wingdings" charset="2"/>
               <a:buChar char=""/>
             </a:pPr>
             <a:r>
-              <a:rPr b="0" lang="de-DE" sz="1800" spc="-1" strike="noStrike">
+              <a:rPr lang="de-DE" sz="1800" b="0" strike="noStrike" spc="-1">
                 <a:solidFill>
-                  <a:srgbClr val="d9d9d9"/>
+                  <a:srgbClr val="D9D9D9"/>
                 </a:solidFill>
                 <a:latin typeface="Open Sans"/>
               </a:rPr>
               <a:t>Sechste Gliederungsebene</a:t>
             </a:r>
-            <a:endParaRPr b="0" lang="de-DE" sz="1800" spc="-1" strike="noStrike">
-              <a:solidFill>
-                <a:srgbClr val="d9d9d9"/>
-              </a:solidFill>
-              <a:latin typeface="Open Sans"/>
-            </a:endParaRPr>
-          </a:p>
-          <a:p>
-            <a:pPr lvl="6" marL="3024000" indent="-216000">
+          </a:p>
+          <a:p>
+            <a:pPr marL="3024000" lvl="6" indent="-216000">
               <a:spcBef>
                 <a:spcPts val="281"/>
               </a:spcBef>
               <a:buClr>
-                <a:srgbClr val="ffffff"/>
+                <a:srgbClr val="FFFFFF"/>
               </a:buClr>
               <a:buSzPct val="45000"/>
               <a:buFont typeface="Wingdings" charset="2"/>
               <a:buChar char=""/>
             </a:pPr>
             <a:r>
-              <a:rPr b="0" lang="de-DE" sz="1800" spc="-1" strike="noStrike">
+              <a:rPr lang="de-DE" sz="1800" b="0" strike="noStrike" spc="-1">
                 <a:solidFill>
-                  <a:srgbClr val="d9d9d9"/>
+                  <a:srgbClr val="D9D9D9"/>
                 </a:solidFill>
                 <a:latin typeface="Open Sans"/>
               </a:rPr>
               <a:t>Siebte Gliederungsebene</a:t>
             </a:r>
-            <a:endParaRPr b="0" lang="de-DE" sz="1800" spc="-1" strike="noStrike">
-              <a:solidFill>
-                <a:srgbClr val="d9d9d9"/>
-              </a:solidFill>
-              <a:latin typeface="Open Sans"/>
-            </a:endParaRPr>
           </a:p>
         </p:txBody>
       </p:sp>
     </p:spTree>
   </p:cSld>
-  <p:clrMap bg1="lt1" bg2="lt2" tx1="dk1" tx2="dk2" accent1="accent1" accent2="accent2" accent3="accent3" accent4="accent4" accent5="accent5" accent6="accent6" hlink="hlink" folHlink="folHlink"/>
+  <p:clrMap bg1="lt1" tx1="dk1" bg2="lt2" tx2="dk2" accent1="accent1" accent2="accent2" accent3="accent3" accent4="accent4" accent5="accent5" accent6="accent6" hlink="hlink" folHlink="folHlink"/>
   <p:sldLayoutIdLst>
-    <p:sldLayoutId id="2147483649" r:id="rId2"/>
-    <p:sldLayoutId id="2147483650" r:id="rId3"/>
-    <p:sldLayoutId id="2147483651" r:id="rId4"/>
-    <p:sldLayoutId id="2147483652" r:id="rId5"/>
-    <p:sldLayoutId id="2147483653" r:id="rId6"/>
-    <p:sldLayoutId id="2147483654" r:id="rId7"/>
-    <p:sldLayoutId id="2147483655" r:id="rId8"/>
-    <p:sldLayoutId id="2147483656" r:id="rId9"/>
-    <p:sldLayoutId id="2147483657" r:id="rId10"/>
-    <p:sldLayoutId id="2147483658" r:id="rId11"/>
-    <p:sldLayoutId id="2147483659" r:id="rId12"/>
-    <p:sldLayoutId id="2147483660" r:id="rId13"/>
+    <p:sldLayoutId id="2147483649" r:id="rId1"/>
+    <p:sldLayoutId id="2147483650" r:id="rId2"/>
+    <p:sldLayoutId id="2147483651" r:id="rId3"/>
+    <p:sldLayoutId id="2147483652" r:id="rId4"/>
+    <p:sldLayoutId id="2147483653" r:id="rId5"/>
+    <p:sldLayoutId id="2147483654" r:id="rId6"/>
+    <p:sldLayoutId id="2147483655" r:id="rId7"/>
+    <p:sldLayoutId id="2147483656" r:id="rId8"/>
+    <p:sldLayoutId id="2147483657" r:id="rId9"/>
+    <p:sldLayoutId id="2147483658" r:id="rId10"/>
+    <p:sldLayoutId id="2147483659" r:id="rId11"/>
+    <p:sldLayoutId id="2147483660" r:id="rId12"/>
   </p:sldLayoutIdLst>
+  <p:txStyles>
+    <p:titleStyle>
+      <a:lvl1pPr algn="l" defTabSz="914400" rtl="0" eaLnBrk="1" latinLnBrk="0" hangingPunct="1">
+        <a:lnSpc>
+          <a:spcPct val="90000"/>
+        </a:lnSpc>
+        <a:spcBef>
+          <a:spcPct val="0"/>
+        </a:spcBef>
+        <a:buNone/>
+        <a:defRPr sz="4400" kern="1200">
+          <a:solidFill>
+            <a:schemeClr val="tx1"/>
+          </a:solidFill>
+          <a:latin typeface="+mj-lt"/>
+          <a:ea typeface="+mj-ea"/>
+          <a:cs typeface="+mj-cs"/>
+        </a:defRPr>
+      </a:lvl1pPr>
+    </p:titleStyle>
+    <p:bodyStyle>
+      <a:lvl1pPr marL="228600" indent="-228600" algn="l" defTabSz="914400" rtl="0" eaLnBrk="1" latinLnBrk="0" hangingPunct="1">
+        <a:lnSpc>
+          <a:spcPct val="90000"/>
+        </a:lnSpc>
+        <a:spcBef>
+          <a:spcPts val="1000"/>
+        </a:spcBef>
+        <a:buFont typeface="Arial" panose="020B0604020202020204" pitchFamily="34" charset="0"/>
+        <a:buChar char="•"/>
+        <a:defRPr sz="2800" kern="1200">
+          <a:solidFill>
+            <a:schemeClr val="tx1"/>
+          </a:solidFill>
+          <a:latin typeface="+mn-lt"/>
+          <a:ea typeface="+mn-ea"/>
+          <a:cs typeface="+mn-cs"/>
+        </a:defRPr>
+      </a:lvl1pPr>
+      <a:lvl2pPr marL="685800" indent="-228600" algn="l" defTabSz="914400" rtl="0" eaLnBrk="1" latinLnBrk="0" hangingPunct="1">
+        <a:lnSpc>
+          <a:spcPct val="90000"/>
+        </a:lnSpc>
+        <a:spcBef>
+          <a:spcPts val="500"/>
+        </a:spcBef>
+        <a:buFont typeface="Arial" panose="020B0604020202020204" pitchFamily="34" charset="0"/>
+        <a:buChar char="•"/>
+        <a:defRPr sz="2400" kern="1200">
+          <a:solidFill>
+            <a:schemeClr val="tx1"/>
+          </a:solidFill>
+          <a:latin typeface="+mn-lt"/>
+          <a:ea typeface="+mn-ea"/>
+          <a:cs typeface="+mn-cs"/>
+        </a:defRPr>
+      </a:lvl2pPr>
+      <a:lvl3pPr marL="1143000" indent="-228600" algn="l" defTabSz="914400" rtl="0" eaLnBrk="1" latinLnBrk="0" hangingPunct="1">
+        <a:lnSpc>
+          <a:spcPct val="90000"/>
+        </a:lnSpc>
+        <a:spcBef>
+          <a:spcPts val="500"/>
+        </a:spcBef>
+        <a:buFont typeface="Arial" panose="020B0604020202020204" pitchFamily="34" charset="0"/>
+        <a:buChar char="•"/>
+        <a:defRPr sz="2000" kern="1200">
+          <a:solidFill>
+            <a:schemeClr val="tx1"/>
+          </a:solidFill>
+          <a:latin typeface="+mn-lt"/>
+          <a:ea typeface="+mn-ea"/>
+          <a:cs typeface="+mn-cs"/>
+        </a:defRPr>
+      </a:lvl3pPr>
+      <a:lvl4pPr marL="1600200" indent="-228600" algn="l" defTabSz="914400" rtl="0" eaLnBrk="1" latinLnBrk="0" hangingPunct="1">
+        <a:lnSpc>
+          <a:spcPct val="90000"/>
+        </a:lnSpc>
+        <a:spcBef>
+          <a:spcPts val="500"/>
+        </a:spcBef>
+        <a:buFont typeface="Arial" panose="020B0604020202020204" pitchFamily="34" charset="0"/>
+        <a:buChar char="•"/>
+        <a:defRPr sz="1800" kern="1200">
+          <a:solidFill>
+            <a:schemeClr val="tx1"/>
+          </a:solidFill>
+          <a:latin typeface="+mn-lt"/>
+          <a:ea typeface="+mn-ea"/>
+          <a:cs typeface="+mn-cs"/>
+        </a:defRPr>
+      </a:lvl4pPr>
+      <a:lvl5pPr marL="2057400" indent="-228600" algn="l" defTabSz="914400" rtl="0" eaLnBrk="1" latinLnBrk="0" hangingPunct="1">
+        <a:lnSpc>
+          <a:spcPct val="90000"/>
+        </a:lnSpc>
+        <a:spcBef>
+          <a:spcPts val="500"/>
+        </a:spcBef>
+        <a:buFont typeface="Arial" panose="020B0604020202020204" pitchFamily="34" charset="0"/>
+        <a:buChar char="•"/>
+        <a:defRPr sz="1800" kern="1200">
+          <a:solidFill>
+            <a:schemeClr val="tx1"/>
+          </a:solidFill>
+          <a:latin typeface="+mn-lt"/>
+          <a:ea typeface="+mn-ea"/>
+          <a:cs typeface="+mn-cs"/>
+        </a:defRPr>
+      </a:lvl5pPr>
+      <a:lvl6pPr marL="2514600" indent="-228600" algn="l" defTabSz="914400" rtl="0" eaLnBrk="1" latinLnBrk="0" hangingPunct="1">
+        <a:lnSpc>
+          <a:spcPct val="90000"/>
+        </a:lnSpc>
+        <a:spcBef>
+          <a:spcPts val="500"/>
+        </a:spcBef>
+        <a:buFont typeface="Arial" panose="020B0604020202020204" pitchFamily="34" charset="0"/>
+        <a:buChar char="•"/>
+        <a:defRPr sz="1800" kern="1200">
+          <a:solidFill>
+            <a:schemeClr val="tx1"/>
+          </a:solidFill>
+          <a:latin typeface="+mn-lt"/>
+          <a:ea typeface="+mn-ea"/>
+          <a:cs typeface="+mn-cs"/>
+        </a:defRPr>
+      </a:lvl6pPr>
+      <a:lvl7pPr marL="2971800" indent="-228600" algn="l" defTabSz="914400" rtl="0" eaLnBrk="1" latinLnBrk="0" hangingPunct="1">
+        <a:lnSpc>
+          <a:spcPct val="90000"/>
+        </a:lnSpc>
+        <a:spcBef>
+          <a:spcPts val="500"/>
+        </a:spcBef>
+        <a:buFont typeface="Arial" panose="020B0604020202020204" pitchFamily="34" charset="0"/>
+        <a:buChar char="•"/>
+        <a:defRPr sz="1800" kern="1200">
+          <a:solidFill>
+            <a:schemeClr val="tx1"/>
+          </a:solidFill>
+          <a:latin typeface="+mn-lt"/>
+          <a:ea typeface="+mn-ea"/>
+          <a:cs typeface="+mn-cs"/>
+        </a:defRPr>
+      </a:lvl7pPr>
+      <a:lvl8pPr marL="3429000" indent="-228600" algn="l" defTabSz="914400" rtl="0" eaLnBrk="1" latinLnBrk="0" hangingPunct="1">
+        <a:lnSpc>
+          <a:spcPct val="90000"/>
+        </a:lnSpc>
+        <a:spcBef>
+          <a:spcPts val="500"/>
+        </a:spcBef>
+        <a:buFont typeface="Arial" panose="020B0604020202020204" pitchFamily="34" charset="0"/>
+        <a:buChar char="•"/>
+        <a:defRPr sz="1800" kern="1200">
+          <a:solidFill>
+            <a:schemeClr val="tx1"/>
+          </a:solidFill>
+          <a:latin typeface="+mn-lt"/>
+          <a:ea typeface="+mn-ea"/>
+          <a:cs typeface="+mn-cs"/>
+        </a:defRPr>
+      </a:lvl8pPr>
+      <a:lvl9pPr marL="3886200" indent="-228600" algn="l" defTabSz="914400" rtl="0" eaLnBrk="1" latinLnBrk="0" hangingPunct="1">
+        <a:lnSpc>
+          <a:spcPct val="90000"/>
+        </a:lnSpc>
+        <a:spcBef>
+          <a:spcPts val="500"/>
+        </a:spcBef>
+        <a:buFont typeface="Arial" panose="020B0604020202020204" pitchFamily="34" charset="0"/>
+        <a:buChar char="•"/>
+        <a:defRPr sz="1800" kern="1200">
+          <a:solidFill>
+            <a:schemeClr val="tx1"/>
+          </a:solidFill>
+          <a:latin typeface="+mn-lt"/>
+          <a:ea typeface="+mn-ea"/>
+          <a:cs typeface="+mn-cs"/>
+        </a:defRPr>
+      </a:lvl9pPr>
+    </p:bodyStyle>
+    <p:otherStyle>
+      <a:defPPr>
+        <a:defRPr lang="en-US"/>
+      </a:defPPr>
+      <a:lvl1pPr marL="0" algn="l" defTabSz="914400" rtl="0" eaLnBrk="1" latinLnBrk="0" hangingPunct="1">
+        <a:defRPr sz="1800" kern="1200">
+          <a:solidFill>
+            <a:schemeClr val="tx1"/>
+          </a:solidFill>
+          <a:latin typeface="+mn-lt"/>
+          <a:ea typeface="+mn-ea"/>
+          <a:cs typeface="+mn-cs"/>
+        </a:defRPr>
+      </a:lvl1pPr>
+      <a:lvl2pPr marL="457200" algn="l" defTabSz="914400" rtl="0" eaLnBrk="1" latinLnBrk="0" hangingPunct="1">
+        <a:defRPr sz="1800" kern="1200">
+          <a:solidFill>
+            <a:schemeClr val="tx1"/>
+          </a:solidFill>
+          <a:latin typeface="+mn-lt"/>
+          <a:ea typeface="+mn-ea"/>
+          <a:cs typeface="+mn-cs"/>
+        </a:defRPr>
+      </a:lvl2pPr>
+      <a:lvl3pPr marL="914400" algn="l" defTabSz="914400" rtl="0" eaLnBrk="1" latinLnBrk="0" hangingPunct="1">
+        <a:defRPr sz="1800" kern="1200">
+          <a:solidFill>
+            <a:schemeClr val="tx1"/>
+          </a:solidFill>
+          <a:latin typeface="+mn-lt"/>
+          <a:ea typeface="+mn-ea"/>
+          <a:cs typeface="+mn-cs"/>
+        </a:defRPr>
+      </a:lvl3pPr>
+      <a:lvl4pPr marL="1371600" algn="l" defTabSz="914400" rtl="0" eaLnBrk="1" latinLnBrk="0" hangingPunct="1">
+        <a:defRPr sz="1800" kern="1200">
+          <a:solidFill>
+            <a:schemeClr val="tx1"/>
+          </a:solidFill>
+          <a:latin typeface="+mn-lt"/>
+          <a:ea typeface="+mn-ea"/>
+          <a:cs typeface="+mn-cs"/>
+        </a:defRPr>
+      </a:lvl4pPr>
+      <a:lvl5pPr marL="1828800" algn="l" defTabSz="914400" rtl="0" eaLnBrk="1" latinLnBrk="0" hangingPunct="1">
+        <a:defRPr sz="1800" kern="1200">
+          <a:solidFill>
+            <a:schemeClr val="tx1"/>
+          </a:solidFill>
+          <a:latin typeface="+mn-lt"/>
+          <a:ea typeface="+mn-ea"/>
+          <a:cs typeface="+mn-cs"/>
+        </a:defRPr>
+      </a:lvl5pPr>
+      <a:lvl6pPr marL="2286000" algn="l" defTabSz="914400" rtl="0" eaLnBrk="1" latinLnBrk="0" hangingPunct="1">
+        <a:defRPr sz="1800" kern="1200">
+          <a:solidFill>
+            <a:schemeClr val="tx1"/>
+          </a:solidFill>
+          <a:latin typeface="+mn-lt"/>
+          <a:ea typeface="+mn-ea"/>
+          <a:cs typeface="+mn-cs"/>
+        </a:defRPr>
+      </a:lvl6pPr>
+      <a:lvl7pPr marL="2743200" algn="l" defTabSz="914400" rtl="0" eaLnBrk="1" latinLnBrk="0" hangingPunct="1">
+        <a:defRPr sz="1800" kern="1200">
+          <a:solidFill>
+            <a:schemeClr val="tx1"/>
+          </a:solidFill>
+          <a:latin typeface="+mn-lt"/>
+          <a:ea typeface="+mn-ea"/>
+          <a:cs typeface="+mn-cs"/>
+        </a:defRPr>
+      </a:lvl7pPr>
+      <a:lvl8pPr marL="3200400" algn="l" defTabSz="914400" rtl="0" eaLnBrk="1" latinLnBrk="0" hangingPunct="1">
+        <a:defRPr sz="1800" kern="1200">
+          <a:solidFill>
+            <a:schemeClr val="tx1"/>
+          </a:solidFill>
+          <a:latin typeface="+mn-lt"/>
+          <a:ea typeface="+mn-ea"/>
+          <a:cs typeface="+mn-cs"/>
+        </a:defRPr>
+      </a:lvl8pPr>
+      <a:lvl9pPr marL="3657600" algn="l" defTabSz="914400" rtl="0" eaLnBrk="1" latinLnBrk="0" hangingPunct="1">
+        <a:defRPr sz="1800" kern="1200">
+          <a:solidFill>
+            <a:schemeClr val="tx1"/>
+          </a:solidFill>
+          <a:latin typeface="+mn-lt"/>
+          <a:ea typeface="+mn-ea"/>
+          <a:cs typeface="+mn-cs"/>
+        </a:defRPr>
+      </a:lvl9pPr>
+    </p:otherStyle>
+  </p:txStyles>
 </p:sldMaster>
 </file>
 
 <file path=ppt/slides/slide1.xml><?xml version="1.0" encoding="utf-8"?>
-<p:sld xmlns:a="http://schemas.openxmlformats.org/drawingml/2006/main" xmlns:p="http://schemas.openxmlformats.org/presentationml/2006/main" xmlns:r="http://schemas.openxmlformats.org/officeDocument/2006/relationships" xmlns:p14="http://schemas.microsoft.com/office/powerpoint/2010/main" xmlns:p15="http://schemas.microsoft.com/office/powerpoint/2012/main" xmlns:mc="http://schemas.openxmlformats.org/markup-compatibility/2006">
+<p:sld xmlns:a="http://schemas.openxmlformats.org/drawingml/2006/main" xmlns:r="http://schemas.openxmlformats.org/officeDocument/2006/relationships" xmlns:p="http://schemas.openxmlformats.org/presentationml/2006/main">
   <p:cSld>
     <p:spTree>
       <p:nvGrpSpPr>
@@ -1810,15 +2213,22 @@
           </a:ln>
         </p:spPr>
         <p:style>
-          <a:lnRef idx="0"/>
-          <a:fillRef idx="0"/>
-          <a:effectRef idx="0"/>
+          <a:lnRef idx="0">
+            <a:scrgbClr r="0" g="0" b="0"/>
+          </a:lnRef>
+          <a:fillRef idx="0">
+            <a:scrgbClr r="0" g="0" b="0"/>
+          </a:fillRef>
+          <a:effectRef idx="0">
+            <a:scrgbClr r="0" g="0" b="0"/>
+          </a:effectRef>
           <a:fontRef idx="minor"/>
         </p:style>
         <p:txBody>
-          <a:bodyPr lIns="0" rIns="0" tIns="0" bIns="0" anchor="ctr">
+          <a:bodyPr lIns="0" tIns="0" rIns="0" bIns="0" anchor="ctr">
             <a:noAutofit/>
           </a:bodyPr>
+          <a:lstStyle/>
           <a:p>
             <a:pPr algn="ctr">
               <a:lnSpc>
@@ -1826,16 +2236,16 @@
               </a:lnSpc>
             </a:pPr>
             <a:r>
-              <a:rPr b="0" lang="de-CH" sz="4400" spc="-1" strike="noStrike">
+              <a:rPr lang="de-CH" sz="4400" b="0" strike="noStrike" spc="-1">
                 <a:solidFill>
-                  <a:srgbClr val="f2f2f2"/>
+                  <a:srgbClr val="F2F2F2"/>
                 </a:solidFill>
                 <a:latin typeface="Open Sans SemiBold"/>
                 <a:ea typeface="DejaVu Sans"/>
               </a:rPr>
               <a:t>Product Search</a:t>
             </a:r>
-            <a:endParaRPr b="0" lang="de-CH" sz="4400" spc="-1" strike="noStrike">
+            <a:endParaRPr lang="de-CH" sz="4400" b="0" strike="noStrike" spc="-1">
               <a:latin typeface="Arial"/>
             </a:endParaRPr>
           </a:p>
@@ -1861,15 +2271,22 @@
           </a:ln>
         </p:spPr>
         <p:style>
-          <a:lnRef idx="0"/>
-          <a:fillRef idx="0"/>
-          <a:effectRef idx="0"/>
+          <a:lnRef idx="0">
+            <a:scrgbClr r="0" g="0" b="0"/>
+          </a:lnRef>
+          <a:fillRef idx="0">
+            <a:scrgbClr r="0" g="0" b="0"/>
+          </a:fillRef>
+          <a:effectRef idx="0">
+            <a:scrgbClr r="0" g="0" b="0"/>
+          </a:effectRef>
           <a:fontRef idx="minor"/>
         </p:style>
         <p:txBody>
-          <a:bodyPr lIns="0" rIns="0" tIns="0" bIns="0" anchor="ctr">
+          <a:bodyPr lIns="0" tIns="0" rIns="0" bIns="0" anchor="ctr">
             <a:noAutofit/>
           </a:bodyPr>
+          <a:lstStyle/>
           <a:p>
             <a:pPr algn="ctr">
               <a:lnSpc>
@@ -1877,16 +2294,26 @@
               </a:lnSpc>
             </a:pPr>
             <a:r>
-              <a:rPr b="0" lang="de-CH" sz="3200" spc="-1" strike="noStrike">
+              <a:rPr lang="de-CH" sz="3200" b="0" strike="noStrike" spc="-1" dirty="0" err="1">
                 <a:solidFill>
-                  <a:srgbClr val="d9d9d9"/>
+                  <a:srgbClr val="D9D9D9"/>
                 </a:solidFill>
                 <a:latin typeface="Open Sans"/>
                 <a:ea typeface="DejaVu Sans"/>
               </a:rPr>
-              <a:t>BaselHack 2021</a:t>
+              <a:t>BaselHack</a:t>
             </a:r>
-            <a:endParaRPr b="0" lang="de-CH" sz="3200" spc="-1" strike="noStrike">
+            <a:r>
+              <a:rPr lang="de-CH" sz="3200" b="0" strike="noStrike" spc="-1" dirty="0">
+                <a:solidFill>
+                  <a:srgbClr val="D9D9D9"/>
+                </a:solidFill>
+                <a:latin typeface="Open Sans"/>
+                <a:ea typeface="DejaVu Sans"/>
+              </a:rPr>
+              <a:t> 2021</a:t>
+            </a:r>
+            <a:endParaRPr lang="de-CH" sz="3200" b="0" strike="noStrike" spc="-1" dirty="0">
               <a:latin typeface="Arial"/>
             </a:endParaRPr>
           </a:p>
@@ -1896,7 +2323,7 @@
                 <a:spcPct val="100000"/>
               </a:lnSpc>
             </a:pPr>
-            <a:endParaRPr b="0" lang="de-CH" sz="3200" spc="-1" strike="noStrike">
+            <a:endParaRPr lang="de-CH" sz="3200" b="0" strike="noStrike" spc="-1" dirty="0">
               <a:latin typeface="Arial"/>
             </a:endParaRPr>
           </a:p>
@@ -1907,36 +2334,16 @@
               </a:lnSpc>
             </a:pPr>
             <a:r>
-              <a:rPr b="0" lang="de-CH" sz="3200" spc="-1" strike="noStrike">
+              <a:rPr lang="en-CA" sz="3200" b="0" strike="noStrike" spc="-1" dirty="0">
                 <a:solidFill>
-                  <a:srgbClr val="d9d9d9"/>
+                  <a:srgbClr val="D9D9D9"/>
                 </a:solidFill>
                 <a:latin typeface="Open Sans"/>
                 <a:ea typeface="DejaVu Sans"/>
               </a:rPr>
-              <a:t>«Product Search with Pictures </a:t>
+              <a:t>«Easy Grocery Shopping»</a:t>
             </a:r>
-            <a:endParaRPr b="0" lang="de-CH" sz="3200" spc="-1" strike="noStrike">
-              <a:latin typeface="Arial"/>
-            </a:endParaRPr>
-          </a:p>
-          <a:p>
-            <a:pPr algn="ctr">
-              <a:lnSpc>
-                <a:spcPct val="100000"/>
-              </a:lnSpc>
-            </a:pPr>
-            <a:r>
-              <a:rPr b="0" lang="de-CH" sz="3200" spc="-1" strike="noStrike">
-                <a:solidFill>
-                  <a:srgbClr val="d9d9d9"/>
-                </a:solidFill>
-                <a:latin typeface="Open Sans"/>
-                <a:ea typeface="DejaVu Sans"/>
-              </a:rPr>
-              <a:t>using Google Vision API»</a:t>
-            </a:r>
-            <a:endParaRPr b="0" lang="de-CH" sz="3200" spc="-1" strike="noStrike">
+            <a:endParaRPr lang="en-CA" sz="3200" b="0" strike="noStrike" spc="-1" dirty="0">
               <a:latin typeface="Arial"/>
             </a:endParaRPr>
           </a:p>
@@ -1944,19 +2351,244 @@
       </p:sp>
     </p:spTree>
   </p:cSld>
-  <mc:AlternateContent>
-    <mc:Choice Requires="p14">
-      <p:transition spd="slow" p14:dur="2000"/>
-    </mc:Choice>
-    <mc:Fallback>
-      <p:transition spd="slow"/>
-    </mc:Fallback>
-  </mc:AlternateContent>
+  <p:clrMapOvr>
+    <a:masterClrMapping/>
+  </p:clrMapOvr>
 </p:sld>
 </file>
 
 <file path=ppt/slides/slide2.xml><?xml version="1.0" encoding="utf-8"?>
-<p:sld xmlns:a="http://schemas.openxmlformats.org/drawingml/2006/main" xmlns:p="http://schemas.openxmlformats.org/presentationml/2006/main" xmlns:r="http://schemas.openxmlformats.org/officeDocument/2006/relationships" xmlns:p14="http://schemas.microsoft.com/office/powerpoint/2010/main" xmlns:p15="http://schemas.microsoft.com/office/powerpoint/2012/main" xmlns:mc="http://schemas.openxmlformats.org/markup-compatibility/2006">
+<p:sld xmlns:a="http://schemas.openxmlformats.org/drawingml/2006/main" xmlns:r="http://schemas.openxmlformats.org/officeDocument/2006/relationships" xmlns:p="http://schemas.openxmlformats.org/presentationml/2006/main">
+  <p:cSld>
+    <p:bg>
+      <p:bgPr>
+        <a:solidFill>
+          <a:srgbClr val="000000"/>
+        </a:solidFill>
+        <a:effectLst/>
+      </p:bgPr>
+    </p:bg>
+    <p:spTree>
+      <p:nvGrpSpPr>
+        <p:cNvPr id="1" name=""/>
+        <p:cNvGrpSpPr/>
+        <p:nvPr/>
+      </p:nvGrpSpPr>
+      <p:grpSpPr>
+        <a:xfrm>
+          <a:off x="0" y="0"/>
+          <a:ext cx="0" cy="0"/>
+          <a:chOff x="0" y="0"/>
+          <a:chExt cx="0" cy="0"/>
+        </a:xfrm>
+      </p:grpSpPr>
+      <p:sp>
+        <p:nvSpPr>
+          <p:cNvPr id="10" name="Rectangle 9">
+            <a:extLst>
+              <a:ext uri="{FF2B5EF4-FFF2-40B4-BE49-F238E27FC236}">
+                <a16:creationId xmlns:a16="http://schemas.microsoft.com/office/drawing/2014/main" id="{71B2258F-86CA-4D4D-8270-BC05FCDEBFB3}"/>
+              </a:ext>
+              <a:ext uri="{C183D7F6-B498-43B3-948B-1728B52AA6E4}">
+                <adec:decorative xmlns:adec="http://schemas.microsoft.com/office/drawing/2017/decorative" val="1"/>
+              </a:ext>
+            </a:extLst>
+          </p:cNvPr>
+          <p:cNvSpPr>
+            <a:spLocks noGrp="1" noRot="1" noChangeAspect="1" noMove="1" noResize="1" noEditPoints="1" noAdjustHandles="1" noChangeArrowheads="1" noChangeShapeType="1" noTextEdit="1"/>
+          </p:cNvSpPr>
+          <p:nvPr>
+            <p:extLst>
+              <p:ext uri="{386F3935-93C4-4BCD-93E2-E3B085C9AB24}">
+                <p16:designElem xmlns:p16="http://schemas.microsoft.com/office/powerpoint/2015/main" val="1"/>
+              </p:ext>
+            </p:extLst>
+          </p:nvPr>
+        </p:nvSpPr>
+        <p:spPr>
+          <a:xfrm>
+            <a:off x="0" y="0"/>
+            <a:ext cx="10080625" cy="5670549"/>
+          </a:xfrm>
+          <a:prstGeom prst="rect">
+            <a:avLst/>
+          </a:prstGeom>
+          <a:solidFill>
+            <a:srgbClr val="000000"/>
+          </a:solidFill>
+          <a:ln>
+            <a:noFill/>
+          </a:ln>
+        </p:spPr>
+        <p:style>
+          <a:lnRef idx="2">
+            <a:schemeClr val="accent1">
+              <a:shade val="50000"/>
+            </a:schemeClr>
+          </a:lnRef>
+          <a:fillRef idx="1">
+            <a:schemeClr val="accent1"/>
+          </a:fillRef>
+          <a:effectRef idx="0">
+            <a:schemeClr val="accent1"/>
+          </a:effectRef>
+          <a:fontRef idx="minor">
+            <a:schemeClr val="lt1"/>
+          </a:fontRef>
+        </p:style>
+        <p:txBody>
+          <a:bodyPr rtlCol="0" anchor="ctr"/>
+          <a:lstStyle/>
+          <a:p>
+            <a:pPr algn="ctr"/>
+            <a:endParaRPr lang="en-US"/>
+          </a:p>
+        </p:txBody>
+      </p:sp>
+      <p:pic>
+        <p:nvPicPr>
+          <p:cNvPr id="5" name="Picture 4" descr="A shopping cart in a warehouse&#10;&#10;Description automatically generated with medium confidence">
+            <a:extLst>
+              <a:ext uri="{FF2B5EF4-FFF2-40B4-BE49-F238E27FC236}">
+                <a16:creationId xmlns:a16="http://schemas.microsoft.com/office/drawing/2014/main" id="{06EBF8E5-A663-46E1-B5C6-AF2DD99AC59E}"/>
+              </a:ext>
+            </a:extLst>
+          </p:cNvPr>
+          <p:cNvPicPr>
+            <a:picLocks noChangeAspect="1"/>
+          </p:cNvPicPr>
+          <p:nvPr/>
+        </p:nvPicPr>
+        <p:blipFill rotWithShape="1">
+          <a:blip r:embed="rId2">
+            <a:alphaModFix amt="50000"/>
+            <a:extLst>
+              <a:ext uri="{28A0092B-C50C-407E-A947-70E740481C1C}">
+                <a14:useLocalDpi xmlns:a14="http://schemas.microsoft.com/office/drawing/2010/main" val="0"/>
+              </a:ext>
+            </a:extLst>
+          </a:blip>
+          <a:srcRect r="2" b="15729"/>
+          <a:stretch/>
+        </p:blipFill>
+        <p:spPr>
+          <a:xfrm>
+            <a:off x="20" y="10"/>
+            <a:ext cx="10080605" cy="5670540"/>
+          </a:xfrm>
+          <a:prstGeom prst="rect">
+            <a:avLst/>
+          </a:prstGeom>
+        </p:spPr>
+      </p:pic>
+      <p:sp>
+        <p:nvSpPr>
+          <p:cNvPr id="2" name="Title 1">
+            <a:extLst>
+              <a:ext uri="{FF2B5EF4-FFF2-40B4-BE49-F238E27FC236}">
+                <a16:creationId xmlns:a16="http://schemas.microsoft.com/office/drawing/2014/main" id="{9BD79AF2-F5EC-4E59-B592-FDDCB8E82D8D}"/>
+              </a:ext>
+            </a:extLst>
+          </p:cNvPr>
+          <p:cNvSpPr>
+            <a:spLocks noGrp="1"/>
+          </p:cNvSpPr>
+          <p:nvPr>
+            <p:ph type="title"/>
+          </p:nvPr>
+        </p:nvSpPr>
+        <p:spPr>
+          <a:xfrm>
+            <a:off x="1260078" y="928027"/>
+            <a:ext cx="7560468" cy="2398298"/>
+          </a:xfrm>
+        </p:spPr>
+        <p:txBody>
+          <a:bodyPr vert="horz" lIns="91440" tIns="45720" rIns="91440" bIns="45720" rtlCol="0" anchor="b">
+            <a:normAutofit/>
+          </a:bodyPr>
+          <a:lstStyle/>
+          <a:p>
+            <a:pPr algn="ctr"/>
+            <a:r>
+              <a:rPr lang="en-US" sz="6000" dirty="0">
+                <a:solidFill>
+                  <a:srgbClr val="FFFFFF"/>
+                </a:solidFill>
+              </a:rPr>
+              <a:t>Short Sketch</a:t>
+            </a:r>
+          </a:p>
+        </p:txBody>
+      </p:sp>
+      <p:sp>
+        <p:nvSpPr>
+          <p:cNvPr id="3" name="Subtitle 2">
+            <a:extLst>
+              <a:ext uri="{FF2B5EF4-FFF2-40B4-BE49-F238E27FC236}">
+                <a16:creationId xmlns:a16="http://schemas.microsoft.com/office/drawing/2014/main" id="{8F1EB051-7C60-45AF-A98A-2EE285721D97}"/>
+              </a:ext>
+            </a:extLst>
+          </p:cNvPr>
+          <p:cNvSpPr>
+            <a:spLocks noGrp="1"/>
+          </p:cNvSpPr>
+          <p:nvPr>
+            <p:ph type="subTitle"/>
+          </p:nvPr>
+        </p:nvSpPr>
+        <p:spPr>
+          <a:xfrm>
+            <a:off x="1260078" y="3439210"/>
+            <a:ext cx="7560468" cy="908210"/>
+          </a:xfrm>
+        </p:spPr>
+        <p:txBody>
+          <a:bodyPr vert="horz" lIns="91440" tIns="45720" rIns="91440" bIns="45720" rtlCol="0">
+            <a:normAutofit/>
+          </a:bodyPr>
+          <a:lstStyle/>
+          <a:p>
+            <a:pPr marL="0" indent="0" algn="ctr">
+              <a:spcBef>
+                <a:spcPts val="1000"/>
+              </a:spcBef>
+              <a:buNone/>
+            </a:pPr>
+            <a:r>
+              <a:rPr lang="en-US" sz="2400" dirty="0">
+                <a:solidFill>
+                  <a:srgbClr val="FFFFFF"/>
+                </a:solidFill>
+              </a:rPr>
+              <a:t>Avoid to go shopping</a:t>
+            </a:r>
+            <a:endParaRPr lang="en-US" sz="2400" dirty="0">
+              <a:solidFill>
+                <a:srgbClr val="FFFFFF"/>
+              </a:solidFill>
+              <a:latin typeface="+mn-lt"/>
+              <a:ea typeface="+mn-ea"/>
+              <a:cs typeface="+mn-cs"/>
+            </a:endParaRPr>
+          </a:p>
+        </p:txBody>
+      </p:sp>
+    </p:spTree>
+    <p:extLst>
+      <p:ext uri="{BB962C8B-B14F-4D97-AF65-F5344CB8AC3E}">
+        <p14:creationId xmlns:p14="http://schemas.microsoft.com/office/powerpoint/2010/main" val="3751822194"/>
+      </p:ext>
+    </p:extLst>
+  </p:cSld>
+  <p:clrMapOvr>
+    <a:overrideClrMapping bg1="dk1" tx1="lt1" bg2="dk2" tx2="lt2" accent1="accent1" accent2="accent2" accent3="accent3" accent4="accent4" accent5="accent5" accent6="accent6" hlink="hlink" folHlink="folHlink"/>
+  </p:clrMapOvr>
+</p:sld>
+</file>
+
+<file path=ppt/slides/slide3.xml><?xml version="1.0" encoding="utf-8"?>
+<p:sld xmlns:a="http://schemas.openxmlformats.org/drawingml/2006/main" xmlns:r="http://schemas.openxmlformats.org/officeDocument/2006/relationships" xmlns:p="http://schemas.openxmlformats.org/presentationml/2006/main">
   <p:cSld>
     <p:spTree>
       <p:nvGrpSpPr>
@@ -1992,9 +2624,10 @@
           </a:ln>
         </p:spPr>
         <p:txBody>
-          <a:bodyPr lIns="0" rIns="0" tIns="0" bIns="0" anchor="ctr">
+          <a:bodyPr lIns="0" tIns="0" rIns="0" bIns="0" anchor="ctr">
             <a:noAutofit/>
           </a:bodyPr>
+          <a:lstStyle/>
           <a:p>
             <a:pPr>
               <a:lnSpc>
@@ -2002,38 +2635,89 @@
               </a:lnSpc>
             </a:pPr>
             <a:r>
-              <a:rPr b="0" lang="en-GB" sz="3200" spc="-1" strike="noStrike">
+              <a:rPr lang="en-GB" sz="3200" spc="-1" dirty="0">
                 <a:solidFill>
-                  <a:srgbClr val="f2f2f2"/>
+                  <a:srgbClr val="F2F2F2"/>
                 </a:solidFill>
                 <a:latin typeface="Open Sans SemiBold"/>
               </a:rPr>
-              <a:t>Product Search - Task</a:t>
+              <a:t>Technical implementation</a:t>
             </a:r>
-            <a:endParaRPr b="0" lang="de-DE" sz="3200" spc="-1" strike="noStrike">
-              <a:solidFill>
-                <a:srgbClr val="ffffff"/>
-              </a:solidFill>
-              <a:latin typeface="Open Sans"/>
-            </a:endParaRPr>
+            <a:endParaRPr lang="de-DE" sz="3200" b="0" strike="noStrike" spc="-1" dirty="0">
+              <a:solidFill>
+                <a:srgbClr val="FFFFFF"/>
+              </a:solidFill>
+              <a:latin typeface="Open Sans"/>
+            </a:endParaRPr>
+          </a:p>
+        </p:txBody>
+      </p:sp>
+      <p:sp>
+        <p:nvSpPr>
+          <p:cNvPr id="2" name="Rectangle 1">
+            <a:extLst>
+              <a:ext uri="{FF2B5EF4-FFF2-40B4-BE49-F238E27FC236}">
+                <a16:creationId xmlns:a16="http://schemas.microsoft.com/office/drawing/2014/main" id="{E7AD708C-BC4E-4594-97B8-E8AFE9B837C7}"/>
+              </a:ext>
+            </a:extLst>
+          </p:cNvPr>
+          <p:cNvSpPr/>
+          <p:nvPr/>
+        </p:nvSpPr>
+        <p:spPr>
+          <a:xfrm>
+            <a:off x="3766912" y="1823781"/>
+            <a:ext cx="2546800" cy="2022987"/>
+          </a:xfrm>
+          <a:prstGeom prst="rect">
+            <a:avLst/>
+          </a:prstGeom>
+        </p:spPr>
+        <p:style>
+          <a:lnRef idx="2">
+            <a:schemeClr val="accent5">
+              <a:shade val="50000"/>
+            </a:schemeClr>
+          </a:lnRef>
+          <a:fillRef idx="1">
+            <a:schemeClr val="accent5"/>
+          </a:fillRef>
+          <a:effectRef idx="0">
+            <a:schemeClr val="accent5"/>
+          </a:effectRef>
+          <a:fontRef idx="minor">
+            <a:schemeClr val="lt1"/>
+          </a:fontRef>
+        </p:style>
+        <p:txBody>
+          <a:bodyPr rtlCol="0" anchor="ctr"/>
+          <a:lstStyle/>
+          <a:p>
+            <a:pPr algn="ctr"/>
+            <a:r>
+              <a:rPr lang="en-CA" dirty="0"/>
+              <a:t>Cloud Vision API</a:t>
+            </a:r>
+            <a:br>
+              <a:rPr lang="en-CA" dirty="0"/>
+            </a:br>
+            <a:r>
+              <a:rPr lang="en-CA" dirty="0"/>
+              <a:t>Google</a:t>
+            </a:r>
           </a:p>
         </p:txBody>
       </p:sp>
     </p:spTree>
   </p:cSld>
-  <mc:AlternateContent>
-    <mc:Choice Requires="p14">
-      <p:transition spd="slow" p14:dur="2000"/>
-    </mc:Choice>
-    <mc:Fallback>
-      <p:transition spd="slow"/>
-    </mc:Fallback>
-  </mc:AlternateContent>
+  <p:clrMapOvr>
+    <a:masterClrMapping/>
+  </p:clrMapOvr>
 </p:sld>
 </file>
 
-<file path=ppt/slides/slide3.xml><?xml version="1.0" encoding="utf-8"?>
-<p:sld xmlns:a="http://schemas.openxmlformats.org/drawingml/2006/main" xmlns:p="http://schemas.openxmlformats.org/presentationml/2006/main" xmlns:r="http://schemas.openxmlformats.org/officeDocument/2006/relationships" xmlns:p14="http://schemas.microsoft.com/office/powerpoint/2010/main" xmlns:p15="http://schemas.microsoft.com/office/powerpoint/2012/main" xmlns:mc="http://schemas.openxmlformats.org/markup-compatibility/2006">
+<file path=ppt/slides/slide4.xml><?xml version="1.0" encoding="utf-8"?>
+<p:sld xmlns:a="http://schemas.openxmlformats.org/drawingml/2006/main" xmlns:r="http://schemas.openxmlformats.org/officeDocument/2006/relationships" xmlns:p="http://schemas.openxmlformats.org/presentationml/2006/main">
   <p:cSld>
     <p:spTree>
       <p:nvGrpSpPr>
@@ -2069,9 +2753,10 @@
           </a:ln>
         </p:spPr>
         <p:txBody>
-          <a:bodyPr lIns="0" rIns="0" tIns="0" bIns="0" anchor="ctr">
+          <a:bodyPr lIns="0" tIns="0" rIns="0" bIns="0" anchor="ctr">
             <a:noAutofit/>
           </a:bodyPr>
+          <a:lstStyle/>
           <a:p>
             <a:pPr>
               <a:lnSpc>
@@ -2079,17 +2764,17 @@
               </a:lnSpc>
             </a:pPr>
             <a:r>
-              <a:rPr b="0" lang="en-GB" sz="3200" spc="-1" strike="noStrike">
+              <a:rPr lang="en-GB" sz="3200" b="0" strike="noStrike" spc="-1">
                 <a:solidFill>
-                  <a:srgbClr val="f2f2f2"/>
+                  <a:srgbClr val="F2F2F2"/>
                 </a:solidFill>
                 <a:latin typeface="Open Sans SemiBold"/>
               </a:rPr>
               <a:t>Product Search - Task</a:t>
             </a:r>
-            <a:endParaRPr b="0" lang="de-DE" sz="3200" spc="-1" strike="noStrike">
-              <a:solidFill>
-                <a:srgbClr val="ffffff"/>
+            <a:endParaRPr lang="de-DE" sz="3200" b="0" strike="noStrike" spc="-1">
+              <a:solidFill>
+                <a:srgbClr val="FFFFFF"/>
               </a:solidFill>
               <a:latin typeface="Open Sans"/>
             </a:endParaRPr>
@@ -2116,9 +2801,10 @@
           </a:ln>
         </p:spPr>
         <p:txBody>
-          <a:bodyPr lIns="0" rIns="0" tIns="0" bIns="0">
+          <a:bodyPr lIns="0" tIns="0" rIns="0" bIns="0">
             <a:noAutofit/>
           </a:bodyPr>
+          <a:lstStyle/>
           <a:p>
             <a:pPr>
               <a:lnSpc>
@@ -2126,17 +2812,17 @@
               </a:lnSpc>
             </a:pPr>
             <a:r>
-              <a:rPr b="0" lang="en-GB" sz="1800" spc="-1" strike="noStrike">
+              <a:rPr lang="en-GB" sz="1800" b="0" strike="noStrike" spc="-1">
                 <a:solidFill>
-                  <a:srgbClr val="ffffff"/>
+                  <a:srgbClr val="FFFFFF"/>
                 </a:solidFill>
                 <a:latin typeface="Open Sans"/>
               </a:rPr>
               <a:t>I have a web shop with many pictures of my product:</a:t>
             </a:r>
-            <a:endParaRPr b="0" lang="de-DE" sz="1800" spc="-1" strike="noStrike">
-              <a:solidFill>
-                <a:srgbClr val="d9d9d9"/>
+            <a:endParaRPr lang="de-DE" sz="1800" b="0" strike="noStrike" spc="-1">
+              <a:solidFill>
+                <a:srgbClr val="D9D9D9"/>
               </a:solidFill>
               <a:latin typeface="Open Sans"/>
             </a:endParaRPr>
@@ -2147,9 +2833,9 @@
                 <a:spcPct val="100000"/>
               </a:lnSpc>
             </a:pPr>
-            <a:endParaRPr b="0" lang="de-DE" sz="1800" spc="-1" strike="noStrike">
-              <a:solidFill>
-                <a:srgbClr val="d9d9d9"/>
+            <a:endParaRPr lang="de-DE" sz="1800" b="0" strike="noStrike" spc="-1">
+              <a:solidFill>
+                <a:srgbClr val="D9D9D9"/>
               </a:solidFill>
               <a:latin typeface="Open Sans"/>
             </a:endParaRPr>
@@ -2160,9 +2846,9 @@
                 <a:spcPct val="100000"/>
               </a:lnSpc>
             </a:pPr>
-            <a:endParaRPr b="0" lang="de-DE" sz="1800" spc="-1" strike="noStrike">
-              <a:solidFill>
-                <a:srgbClr val="d9d9d9"/>
+            <a:endParaRPr lang="de-DE" sz="1800" b="0" strike="noStrike" spc="-1">
+              <a:solidFill>
+                <a:srgbClr val="D9D9D9"/>
               </a:solidFill>
               <a:latin typeface="Open Sans"/>
             </a:endParaRPr>
@@ -2171,30 +2857,7 @@
       </p:sp>
       <p:pic>
         <p:nvPicPr>
-          <p:cNvPr id="43" name="Picture 2" descr=""/>
-          <p:cNvPicPr/>
-          <p:nvPr/>
-        </p:nvPicPr>
-        <p:blipFill>
-          <a:blip r:embed="rId1"/>
-          <a:stretch/>
-        </p:blipFill>
-        <p:spPr>
-          <a:xfrm>
-            <a:off x="647640" y="2475000"/>
-            <a:ext cx="2195640" cy="2519280"/>
-          </a:xfrm>
-          <a:prstGeom prst="rect">
-            <a:avLst/>
-          </a:prstGeom>
-          <a:ln w="9525">
-            <a:noFill/>
-          </a:ln>
-        </p:spPr>
-      </p:pic>
-      <p:pic>
-        <p:nvPicPr>
-          <p:cNvPr id="44" name="Picture 3" descr=""/>
+          <p:cNvPr id="43" name="Picture 2"/>
           <p:cNvPicPr/>
           <p:nvPr/>
         </p:nvPicPr>
@@ -2204,8 +2867,8 @@
         </p:blipFill>
         <p:spPr>
           <a:xfrm>
-            <a:off x="3599640" y="2475000"/>
-            <a:ext cx="2159640" cy="2519280"/>
+            <a:off x="647640" y="2475000"/>
+            <a:ext cx="2195640" cy="2519280"/>
           </a:xfrm>
           <a:prstGeom prst="rect">
             <a:avLst/>
@@ -2217,7 +2880,7 @@
       </p:pic>
       <p:pic>
         <p:nvPicPr>
-          <p:cNvPr id="45" name="Picture 4" descr=""/>
+          <p:cNvPr id="44" name="Picture 3"/>
           <p:cNvPicPr/>
           <p:nvPr/>
         </p:nvPicPr>
@@ -2227,8 +2890,8 @@
         </p:blipFill>
         <p:spPr>
           <a:xfrm>
-            <a:off x="6479640" y="2475000"/>
-            <a:ext cx="1924200" cy="2519280"/>
+            <a:off x="3599640" y="2475000"/>
+            <a:ext cx="2159640" cy="2519280"/>
           </a:xfrm>
           <a:prstGeom prst="rect">
             <a:avLst/>
@@ -2238,21 +2901,39 @@
           </a:ln>
         </p:spPr>
       </p:pic>
+      <p:pic>
+        <p:nvPicPr>
+          <p:cNvPr id="45" name="Picture 4"/>
+          <p:cNvPicPr/>
+          <p:nvPr/>
+        </p:nvPicPr>
+        <p:blipFill>
+          <a:blip r:embed="rId4"/>
+          <a:stretch/>
+        </p:blipFill>
+        <p:spPr>
+          <a:xfrm>
+            <a:off x="6479640" y="2475000"/>
+            <a:ext cx="1924200" cy="2519280"/>
+          </a:xfrm>
+          <a:prstGeom prst="rect">
+            <a:avLst/>
+          </a:prstGeom>
+          <a:ln w="9525">
+            <a:noFill/>
+          </a:ln>
+        </p:spPr>
+      </p:pic>
     </p:spTree>
   </p:cSld>
-  <mc:AlternateContent>
-    <mc:Choice Requires="p14">
-      <p:transition spd="slow" p14:dur="2000"/>
-    </mc:Choice>
-    <mc:Fallback>
-      <p:transition spd="slow"/>
-    </mc:Fallback>
-  </mc:AlternateContent>
+  <p:clrMapOvr>
+    <a:masterClrMapping/>
+  </p:clrMapOvr>
 </p:sld>
 </file>
 
-<file path=ppt/slides/slide4.xml><?xml version="1.0" encoding="utf-8"?>
-<p:sld xmlns:a="http://schemas.openxmlformats.org/drawingml/2006/main" xmlns:p="http://schemas.openxmlformats.org/presentationml/2006/main" xmlns:r="http://schemas.openxmlformats.org/officeDocument/2006/relationships" xmlns:p14="http://schemas.microsoft.com/office/powerpoint/2010/main" xmlns:p15="http://schemas.microsoft.com/office/powerpoint/2012/main" xmlns:mc="http://schemas.openxmlformats.org/markup-compatibility/2006">
+<file path=ppt/slides/slide5.xml><?xml version="1.0" encoding="utf-8"?>
+<p:sld xmlns:a="http://schemas.openxmlformats.org/drawingml/2006/main" xmlns:r="http://schemas.openxmlformats.org/officeDocument/2006/relationships" xmlns:p="http://schemas.openxmlformats.org/presentationml/2006/main">
   <p:cSld>
     <p:spTree>
       <p:nvGrpSpPr>
@@ -2288,9 +2969,10 @@
           </a:ln>
         </p:spPr>
         <p:txBody>
-          <a:bodyPr lIns="0" rIns="0" tIns="0" bIns="0" anchor="ctr">
+          <a:bodyPr lIns="0" tIns="0" rIns="0" bIns="0" anchor="ctr">
             <a:noAutofit/>
           </a:bodyPr>
+          <a:lstStyle/>
           <a:p>
             <a:pPr>
               <a:lnSpc>
@@ -2298,17 +2980,17 @@
               </a:lnSpc>
             </a:pPr>
             <a:r>
-              <a:rPr b="0" lang="en-GB" sz="3200" spc="-1" strike="noStrike">
+              <a:rPr lang="en-GB" sz="3200" b="0" strike="noStrike" spc="-1">
                 <a:solidFill>
-                  <a:srgbClr val="f2f2f2"/>
+                  <a:srgbClr val="F2F2F2"/>
                 </a:solidFill>
                 <a:latin typeface="Open Sans SemiBold"/>
               </a:rPr>
               <a:t>Product Search - Task</a:t>
             </a:r>
-            <a:endParaRPr b="0" lang="de-DE" sz="3200" spc="-1" strike="noStrike">
-              <a:solidFill>
-                <a:srgbClr val="ffffff"/>
+            <a:endParaRPr lang="de-DE" sz="3200" b="0" strike="noStrike" spc="-1">
+              <a:solidFill>
+                <a:srgbClr val="FFFFFF"/>
               </a:solidFill>
               <a:latin typeface="Open Sans"/>
             </a:endParaRPr>
@@ -2335,9 +3017,10 @@
           </a:ln>
         </p:spPr>
         <p:txBody>
-          <a:bodyPr lIns="0" rIns="0" tIns="0" bIns="0">
+          <a:bodyPr lIns="0" tIns="0" rIns="0" bIns="0">
             <a:noAutofit/>
           </a:bodyPr>
+          <a:lstStyle/>
           <a:p>
             <a:pPr>
               <a:lnSpc>
@@ -2345,17 +3028,17 @@
               </a:lnSpc>
             </a:pPr>
             <a:r>
-              <a:rPr b="0" lang="en-GB" sz="1800" spc="-1" strike="noStrike">
+              <a:rPr lang="en-GB" sz="1800" b="0" strike="noStrike" spc="-1">
                 <a:solidFill>
-                  <a:srgbClr val="ffffff"/>
+                  <a:srgbClr val="FFFFFF"/>
                 </a:solidFill>
                 <a:latin typeface="Open Sans"/>
               </a:rPr>
               <a:t>I send my pictures to Google Cloud Vision API Product Search.</a:t>
             </a:r>
-            <a:endParaRPr b="0" lang="de-DE" sz="1800" spc="-1" strike="noStrike">
-              <a:solidFill>
-                <a:srgbClr val="d9d9d9"/>
+            <a:endParaRPr lang="de-DE" sz="1800" b="0" strike="noStrike" spc="-1">
+              <a:solidFill>
+                <a:srgbClr val="D9D9D9"/>
               </a:solidFill>
               <a:latin typeface="Open Sans"/>
             </a:endParaRPr>
@@ -2366,9 +3049,9 @@
                 <a:spcPct val="100000"/>
               </a:lnSpc>
             </a:pPr>
-            <a:endParaRPr b="0" lang="de-DE" sz="1800" spc="-1" strike="noStrike">
-              <a:solidFill>
-                <a:srgbClr val="d9d9d9"/>
+            <a:endParaRPr lang="de-DE" sz="1800" b="0" strike="noStrike" spc="-1">
+              <a:solidFill>
+                <a:srgbClr val="D9D9D9"/>
               </a:solidFill>
               <a:latin typeface="Open Sans"/>
             </a:endParaRPr>
@@ -2380,17 +3063,17 @@
               </a:lnSpc>
             </a:pPr>
             <a:r>
-              <a:rPr b="0" lang="en-GB" sz="1800" spc="-1" strike="noStrike">
+              <a:rPr lang="en-GB" sz="1800" b="0" strike="noStrike" spc="-1">
                 <a:solidFill>
-                  <a:srgbClr val="ffffff"/>
+                  <a:srgbClr val="FFFFFF"/>
                 </a:solidFill>
                 <a:latin typeface="Open Sans"/>
               </a:rPr>
               <a:t>I label them with tags and a link to my web shop and train the system.</a:t>
             </a:r>
-            <a:endParaRPr b="0" lang="de-DE" sz="1800" spc="-1" strike="noStrike">
-              <a:solidFill>
-                <a:srgbClr val="d9d9d9"/>
+            <a:endParaRPr lang="de-DE" sz="1800" b="0" strike="noStrike" spc="-1">
+              <a:solidFill>
+                <a:srgbClr val="D9D9D9"/>
               </a:solidFill>
               <a:latin typeface="Open Sans"/>
             </a:endParaRPr>
@@ -2401,9 +3084,9 @@
                 <a:spcPct val="100000"/>
               </a:lnSpc>
             </a:pPr>
-            <a:endParaRPr b="0" lang="de-DE" sz="1800" spc="-1" strike="noStrike">
-              <a:solidFill>
-                <a:srgbClr val="d9d9d9"/>
+            <a:endParaRPr lang="de-DE" sz="1800" b="0" strike="noStrike" spc="-1">
+              <a:solidFill>
+                <a:srgbClr val="D9D9D9"/>
               </a:solidFill>
               <a:latin typeface="Open Sans"/>
             </a:endParaRPr>
@@ -2414,9 +3097,9 @@
                 <a:spcPct val="100000"/>
               </a:lnSpc>
             </a:pPr>
-            <a:endParaRPr b="0" lang="de-DE" sz="1800" spc="-1" strike="noStrike">
-              <a:solidFill>
-                <a:srgbClr val="d9d9d9"/>
+            <a:endParaRPr lang="de-DE" sz="1800" b="0" strike="noStrike" spc="-1">
+              <a:solidFill>
+                <a:srgbClr val="D9D9D9"/>
               </a:solidFill>
               <a:latin typeface="Open Sans"/>
             </a:endParaRPr>
@@ -2425,19 +3108,14 @@
       </p:sp>
     </p:spTree>
   </p:cSld>
-  <mc:AlternateContent>
-    <mc:Choice Requires="p14">
-      <p:transition spd="slow" p14:dur="2000"/>
-    </mc:Choice>
-    <mc:Fallback>
-      <p:transition spd="slow"/>
-    </mc:Fallback>
-  </mc:AlternateContent>
+  <p:clrMapOvr>
+    <a:masterClrMapping/>
+  </p:clrMapOvr>
 </p:sld>
 </file>
 
-<file path=ppt/slides/slide5.xml><?xml version="1.0" encoding="utf-8"?>
-<p:sld xmlns:a="http://schemas.openxmlformats.org/drawingml/2006/main" xmlns:p="http://schemas.openxmlformats.org/presentationml/2006/main" xmlns:r="http://schemas.openxmlformats.org/officeDocument/2006/relationships" xmlns:p14="http://schemas.microsoft.com/office/powerpoint/2010/main" xmlns:p15="http://schemas.microsoft.com/office/powerpoint/2012/main" xmlns:mc="http://schemas.openxmlformats.org/markup-compatibility/2006">
+<file path=ppt/slides/slide6.xml><?xml version="1.0" encoding="utf-8"?>
+<p:sld xmlns:a="http://schemas.openxmlformats.org/drawingml/2006/main" xmlns:r="http://schemas.openxmlformats.org/officeDocument/2006/relationships" xmlns:p="http://schemas.openxmlformats.org/presentationml/2006/main">
   <p:cSld>
     <p:spTree>
       <p:nvGrpSpPr>
@@ -2473,9 +3151,10 @@
           </a:ln>
         </p:spPr>
         <p:txBody>
-          <a:bodyPr lIns="0" rIns="0" tIns="0" bIns="0" anchor="ctr">
+          <a:bodyPr lIns="0" tIns="0" rIns="0" bIns="0" anchor="ctr">
             <a:noAutofit/>
           </a:bodyPr>
+          <a:lstStyle/>
           <a:p>
             <a:pPr>
               <a:lnSpc>
@@ -2483,17 +3162,17 @@
               </a:lnSpc>
             </a:pPr>
             <a:r>
-              <a:rPr b="0" lang="en-GB" sz="3200" spc="-1" strike="noStrike">
+              <a:rPr lang="en-GB" sz="3200" b="0" strike="noStrike" spc="-1">
                 <a:solidFill>
-                  <a:srgbClr val="f2f2f2"/>
+                  <a:srgbClr val="F2F2F2"/>
                 </a:solidFill>
                 <a:latin typeface="Open Sans SemiBold"/>
               </a:rPr>
               <a:t>Product Search - Task</a:t>
             </a:r>
-            <a:endParaRPr b="0" lang="de-DE" sz="3200" spc="-1" strike="noStrike">
-              <a:solidFill>
-                <a:srgbClr val="ffffff"/>
+            <a:endParaRPr lang="de-DE" sz="3200" b="0" strike="noStrike" spc="-1">
+              <a:solidFill>
+                <a:srgbClr val="FFFFFF"/>
               </a:solidFill>
               <a:latin typeface="Open Sans"/>
             </a:endParaRPr>
@@ -2520,9 +3199,10 @@
           </a:ln>
         </p:spPr>
         <p:txBody>
-          <a:bodyPr lIns="0" rIns="0" tIns="0" bIns="0">
+          <a:bodyPr lIns="0" tIns="0" rIns="0" bIns="0">
             <a:noAutofit/>
           </a:bodyPr>
+          <a:lstStyle/>
           <a:p>
             <a:pPr>
               <a:lnSpc>
@@ -2530,17 +3210,17 @@
               </a:lnSpc>
             </a:pPr>
             <a:r>
-              <a:rPr b="0" lang="en-GB" sz="1800" spc="-1" strike="noStrike">
+              <a:rPr lang="en-GB" sz="1800" b="0" strike="noStrike" spc="-1">
                 <a:solidFill>
-                  <a:srgbClr val="ffffff"/>
+                  <a:srgbClr val="FFFFFF"/>
                 </a:solidFill>
                 <a:latin typeface="Open Sans"/>
               </a:rPr>
               <a:t>If a user takes a picture of a product, the application can show the correct product in the web shop.</a:t>
             </a:r>
-            <a:endParaRPr b="0" lang="de-DE" sz="1800" spc="-1" strike="noStrike">
-              <a:solidFill>
-                <a:srgbClr val="d9d9d9"/>
+            <a:endParaRPr lang="de-DE" sz="1800" b="0" strike="noStrike" spc="-1">
+              <a:solidFill>
+                <a:srgbClr val="D9D9D9"/>
               </a:solidFill>
               <a:latin typeface="Open Sans"/>
             </a:endParaRPr>
@@ -2551,9 +3231,9 @@
                 <a:spcPct val="100000"/>
               </a:lnSpc>
             </a:pPr>
-            <a:endParaRPr b="0" lang="de-DE" sz="1800" spc="-1" strike="noStrike">
-              <a:solidFill>
-                <a:srgbClr val="d9d9d9"/>
+            <a:endParaRPr lang="de-DE" sz="1800" b="0" strike="noStrike" spc="-1">
+              <a:solidFill>
+                <a:srgbClr val="D9D9D9"/>
               </a:solidFill>
               <a:latin typeface="Open Sans"/>
             </a:endParaRPr>
@@ -2564,9 +3244,9 @@
                 <a:spcPct val="100000"/>
               </a:lnSpc>
             </a:pPr>
-            <a:endParaRPr b="0" lang="de-DE" sz="1800" spc="-1" strike="noStrike">
-              <a:solidFill>
-                <a:srgbClr val="d9d9d9"/>
+            <a:endParaRPr lang="de-DE" sz="1800" b="0" strike="noStrike" spc="-1">
+              <a:solidFill>
+                <a:srgbClr val="D9D9D9"/>
               </a:solidFill>
               <a:latin typeface="Open Sans"/>
             </a:endParaRPr>
@@ -2578,17 +3258,17 @@
               </a:lnSpc>
             </a:pPr>
             <a:r>
-              <a:rPr b="0" lang="en-GB" sz="1800" spc="-1" strike="noStrike">
+              <a:rPr lang="en-GB" sz="1800" b="0" strike="noStrike" spc="-1">
                 <a:solidFill>
-                  <a:srgbClr val="ffffff"/>
+                  <a:srgbClr val="FFFFFF"/>
                 </a:solidFill>
                 <a:latin typeface="Open Sans"/>
               </a:rPr>
               <a:t>(example image)</a:t>
             </a:r>
-            <a:endParaRPr b="0" lang="de-DE" sz="1800" spc="-1" strike="noStrike">
-              <a:solidFill>
-                <a:srgbClr val="d9d9d9"/>
+            <a:endParaRPr lang="de-DE" sz="1800" b="0" strike="noStrike" spc="-1">
+              <a:solidFill>
+                <a:srgbClr val="D9D9D9"/>
               </a:solidFill>
               <a:latin typeface="Open Sans"/>
             </a:endParaRPr>
@@ -2599,9 +3279,9 @@
                 <a:spcPct val="100000"/>
               </a:lnSpc>
             </a:pPr>
-            <a:endParaRPr b="0" lang="de-DE" sz="1800" spc="-1" strike="noStrike">
-              <a:solidFill>
-                <a:srgbClr val="d9d9d9"/>
+            <a:endParaRPr lang="de-DE" sz="1800" b="0" strike="noStrike" spc="-1">
+              <a:solidFill>
+                <a:srgbClr val="D9D9D9"/>
               </a:solidFill>
               <a:latin typeface="Open Sans"/>
             </a:endParaRPr>
@@ -2612,9 +3292,9 @@
                 <a:spcPct val="100000"/>
               </a:lnSpc>
             </a:pPr>
-            <a:endParaRPr b="0" lang="de-DE" sz="1800" spc="-1" strike="noStrike">
-              <a:solidFill>
-                <a:srgbClr val="d9d9d9"/>
+            <a:endParaRPr lang="de-DE" sz="1800" b="0" strike="noStrike" spc="-1">
+              <a:solidFill>
+                <a:srgbClr val="D9D9D9"/>
               </a:solidFill>
               <a:latin typeface="Open Sans"/>
             </a:endParaRPr>
@@ -2623,19 +3303,14 @@
       </p:sp>
     </p:spTree>
   </p:cSld>
-  <mc:AlternateContent>
-    <mc:Choice Requires="p14">
-      <p:transition spd="slow" p14:dur="2000"/>
-    </mc:Choice>
-    <mc:Fallback>
-      <p:transition spd="slow"/>
-    </mc:Fallback>
-  </mc:AlternateContent>
+  <p:clrMapOvr>
+    <a:masterClrMapping/>
+  </p:clrMapOvr>
 </p:sld>
 </file>
 
-<file path=ppt/slides/slide6.xml><?xml version="1.0" encoding="utf-8"?>
-<p:sld xmlns:a="http://schemas.openxmlformats.org/drawingml/2006/main" xmlns:p="http://schemas.openxmlformats.org/presentationml/2006/main" xmlns:r="http://schemas.openxmlformats.org/officeDocument/2006/relationships" xmlns:p14="http://schemas.microsoft.com/office/powerpoint/2010/main" xmlns:p15="http://schemas.microsoft.com/office/powerpoint/2012/main" xmlns:mc="http://schemas.openxmlformats.org/markup-compatibility/2006">
+<file path=ppt/slides/slide7.xml><?xml version="1.0" encoding="utf-8"?>
+<p:sld xmlns:a="http://schemas.openxmlformats.org/drawingml/2006/main" xmlns:r="http://schemas.openxmlformats.org/officeDocument/2006/relationships" xmlns:p="http://schemas.openxmlformats.org/presentationml/2006/main">
   <p:cSld>
     <p:spTree>
       <p:nvGrpSpPr>
@@ -2671,9 +3346,10 @@
           </a:ln>
         </p:spPr>
         <p:txBody>
-          <a:bodyPr lIns="0" rIns="0" tIns="0" bIns="0" anchor="ctr">
+          <a:bodyPr lIns="0" tIns="0" rIns="0" bIns="0" anchor="ctr">
             <a:noAutofit/>
           </a:bodyPr>
+          <a:lstStyle/>
           <a:p>
             <a:pPr>
               <a:lnSpc>
@@ -2681,17 +3357,17 @@
               </a:lnSpc>
             </a:pPr>
             <a:r>
-              <a:rPr b="0" lang="en-GB" sz="3200" spc="-1" strike="noStrike">
+              <a:rPr lang="en-GB" sz="3200" b="0" strike="noStrike" spc="-1">
                 <a:solidFill>
-                  <a:srgbClr val="f2f2f2"/>
+                  <a:srgbClr val="F2F2F2"/>
                 </a:solidFill>
                 <a:latin typeface="Open Sans SemiBold"/>
               </a:rPr>
               <a:t>Product Search - Demo</a:t>
             </a:r>
-            <a:endParaRPr b="0" lang="de-DE" sz="3200" spc="-1" strike="noStrike">
-              <a:solidFill>
-                <a:srgbClr val="ffffff"/>
+            <a:endParaRPr lang="de-DE" sz="3200" b="0" strike="noStrike" spc="-1">
+              <a:solidFill>
+                <a:srgbClr val="FFFFFF"/>
               </a:solidFill>
               <a:latin typeface="Open Sans"/>
             </a:endParaRPr>
@@ -2718,9 +3394,10 @@
           </a:ln>
         </p:spPr>
         <p:txBody>
-          <a:bodyPr lIns="0" rIns="0" tIns="0" bIns="0">
+          <a:bodyPr lIns="0" tIns="0" rIns="0" bIns="0">
             <a:noAutofit/>
           </a:bodyPr>
+          <a:lstStyle/>
           <a:p>
             <a:pPr>
               <a:lnSpc>
@@ -2728,17 +3405,17 @@
               </a:lnSpc>
             </a:pPr>
             <a:r>
-              <a:rPr b="0" lang="en-GB" sz="1800" spc="-1" strike="noStrike">
+              <a:rPr lang="en-GB" sz="1800" b="0" strike="noStrike" spc="-1">
                 <a:solidFill>
-                  <a:srgbClr val="ffffff"/>
+                  <a:srgbClr val="FFFFFF"/>
                 </a:solidFill>
                 <a:latin typeface="Open Sans"/>
               </a:rPr>
               <a:t>Demo application ...</a:t>
             </a:r>
-            <a:endParaRPr b="0" lang="de-DE" sz="1800" spc="-1" strike="noStrike">
-              <a:solidFill>
-                <a:srgbClr val="d9d9d9"/>
+            <a:endParaRPr lang="de-DE" sz="1800" b="0" strike="noStrike" spc="-1">
+              <a:solidFill>
+                <a:srgbClr val="D9D9D9"/>
               </a:solidFill>
               <a:latin typeface="Open Sans"/>
             </a:endParaRPr>
@@ -2749,9 +3426,9 @@
                 <a:spcPct val="100000"/>
               </a:lnSpc>
             </a:pPr>
-            <a:endParaRPr b="0" lang="de-DE" sz="1800" spc="-1" strike="noStrike">
-              <a:solidFill>
-                <a:srgbClr val="d9d9d9"/>
+            <a:endParaRPr lang="de-DE" sz="1800" b="0" strike="noStrike" spc="-1">
+              <a:solidFill>
+                <a:srgbClr val="D9D9D9"/>
               </a:solidFill>
               <a:latin typeface="Open Sans"/>
             </a:endParaRPr>
@@ -2762,9 +3439,9 @@
                 <a:spcPct val="100000"/>
               </a:lnSpc>
             </a:pPr>
-            <a:endParaRPr b="0" lang="de-DE" sz="1800" spc="-1" strike="noStrike">
-              <a:solidFill>
-                <a:srgbClr val="d9d9d9"/>
+            <a:endParaRPr lang="de-DE" sz="1800" b="0" strike="noStrike" spc="-1">
+              <a:solidFill>
+                <a:srgbClr val="D9D9D9"/>
               </a:solidFill>
               <a:latin typeface="Open Sans"/>
             </a:endParaRPr>
@@ -2773,19 +3450,14 @@
       </p:sp>
     </p:spTree>
   </p:cSld>
-  <mc:AlternateContent>
-    <mc:Choice Requires="p14">
-      <p:transition spd="slow" p14:dur="2000"/>
-    </mc:Choice>
-    <mc:Fallback>
-      <p:transition spd="slow"/>
-    </mc:Fallback>
-  </mc:AlternateContent>
+  <p:clrMapOvr>
+    <a:masterClrMapping/>
+  </p:clrMapOvr>
 </p:sld>
 </file>
 
-<file path=ppt/slides/slide7.xml><?xml version="1.0" encoding="utf-8"?>
-<p:sld xmlns:a="http://schemas.openxmlformats.org/drawingml/2006/main" xmlns:p="http://schemas.openxmlformats.org/presentationml/2006/main" xmlns:r="http://schemas.openxmlformats.org/officeDocument/2006/relationships" xmlns:p14="http://schemas.microsoft.com/office/powerpoint/2010/main" xmlns:p15="http://schemas.microsoft.com/office/powerpoint/2012/main" xmlns:mc="http://schemas.openxmlformats.org/markup-compatibility/2006">
+<file path=ppt/slides/slide8.xml><?xml version="1.0" encoding="utf-8"?>
+<p:sld xmlns:a="http://schemas.openxmlformats.org/drawingml/2006/main" xmlns:r="http://schemas.openxmlformats.org/officeDocument/2006/relationships" xmlns:p="http://schemas.openxmlformats.org/presentationml/2006/main">
   <p:cSld>
     <p:spTree>
       <p:nvGrpSpPr>
@@ -2821,9 +3493,10 @@
           </a:ln>
         </p:spPr>
         <p:txBody>
-          <a:bodyPr lIns="0" rIns="0" tIns="0" bIns="0" anchor="ctr">
+          <a:bodyPr lIns="0" tIns="0" rIns="0" bIns="0" anchor="ctr">
             <a:noAutofit/>
           </a:bodyPr>
+          <a:lstStyle/>
           <a:p>
             <a:pPr>
               <a:lnSpc>
@@ -2831,17 +3504,17 @@
               </a:lnSpc>
             </a:pPr>
             <a:r>
-              <a:rPr b="0" lang="en-GB" sz="3200" spc="-1" strike="noStrike">
+              <a:rPr lang="en-GB" sz="3200" b="0" strike="noStrike" spc="-1">
                 <a:solidFill>
-                  <a:srgbClr val="f2f2f2"/>
+                  <a:srgbClr val="F2F2F2"/>
                 </a:solidFill>
                 <a:latin typeface="Open Sans SemiBold"/>
               </a:rPr>
               <a:t>Product Search - Conclusion</a:t>
             </a:r>
-            <a:endParaRPr b="0" lang="de-DE" sz="3200" spc="-1" strike="noStrike">
-              <a:solidFill>
-                <a:srgbClr val="ffffff"/>
+            <a:endParaRPr lang="de-DE" sz="3200" b="0" strike="noStrike" spc="-1">
+              <a:solidFill>
+                <a:srgbClr val="FFFFFF"/>
               </a:solidFill>
               <a:latin typeface="Open Sans"/>
             </a:endParaRPr>
@@ -2868,9 +3541,10 @@
           </a:ln>
         </p:spPr>
         <p:txBody>
-          <a:bodyPr lIns="0" rIns="0" tIns="0" bIns="0">
+          <a:bodyPr lIns="0" tIns="0" rIns="0" bIns="0">
             <a:noAutofit/>
           </a:bodyPr>
+          <a:lstStyle/>
           <a:p>
             <a:pPr>
               <a:lnSpc>
@@ -2878,17 +3552,17 @@
               </a:lnSpc>
             </a:pPr>
             <a:r>
-              <a:rPr b="0" lang="en-GB" sz="1800" spc="-1" strike="noStrike">
+              <a:rPr lang="en-GB" sz="1800" b="0" strike="noStrike" spc="-1">
                 <a:solidFill>
-                  <a:srgbClr val="ffffff"/>
+                  <a:srgbClr val="FFFFFF"/>
                 </a:solidFill>
                 <a:latin typeface="Open Sans"/>
               </a:rPr>
               <a:t>Lessons learned ... </a:t>
             </a:r>
-            <a:endParaRPr b="0" lang="de-DE" sz="1800" spc="-1" strike="noStrike">
-              <a:solidFill>
-                <a:srgbClr val="d9d9d9"/>
+            <a:endParaRPr lang="de-DE" sz="1800" b="0" strike="noStrike" spc="-1">
+              <a:solidFill>
+                <a:srgbClr val="D9D9D9"/>
               </a:solidFill>
               <a:latin typeface="Open Sans"/>
             </a:endParaRPr>
@@ -2897,14 +3571,9 @@
       </p:sp>
     </p:spTree>
   </p:cSld>
-  <mc:AlternateContent>
-    <mc:Choice Requires="p14">
-      <p:transition spd="slow" p14:dur="2000"/>
-    </mc:Choice>
-    <mc:Fallback>
-      <p:transition spd="slow"/>
-    </mc:Fallback>
-  </mc:AlternateContent>
+  <p:clrMapOvr>
+    <a:masterClrMapping/>
+  </p:clrMapOvr>
 </p:sld>
 </file>
 
@@ -2919,31 +3588,31 @@
         <a:sysClr val="window" lastClr="FFFFFF"/>
       </a:lt1>
       <a:dk2>
-        <a:srgbClr val="1f497d"/>
+        <a:srgbClr val="1F497D"/>
       </a:dk2>
       <a:lt2>
-        <a:srgbClr val="eeece1"/>
+        <a:srgbClr val="EEECE1"/>
       </a:lt2>
       <a:accent1>
-        <a:srgbClr val="4f81bd"/>
+        <a:srgbClr val="4F81BD"/>
       </a:accent1>
       <a:accent2>
-        <a:srgbClr val="c0504d"/>
+        <a:srgbClr val="C0504D"/>
       </a:accent2>
       <a:accent3>
-        <a:srgbClr val="9bbb59"/>
+        <a:srgbClr val="9BBB59"/>
       </a:accent3>
       <a:accent4>
-        <a:srgbClr val="8064a2"/>
+        <a:srgbClr val="8064A2"/>
       </a:accent4>
       <a:accent5>
-        <a:srgbClr val="4bacc6"/>
+        <a:srgbClr val="4BACC6"/>
       </a:accent5>
       <a:accent6>
-        <a:srgbClr val="f79646"/>
+        <a:srgbClr val="F79646"/>
       </a:accent6>
       <a:hlink>
-        <a:srgbClr val="0000ff"/>
+        <a:srgbClr val="0000FF"/>
       </a:hlink>
       <a:folHlink>
         <a:srgbClr val="800080"/>
@@ -3131,5 +3800,7 @@
       </a:bgFillStyleLst>
     </a:fmtScheme>
   </a:themeElements>
+  <a:objectDefaults/>
+  <a:extraClrSchemeLst/>
 </a:theme>
 </file>
</xml_diff>

<commit_message>
add deployment describtion change someting in presentation, missing picture
</commit_message>
<xml_diff>
--- a/presentation/presentation_v1.pptx
+++ b/presentation/presentation_v1.pptx
@@ -8,10 +8,11 @@
     <p:sldId id="256" r:id="rId2"/>
     <p:sldId id="263" r:id="rId3"/>
     <p:sldId id="264" r:id="rId4"/>
-    <p:sldId id="258" r:id="rId5"/>
-    <p:sldId id="257" r:id="rId6"/>
-    <p:sldId id="260" r:id="rId7"/>
-    <p:sldId id="261" r:id="rId8"/>
+    <p:sldId id="266" r:id="rId5"/>
+    <p:sldId id="258" r:id="rId6"/>
+    <p:sldId id="257" r:id="rId7"/>
+    <p:sldId id="260" r:id="rId8"/>
+    <p:sldId id="261" r:id="rId9"/>
   </p:sldIdLst>
   <p:sldSz cx="10080625" cy="5670550"/>
   <p:notesSz cx="7559675" cy="10691813"/>
@@ -3219,6 +3220,14 @@
 <file path=ppt/slides/slide3.xml><?xml version="1.0" encoding="utf-8"?>
 <p:sld xmlns:a="http://schemas.openxmlformats.org/drawingml/2006/main" xmlns:r="http://schemas.openxmlformats.org/officeDocument/2006/relationships" xmlns:p="http://schemas.openxmlformats.org/presentationml/2006/main">
   <p:cSld>
+    <p:bg>
+      <p:bgPr>
+        <a:solidFill>
+          <a:schemeClr val="bg1"/>
+        </a:solidFill>
+        <a:effectLst/>
+      </p:bgPr>
+    </p:bg>
     <p:spTree>
       <p:nvGrpSpPr>
         <p:cNvPr id="1" name=""/>
@@ -3249,17 +3258,20 @@
             <p:ph type="title"/>
           </p:nvPr>
         </p:nvSpPr>
-        <p:spPr/>
-        <p:txBody>
-          <a:bodyPr/>
+        <p:spPr>
+          <a:xfrm>
+            <a:off x="536549" y="520309"/>
+            <a:ext cx="3031992" cy="1386303"/>
+          </a:xfrm>
+        </p:spPr>
+        <p:txBody>
+          <a:bodyPr vert="horz" lIns="91440" tIns="45720" rIns="91440" bIns="45720" rtlCol="0" anchor="ctr">
+            <a:normAutofit/>
+          </a:bodyPr>
           <a:lstStyle/>
           <a:p>
             <a:r>
-              <a:rPr lang="en-CA" dirty="0">
-                <a:solidFill>
-                  <a:schemeClr val="bg1"/>
-                </a:solidFill>
-              </a:rPr>
+              <a:rPr lang="en-US" sz="3000"/>
               <a:t>Trouble</a:t>
             </a:r>
           </a:p>
@@ -3267,56 +3279,147 @@
       </p:sp>
       <p:sp>
         <p:nvSpPr>
-          <p:cNvPr id="3" name="Subtitle 2">
+          <p:cNvPr id="12" name="TextBox 11">
             <a:extLst>
               <a:ext uri="{FF2B5EF4-FFF2-40B4-BE49-F238E27FC236}">
-                <a16:creationId xmlns:a16="http://schemas.microsoft.com/office/drawing/2014/main" id="{462B6DCA-757F-43ED-9ED9-BD3238EB0D78}"/>
+                <a16:creationId xmlns:a16="http://schemas.microsoft.com/office/drawing/2014/main" id="{72C86B7E-A06B-4E9F-865E-5F4B887C537C}"/>
+              </a:ext>
+            </a:extLst>
+          </p:cNvPr>
+          <p:cNvSpPr txBox="1"/>
+          <p:nvPr/>
+        </p:nvSpPr>
+        <p:spPr>
+          <a:xfrm>
+            <a:off x="536551" y="2016196"/>
+            <a:ext cx="3031989" cy="3125103"/>
+          </a:xfrm>
+          <a:prstGeom prst="rect">
+            <a:avLst/>
+          </a:prstGeom>
+        </p:spPr>
+        <p:txBody>
+          <a:bodyPr vert="horz" lIns="91440" tIns="45720" rIns="91440" bIns="45720" rtlCol="0">
+            <a:normAutofit/>
+          </a:bodyPr>
+          <a:lstStyle/>
+          <a:p>
+            <a:pPr indent="-228600">
+              <a:lnSpc>
+                <a:spcPct val="90000"/>
+              </a:lnSpc>
+              <a:spcAft>
+                <a:spcPts val="600"/>
+              </a:spcAft>
+              <a:buFont typeface="Arial" panose="020B0604020202020204" pitchFamily="34" charset="0"/>
+              <a:buChar char="•"/>
+            </a:pPr>
+            <a:r>
+              <a:rPr lang="en-US" sz="1500"/>
+              <a:t>Replace Household stock</a:t>
+            </a:r>
+          </a:p>
+        </p:txBody>
+      </p:sp>
+      <p:sp>
+        <p:nvSpPr>
+          <p:cNvPr id="19" name="Rectangle 18">
+            <a:extLst>
+              <a:ext uri="{FF2B5EF4-FFF2-40B4-BE49-F238E27FC236}">
+                <a16:creationId xmlns:a16="http://schemas.microsoft.com/office/drawing/2014/main" id="{F2B38F72-8FC4-4001-8C67-FA6B86DEC767}"/>
+              </a:ext>
+              <a:ext uri="{C183D7F6-B498-43B3-948B-1728B52AA6E4}">
+                <adec:decorative xmlns:adec="http://schemas.microsoft.com/office/drawing/2017/decorative" val="1"/>
               </a:ext>
             </a:extLst>
           </p:cNvPr>
           <p:cNvSpPr>
-            <a:spLocks noGrp="1"/>
+            <a:spLocks noGrp="1" noRot="1" noChangeAspect="1" noMove="1" noResize="1" noEditPoints="1" noAdjustHandles="1" noChangeArrowheads="1" noChangeShapeType="1" noTextEdit="1"/>
           </p:cNvSpPr>
           <p:nvPr>
-            <p:ph type="subTitle"/>
+            <p:extLst>
+              <p:ext uri="{386F3935-93C4-4BCD-93E2-E3B085C9AB24}">
+                <p16:designElem xmlns:p16="http://schemas.microsoft.com/office/powerpoint/2015/main" val="1"/>
+              </p:ext>
+            </p:extLst>
           </p:nvPr>
         </p:nvSpPr>
-        <p:spPr/>
-        <p:txBody>
-          <a:bodyPr/>
-          <a:lstStyle/>
-          <a:p>
-            <a:r>
-              <a:rPr lang="en-CA" dirty="0">
-                <a:solidFill>
-                  <a:schemeClr val="bg1"/>
-                </a:solidFill>
-              </a:rPr>
-              <a:t>Replace Household stock </a:t>
-            </a:r>
-          </a:p>
-          <a:p>
-            <a:pPr marL="0" indent="0">
-              <a:buNone/>
-            </a:pPr>
-            <a:endParaRPr lang="en-CA" dirty="0">
-              <a:solidFill>
-                <a:schemeClr val="bg1"/>
-              </a:solidFill>
-            </a:endParaRPr>
-          </a:p>
-          <a:p>
-            <a:r>
-              <a:rPr lang="en-CA" dirty="0">
-                <a:solidFill>
-                  <a:schemeClr val="bg1"/>
-                </a:solidFill>
-              </a:rPr>
-              <a:t>Simplify Shopping by Smartphone</a:t>
-            </a:r>
-          </a:p>
-        </p:txBody>
-      </p:sp>
+        <p:spPr>
+          <a:xfrm>
+            <a:off x="3833157" y="1"/>
+            <a:ext cx="6247468" cy="5670549"/>
+          </a:xfrm>
+          <a:prstGeom prst="rect">
+            <a:avLst/>
+          </a:prstGeom>
+          <a:solidFill>
+            <a:schemeClr val="tx1"/>
+          </a:solidFill>
+          <a:ln>
+            <a:noFill/>
+          </a:ln>
+        </p:spPr>
+        <p:style>
+          <a:lnRef idx="2">
+            <a:schemeClr val="accent1">
+              <a:shade val="50000"/>
+            </a:schemeClr>
+          </a:lnRef>
+          <a:fillRef idx="1">
+            <a:schemeClr val="accent1"/>
+          </a:fillRef>
+          <a:effectRef idx="0">
+            <a:schemeClr val="accent1"/>
+          </a:effectRef>
+          <a:fontRef idx="minor">
+            <a:schemeClr val="lt1"/>
+          </a:fontRef>
+        </p:style>
+        <p:txBody>
+          <a:bodyPr rtlCol="0" anchor="ctr"/>
+          <a:lstStyle/>
+          <a:p>
+            <a:pPr algn="ctr"/>
+            <a:endParaRPr lang="en-US"/>
+          </a:p>
+        </p:txBody>
+      </p:sp>
+      <p:pic>
+        <p:nvPicPr>
+          <p:cNvPr id="14" name="Picture 13" descr="A picture containing refrigerator, indoor, open, door&#10;&#10;Description automatically generated">
+            <a:extLst>
+              <a:ext uri="{FF2B5EF4-FFF2-40B4-BE49-F238E27FC236}">
+                <a16:creationId xmlns:a16="http://schemas.microsoft.com/office/drawing/2014/main" id="{0B4095CD-3AF1-4F81-AACB-6AE7915A7B9C}"/>
+              </a:ext>
+            </a:extLst>
+          </p:cNvPr>
+          <p:cNvPicPr>
+            <a:picLocks noChangeAspect="1"/>
+          </p:cNvPicPr>
+          <p:nvPr/>
+        </p:nvPicPr>
+        <p:blipFill rotWithShape="1">
+          <a:blip r:embed="rId2">
+            <a:extLst>
+              <a:ext uri="{28A0092B-C50C-407E-A947-70E740481C1C}">
+                <a14:useLocalDpi xmlns:a14="http://schemas.microsoft.com/office/drawing/2010/main" val="0"/>
+              </a:ext>
+            </a:extLst>
+          </a:blip>
+          <a:srcRect l="15893" r="1" b="1"/>
+          <a:stretch/>
+        </p:blipFill>
+        <p:spPr>
+          <a:xfrm>
+            <a:off x="4362390" y="529252"/>
+            <a:ext cx="5189347" cy="4612046"/>
+          </a:xfrm>
+          <a:prstGeom prst="rect">
+            <a:avLst/>
+          </a:prstGeom>
+          <a:effectLst/>
+        </p:spPr>
+      </p:pic>
     </p:spTree>
     <p:extLst>
       <p:ext uri="{BB962C8B-B14F-4D97-AF65-F5344CB8AC3E}">
@@ -3325,12 +3428,315 @@
     </p:extLst>
   </p:cSld>
   <p:clrMapOvr>
-    <a:masterClrMapping/>
+    <a:overrideClrMapping bg1="dk1" tx1="lt1" bg2="dk2" tx2="lt2" accent1="accent1" accent2="accent2" accent3="accent3" accent4="accent4" accent5="accent5" accent6="accent6" hlink="hlink" folHlink="folHlink"/>
   </p:clrMapOvr>
 </p:sld>
 </file>
 
 <file path=ppt/slides/slide4.xml><?xml version="1.0" encoding="utf-8"?>
+<p:sld xmlns:a="http://schemas.openxmlformats.org/drawingml/2006/main" xmlns:r="http://schemas.openxmlformats.org/officeDocument/2006/relationships" xmlns:p="http://schemas.openxmlformats.org/presentationml/2006/main">
+  <p:cSld>
+    <p:bg>
+      <p:bgPr>
+        <a:solidFill>
+          <a:schemeClr val="bg1"/>
+        </a:solidFill>
+        <a:effectLst/>
+      </p:bgPr>
+    </p:bg>
+    <p:spTree>
+      <p:nvGrpSpPr>
+        <p:cNvPr id="1" name=""/>
+        <p:cNvGrpSpPr/>
+        <p:nvPr/>
+      </p:nvGrpSpPr>
+      <p:grpSpPr>
+        <a:xfrm>
+          <a:off x="0" y="0"/>
+          <a:ext cx="0" cy="0"/>
+          <a:chOff x="0" y="0"/>
+          <a:chExt cx="0" cy="0"/>
+        </a:xfrm>
+      </p:grpSpPr>
+      <p:sp>
+        <p:nvSpPr>
+          <p:cNvPr id="2" name="Title 1">
+            <a:extLst>
+              <a:ext uri="{FF2B5EF4-FFF2-40B4-BE49-F238E27FC236}">
+                <a16:creationId xmlns:a16="http://schemas.microsoft.com/office/drawing/2014/main" id="{AB8F49F7-6D73-49CE-9E24-78411FF0DFFD}"/>
+              </a:ext>
+            </a:extLst>
+          </p:cNvPr>
+          <p:cNvSpPr>
+            <a:spLocks noGrp="1"/>
+          </p:cNvSpPr>
+          <p:nvPr>
+            <p:ph type="title"/>
+          </p:nvPr>
+        </p:nvSpPr>
+        <p:spPr>
+          <a:xfrm>
+            <a:off x="536549" y="520309"/>
+            <a:ext cx="3031992" cy="1386303"/>
+          </a:xfrm>
+        </p:spPr>
+        <p:txBody>
+          <a:bodyPr vert="horz" lIns="91440" tIns="45720" rIns="91440" bIns="45720" rtlCol="0" anchor="ctr">
+            <a:normAutofit/>
+          </a:bodyPr>
+          <a:lstStyle/>
+          <a:p>
+            <a:r>
+              <a:rPr lang="en-CA" sz="3200" dirty="0"/>
+              <a:t>Solution</a:t>
+            </a:r>
+            <a:endParaRPr lang="en-US" sz="3000" dirty="0"/>
+          </a:p>
+        </p:txBody>
+      </p:sp>
+      <p:sp>
+        <p:nvSpPr>
+          <p:cNvPr id="12" name="TextBox 11">
+            <a:extLst>
+              <a:ext uri="{FF2B5EF4-FFF2-40B4-BE49-F238E27FC236}">
+                <a16:creationId xmlns:a16="http://schemas.microsoft.com/office/drawing/2014/main" id="{72C86B7E-A06B-4E9F-865E-5F4B887C537C}"/>
+              </a:ext>
+            </a:extLst>
+          </p:cNvPr>
+          <p:cNvSpPr txBox="1"/>
+          <p:nvPr/>
+        </p:nvSpPr>
+        <p:spPr>
+          <a:xfrm>
+            <a:off x="536551" y="2016196"/>
+            <a:ext cx="3031989" cy="3125103"/>
+          </a:xfrm>
+          <a:prstGeom prst="rect">
+            <a:avLst/>
+          </a:prstGeom>
+        </p:spPr>
+        <p:txBody>
+          <a:bodyPr vert="horz" lIns="91440" tIns="45720" rIns="91440" bIns="45720" rtlCol="0">
+            <a:normAutofit/>
+          </a:bodyPr>
+          <a:lstStyle/>
+          <a:p>
+            <a:pPr marL="285750" indent="-285750">
+              <a:buFont typeface="Arial" panose="020B0604020202020204" pitchFamily="34" charset="0"/>
+              <a:buChar char="•"/>
+            </a:pPr>
+            <a:r>
+              <a:rPr lang="en-CA" sz="1600" dirty="0"/>
+              <a:t>Simplify Shopping by Smartphone</a:t>
+            </a:r>
+          </a:p>
+        </p:txBody>
+      </p:sp>
+      <p:sp>
+        <p:nvSpPr>
+          <p:cNvPr id="24" name="Rectangle 23">
+            <a:extLst>
+              <a:ext uri="{FF2B5EF4-FFF2-40B4-BE49-F238E27FC236}">
+                <a16:creationId xmlns:a16="http://schemas.microsoft.com/office/drawing/2014/main" id="{F2B38F72-8FC4-4001-8C67-FA6B86DEC767}"/>
+              </a:ext>
+              <a:ext uri="{C183D7F6-B498-43B3-948B-1728B52AA6E4}">
+                <adec:decorative xmlns:adec="http://schemas.microsoft.com/office/drawing/2017/decorative" val="1"/>
+              </a:ext>
+            </a:extLst>
+          </p:cNvPr>
+          <p:cNvSpPr>
+            <a:spLocks noGrp="1" noRot="1" noChangeAspect="1" noMove="1" noResize="1" noEditPoints="1" noAdjustHandles="1" noChangeArrowheads="1" noChangeShapeType="1" noTextEdit="1"/>
+          </p:cNvSpPr>
+          <p:nvPr>
+            <p:extLst>
+              <p:ext uri="{386F3935-93C4-4BCD-93E2-E3B085C9AB24}">
+                <p16:designElem xmlns:p16="http://schemas.microsoft.com/office/powerpoint/2015/main" val="1"/>
+              </p:ext>
+            </p:extLst>
+          </p:nvPr>
+        </p:nvSpPr>
+        <p:spPr>
+          <a:xfrm>
+            <a:off x="3833157" y="1"/>
+            <a:ext cx="6247468" cy="5670549"/>
+          </a:xfrm>
+          <a:prstGeom prst="rect">
+            <a:avLst/>
+          </a:prstGeom>
+          <a:solidFill>
+            <a:schemeClr val="tx1"/>
+          </a:solidFill>
+          <a:ln>
+            <a:noFill/>
+          </a:ln>
+        </p:spPr>
+        <p:style>
+          <a:lnRef idx="2">
+            <a:schemeClr val="accent1">
+              <a:shade val="50000"/>
+            </a:schemeClr>
+          </a:lnRef>
+          <a:fillRef idx="1">
+            <a:schemeClr val="accent1"/>
+          </a:fillRef>
+          <a:effectRef idx="0">
+            <a:schemeClr val="accent1"/>
+          </a:effectRef>
+          <a:fontRef idx="minor">
+            <a:schemeClr val="lt1"/>
+          </a:fontRef>
+        </p:style>
+        <p:txBody>
+          <a:bodyPr rtlCol="0" anchor="ctr"/>
+          <a:lstStyle/>
+          <a:p>
+            <a:pPr algn="ctr"/>
+            <a:endParaRPr lang="en-US"/>
+          </a:p>
+        </p:txBody>
+      </p:sp>
+      <p:pic>
+        <p:nvPicPr>
+          <p:cNvPr id="6" name="Picture 5">
+            <a:extLst>
+              <a:ext uri="{FF2B5EF4-FFF2-40B4-BE49-F238E27FC236}">
+                <a16:creationId xmlns:a16="http://schemas.microsoft.com/office/drawing/2014/main" id="{788C48FD-CAA4-4C16-9627-89A202F4B28F}"/>
+              </a:ext>
+            </a:extLst>
+          </p:cNvPr>
+          <p:cNvPicPr>
+            <a:picLocks noChangeAspect="1"/>
+          </p:cNvPicPr>
+          <p:nvPr/>
+        </p:nvPicPr>
+        <p:blipFill rotWithShape="1">
+          <a:blip r:embed="rId2">
+            <a:extLst>
+              <a:ext uri="{28A0092B-C50C-407E-A947-70E740481C1C}">
+                <a14:useLocalDpi xmlns:a14="http://schemas.microsoft.com/office/drawing/2010/main" val="0"/>
+              </a:ext>
+            </a:extLst>
+          </a:blip>
+          <a:srcRect l="16751" r="28677" b="-2"/>
+          <a:stretch/>
+        </p:blipFill>
+        <p:spPr>
+          <a:xfrm>
+            <a:off x="4362390" y="529252"/>
+            <a:ext cx="5189347" cy="4612046"/>
+          </a:xfrm>
+          <a:prstGeom prst="rect">
+            <a:avLst/>
+          </a:prstGeom>
+          <a:effectLst/>
+        </p:spPr>
+      </p:pic>
+    </p:spTree>
+    <p:extLst>
+      <p:ext uri="{BB962C8B-B14F-4D97-AF65-F5344CB8AC3E}">
+        <p14:creationId xmlns:p14="http://schemas.microsoft.com/office/powerpoint/2010/main" val="2596825390"/>
+      </p:ext>
+    </p:extLst>
+  </p:cSld>
+  <p:clrMapOvr>
+    <a:overrideClrMapping bg1="dk1" tx1="lt1" bg2="dk2" tx2="lt2" accent1="accent1" accent2="accent2" accent3="accent3" accent4="accent4" accent5="accent5" accent6="accent6" hlink="hlink" folHlink="folHlink"/>
+  </p:clrMapOvr>
+  <p:timing>
+    <p:tnLst>
+      <p:par>
+        <p:cTn id="1" dur="indefinite" restart="never" nodeType="tmRoot">
+          <p:childTnLst>
+            <p:seq concurrent="1" nextAc="seek">
+              <p:cTn id="2" dur="indefinite" nodeType="mainSeq">
+                <p:childTnLst>
+                  <p:par>
+                    <p:cTn id="3" fill="hold">
+                      <p:stCondLst>
+                        <p:cond delay="indefinite"/>
+                        <p:cond evt="onBegin" delay="0">
+                          <p:tn val="2"/>
+                        </p:cond>
+                      </p:stCondLst>
+                      <p:childTnLst>
+                        <p:par>
+                          <p:cTn id="4" fill="hold">
+                            <p:stCondLst>
+                              <p:cond delay="0"/>
+                            </p:stCondLst>
+                            <p:childTnLst>
+                              <p:par>
+                                <p:cTn id="5" presetID="10" presetClass="entr" presetSubtype="0" fill="hold" grpId="0" nodeType="withEffect">
+                                  <p:stCondLst>
+                                    <p:cond delay="1000"/>
+                                  </p:stCondLst>
+                                  <p:iterate type="lt">
+                                    <p:tmPct val="10000"/>
+                                  </p:iterate>
+                                  <p:childTnLst>
+                                    <p:set>
+                                      <p:cBhvr>
+                                        <p:cTn id="6" dur="1" fill="hold">
+                                          <p:stCondLst>
+                                            <p:cond delay="0"/>
+                                          </p:stCondLst>
+                                        </p:cTn>
+                                        <p:tgtEl>
+                                          <p:spTgt spid="2"/>
+                                        </p:tgtEl>
+                                        <p:attrNameLst>
+                                          <p:attrName>style.visibility</p:attrName>
+                                        </p:attrNameLst>
+                                      </p:cBhvr>
+                                      <p:to>
+                                        <p:strVal val="visible"/>
+                                      </p:to>
+                                    </p:set>
+                                    <p:animEffect transition="in" filter="fade">
+                                      <p:cBhvr>
+                                        <p:cTn id="7" dur="400"/>
+                                        <p:tgtEl>
+                                          <p:spTgt spid="2"/>
+                                        </p:tgtEl>
+                                      </p:cBhvr>
+                                    </p:animEffect>
+                                  </p:childTnLst>
+                                </p:cTn>
+                              </p:par>
+                            </p:childTnLst>
+                          </p:cTn>
+                        </p:par>
+                      </p:childTnLst>
+                    </p:cTn>
+                  </p:par>
+                </p:childTnLst>
+              </p:cTn>
+              <p:prevCondLst>
+                <p:cond evt="onPrev" delay="0">
+                  <p:tgtEl>
+                    <p:sldTgt/>
+                  </p:tgtEl>
+                </p:cond>
+              </p:prevCondLst>
+              <p:nextCondLst>
+                <p:cond evt="onNext" delay="0">
+                  <p:tgtEl>
+                    <p:sldTgt/>
+                  </p:tgtEl>
+                </p:cond>
+              </p:nextCondLst>
+            </p:seq>
+          </p:childTnLst>
+        </p:cTn>
+      </p:par>
+    </p:tnLst>
+    <p:bldLst>
+      <p:bldP spid="2" grpId="0"/>
+    </p:bldLst>
+  </p:timing>
+</p:sld>
+</file>
+
+<file path=ppt/slides/slide5.xml><?xml version="1.0" encoding="utf-8"?>
 <p:sld xmlns:a="http://schemas.openxmlformats.org/drawingml/2006/main" xmlns:r="http://schemas.openxmlformats.org/officeDocument/2006/relationships" xmlns:p="http://schemas.openxmlformats.org/presentationml/2006/main">
   <p:cSld>
     <p:spTree>
@@ -3516,509 +3922,6 @@
           </a:ln>
         </p:spPr>
       </p:pic>
-    </p:spTree>
-  </p:cSld>
-  <p:clrMapOvr>
-    <a:masterClrMapping/>
-  </p:clrMapOvr>
-</p:sld>
-</file>
-
-<file path=ppt/slides/slide5.xml><?xml version="1.0" encoding="utf-8"?>
-<p:sld xmlns:a="http://schemas.openxmlformats.org/drawingml/2006/main" xmlns:r="http://schemas.openxmlformats.org/officeDocument/2006/relationships" xmlns:p="http://schemas.openxmlformats.org/presentationml/2006/main">
-  <p:cSld>
-    <p:spTree>
-      <p:nvGrpSpPr>
-        <p:cNvPr id="1" name=""/>
-        <p:cNvGrpSpPr/>
-        <p:nvPr/>
-      </p:nvGrpSpPr>
-      <p:grpSpPr>
-        <a:xfrm>
-          <a:off x="0" y="0"/>
-          <a:ext cx="0" cy="0"/>
-          <a:chOff x="0" y="0"/>
-          <a:chExt cx="0" cy="0"/>
-        </a:xfrm>
-      </p:grpSpPr>
-      <p:sp>
-        <p:nvSpPr>
-          <p:cNvPr id="40" name="Titel 5"/>
-          <p:cNvSpPr txBox="1"/>
-          <p:nvPr/>
-        </p:nvSpPr>
-        <p:spPr>
-          <a:xfrm>
-            <a:off x="503640" y="225720"/>
-            <a:ext cx="9070200" cy="945720"/>
-          </a:xfrm>
-          <a:prstGeom prst="rect">
-            <a:avLst/>
-          </a:prstGeom>
-          <a:noFill/>
-          <a:ln w="0">
-            <a:noFill/>
-          </a:ln>
-        </p:spPr>
-        <p:txBody>
-          <a:bodyPr lIns="0" tIns="0" rIns="0" bIns="0" anchor="ctr">
-            <a:noAutofit/>
-          </a:bodyPr>
-          <a:lstStyle/>
-          <a:p>
-            <a:pPr>
-              <a:lnSpc>
-                <a:spcPct val="100000"/>
-              </a:lnSpc>
-            </a:pPr>
-            <a:r>
-              <a:rPr lang="en-GB" sz="3200" spc="-1" dirty="0">
-                <a:solidFill>
-                  <a:srgbClr val="F2F2F2"/>
-                </a:solidFill>
-                <a:latin typeface="Open Sans SemiBold"/>
-              </a:rPr>
-              <a:t>Technical implementation</a:t>
-            </a:r>
-            <a:endParaRPr lang="de-DE" sz="3200" b="0" strike="noStrike" spc="-1" dirty="0">
-              <a:solidFill>
-                <a:srgbClr val="FFFFFF"/>
-              </a:solidFill>
-              <a:latin typeface="Open Sans"/>
-            </a:endParaRPr>
-          </a:p>
-        </p:txBody>
-      </p:sp>
-      <p:sp>
-        <p:nvSpPr>
-          <p:cNvPr id="2" name="Rectangle 1">
-            <a:extLst>
-              <a:ext uri="{FF2B5EF4-FFF2-40B4-BE49-F238E27FC236}">
-                <a16:creationId xmlns:a16="http://schemas.microsoft.com/office/drawing/2014/main" id="{E7AD708C-BC4E-4594-97B8-E8AFE9B837C7}"/>
-              </a:ext>
-            </a:extLst>
-          </p:cNvPr>
-          <p:cNvSpPr/>
-          <p:nvPr/>
-        </p:nvSpPr>
-        <p:spPr>
-          <a:xfrm>
-            <a:off x="3538312" y="1823781"/>
-            <a:ext cx="2546800" cy="2022987"/>
-          </a:xfrm>
-          <a:prstGeom prst="rect">
-            <a:avLst/>
-          </a:prstGeom>
-        </p:spPr>
-        <p:style>
-          <a:lnRef idx="2">
-            <a:schemeClr val="accent5">
-              <a:shade val="50000"/>
-            </a:schemeClr>
-          </a:lnRef>
-          <a:fillRef idx="1">
-            <a:schemeClr val="accent5"/>
-          </a:fillRef>
-          <a:effectRef idx="0">
-            <a:schemeClr val="accent5"/>
-          </a:effectRef>
-          <a:fontRef idx="minor">
-            <a:schemeClr val="lt1"/>
-          </a:fontRef>
-        </p:style>
-        <p:txBody>
-          <a:bodyPr rtlCol="0" anchor="ctr"/>
-          <a:lstStyle/>
-          <a:p>
-            <a:pPr algn="ctr"/>
-            <a:r>
-              <a:rPr lang="en-CA" dirty="0"/>
-              <a:t>Cloud Vision API</a:t>
-            </a:r>
-            <a:br>
-              <a:rPr lang="en-CA" dirty="0"/>
-            </a:br>
-            <a:r>
-              <a:rPr lang="en-CA" dirty="0"/>
-              <a:t>Google</a:t>
-            </a:r>
-          </a:p>
-        </p:txBody>
-      </p:sp>
-      <p:sp>
-        <p:nvSpPr>
-          <p:cNvPr id="3" name="Rectangle 2">
-            <a:extLst>
-              <a:ext uri="{FF2B5EF4-FFF2-40B4-BE49-F238E27FC236}">
-                <a16:creationId xmlns:a16="http://schemas.microsoft.com/office/drawing/2014/main" id="{C811FE27-D118-4E8B-846E-00BCF4E8D9B0}"/>
-              </a:ext>
-            </a:extLst>
-          </p:cNvPr>
-          <p:cNvSpPr/>
-          <p:nvPr/>
-        </p:nvSpPr>
-        <p:spPr>
-          <a:xfrm>
-            <a:off x="592130" y="1893784"/>
-            <a:ext cx="1362031" cy="1882980"/>
-          </a:xfrm>
-          <a:prstGeom prst="rect">
-            <a:avLst/>
-          </a:prstGeom>
-        </p:spPr>
-        <p:style>
-          <a:lnRef idx="2">
-            <a:schemeClr val="accent1">
-              <a:shade val="50000"/>
-            </a:schemeClr>
-          </a:lnRef>
-          <a:fillRef idx="1">
-            <a:schemeClr val="accent1"/>
-          </a:fillRef>
-          <a:effectRef idx="0">
-            <a:schemeClr val="accent1"/>
-          </a:effectRef>
-          <a:fontRef idx="minor">
-            <a:schemeClr val="lt1"/>
-          </a:fontRef>
-        </p:style>
-        <p:txBody>
-          <a:bodyPr rtlCol="0" anchor="ctr"/>
-          <a:lstStyle/>
-          <a:p>
-            <a:pPr algn="ctr"/>
-            <a:r>
-              <a:rPr lang="en-CA" dirty="0"/>
-              <a:t>Annotated stock pictures</a:t>
-            </a:r>
-          </a:p>
-        </p:txBody>
-      </p:sp>
-      <p:cxnSp>
-        <p:nvCxnSpPr>
-          <p:cNvPr id="5" name="Straight Arrow Connector 4">
-            <a:extLst>
-              <a:ext uri="{FF2B5EF4-FFF2-40B4-BE49-F238E27FC236}">
-                <a16:creationId xmlns:a16="http://schemas.microsoft.com/office/drawing/2014/main" id="{29D939ED-A1C3-47A7-8726-5F8B3BA8C12E}"/>
-              </a:ext>
-            </a:extLst>
-          </p:cNvPr>
-          <p:cNvCxnSpPr>
-            <a:stCxn id="3" idx="3"/>
-            <a:endCxn id="2" idx="1"/>
-          </p:cNvCxnSpPr>
-          <p:nvPr/>
-        </p:nvCxnSpPr>
-        <p:spPr>
-          <a:xfrm>
-            <a:off x="1954161" y="2835274"/>
-            <a:ext cx="1584151" cy="1"/>
-          </a:xfrm>
-          <a:prstGeom prst="straightConnector1">
-            <a:avLst/>
-          </a:prstGeom>
-          <a:ln>
-            <a:tailEnd type="triangle"/>
-          </a:ln>
-        </p:spPr>
-        <p:style>
-          <a:lnRef idx="1">
-            <a:schemeClr val="accent1"/>
-          </a:lnRef>
-          <a:fillRef idx="0">
-            <a:schemeClr val="accent1"/>
-          </a:fillRef>
-          <a:effectRef idx="0">
-            <a:schemeClr val="accent1"/>
-          </a:effectRef>
-          <a:fontRef idx="minor">
-            <a:schemeClr val="tx1"/>
-          </a:fontRef>
-        </p:style>
-      </p:cxnSp>
-      <p:sp>
-        <p:nvSpPr>
-          <p:cNvPr id="6" name="Oval 5">
-            <a:extLst>
-              <a:ext uri="{FF2B5EF4-FFF2-40B4-BE49-F238E27FC236}">
-                <a16:creationId xmlns:a16="http://schemas.microsoft.com/office/drawing/2014/main" id="{934DA100-814C-4B06-80B0-5834D2500A50}"/>
-              </a:ext>
-            </a:extLst>
-          </p:cNvPr>
-          <p:cNvSpPr/>
-          <p:nvPr/>
-        </p:nvSpPr>
-        <p:spPr>
-          <a:xfrm>
-            <a:off x="2274287" y="2654606"/>
-            <a:ext cx="943897" cy="361335"/>
-          </a:xfrm>
-          <a:prstGeom prst="ellipse">
-            <a:avLst/>
-          </a:prstGeom>
-        </p:spPr>
-        <p:style>
-          <a:lnRef idx="2">
-            <a:schemeClr val="accent1">
-              <a:shade val="50000"/>
-            </a:schemeClr>
-          </a:lnRef>
-          <a:fillRef idx="1">
-            <a:schemeClr val="accent1"/>
-          </a:fillRef>
-          <a:effectRef idx="0">
-            <a:schemeClr val="accent1"/>
-          </a:effectRef>
-          <a:fontRef idx="minor">
-            <a:schemeClr val="lt1"/>
-          </a:fontRef>
-        </p:style>
-        <p:txBody>
-          <a:bodyPr rtlCol="0" anchor="ctr"/>
-          <a:lstStyle/>
-          <a:p>
-            <a:pPr algn="ctr"/>
-            <a:r>
-              <a:rPr lang="en-CA" dirty="0"/>
-              <a:t>train</a:t>
-            </a:r>
-          </a:p>
-        </p:txBody>
-      </p:sp>
-      <p:sp>
-        <p:nvSpPr>
-          <p:cNvPr id="7" name="Rectangle 6">
-            <a:extLst>
-              <a:ext uri="{FF2B5EF4-FFF2-40B4-BE49-F238E27FC236}">
-                <a16:creationId xmlns:a16="http://schemas.microsoft.com/office/drawing/2014/main" id="{BBB31161-C0CA-48DD-9003-8C5BEB314870}"/>
-              </a:ext>
-            </a:extLst>
-          </p:cNvPr>
-          <p:cNvSpPr/>
-          <p:nvPr/>
-        </p:nvSpPr>
-        <p:spPr>
-          <a:xfrm>
-            <a:off x="7890387" y="1823781"/>
-            <a:ext cx="1683453" cy="2099290"/>
-          </a:xfrm>
-          <a:prstGeom prst="rect">
-            <a:avLst/>
-          </a:prstGeom>
-        </p:spPr>
-        <p:style>
-          <a:lnRef idx="2">
-            <a:schemeClr val="accent1">
-              <a:shade val="50000"/>
-            </a:schemeClr>
-          </a:lnRef>
-          <a:fillRef idx="1">
-            <a:schemeClr val="accent1"/>
-          </a:fillRef>
-          <a:effectRef idx="0">
-            <a:schemeClr val="accent1"/>
-          </a:effectRef>
-          <a:fontRef idx="minor">
-            <a:schemeClr val="lt1"/>
-          </a:fontRef>
-        </p:style>
-        <p:txBody>
-          <a:bodyPr rtlCol="0" anchor="ctr"/>
-          <a:lstStyle/>
-          <a:p>
-            <a:pPr algn="ctr"/>
-            <a:r>
-              <a:rPr lang="en-CA" dirty="0"/>
-              <a:t>User</a:t>
-            </a:r>
-          </a:p>
-        </p:txBody>
-      </p:sp>
-      <p:cxnSp>
-        <p:nvCxnSpPr>
-          <p:cNvPr id="9" name="Straight Arrow Connector 8">
-            <a:extLst>
-              <a:ext uri="{FF2B5EF4-FFF2-40B4-BE49-F238E27FC236}">
-                <a16:creationId xmlns:a16="http://schemas.microsoft.com/office/drawing/2014/main" id="{C4B1597F-E4C8-4E11-A06E-5A0E647EE514}"/>
-              </a:ext>
-            </a:extLst>
-          </p:cNvPr>
-          <p:cNvCxnSpPr>
-            <a:cxnSpLocks/>
-          </p:cNvCxnSpPr>
-          <p:nvPr/>
-        </p:nvCxnSpPr>
-        <p:spPr>
-          <a:xfrm flipH="1">
-            <a:off x="6085112" y="2160639"/>
-            <a:ext cx="1805276" cy="0"/>
-          </a:xfrm>
-          <a:prstGeom prst="straightConnector1">
-            <a:avLst/>
-          </a:prstGeom>
-          <a:ln>
-            <a:tailEnd type="triangle"/>
-          </a:ln>
-        </p:spPr>
-        <p:style>
-          <a:lnRef idx="1">
-            <a:schemeClr val="accent1"/>
-          </a:lnRef>
-          <a:fillRef idx="0">
-            <a:schemeClr val="accent1"/>
-          </a:fillRef>
-          <a:effectRef idx="0">
-            <a:schemeClr val="accent1"/>
-          </a:effectRef>
-          <a:fontRef idx="minor">
-            <a:schemeClr val="tx1"/>
-          </a:fontRef>
-        </p:style>
-      </p:cxnSp>
-      <p:sp>
-        <p:nvSpPr>
-          <p:cNvPr id="11" name="Oval 10">
-            <a:extLst>
-              <a:ext uri="{FF2B5EF4-FFF2-40B4-BE49-F238E27FC236}">
-                <a16:creationId xmlns:a16="http://schemas.microsoft.com/office/drawing/2014/main" id="{9B30D5FF-2190-4106-BD72-88020D4A0473}"/>
-              </a:ext>
-            </a:extLst>
-          </p:cNvPr>
-          <p:cNvSpPr/>
-          <p:nvPr/>
-        </p:nvSpPr>
-        <p:spPr>
-          <a:xfrm>
-            <a:off x="6355499" y="1778113"/>
-            <a:ext cx="1264501" cy="765051"/>
-          </a:xfrm>
-          <a:prstGeom prst="ellipse">
-            <a:avLst/>
-          </a:prstGeom>
-        </p:spPr>
-        <p:style>
-          <a:lnRef idx="2">
-            <a:schemeClr val="accent1">
-              <a:shade val="50000"/>
-            </a:schemeClr>
-          </a:lnRef>
-          <a:fillRef idx="1">
-            <a:schemeClr val="accent1"/>
-          </a:fillRef>
-          <a:effectRef idx="0">
-            <a:schemeClr val="accent1"/>
-          </a:effectRef>
-          <a:fontRef idx="minor">
-            <a:schemeClr val="lt1"/>
-          </a:fontRef>
-        </p:style>
-        <p:txBody>
-          <a:bodyPr rtlCol="0" anchor="ctr"/>
-          <a:lstStyle/>
-          <a:p>
-            <a:pPr algn="ctr"/>
-            <a:r>
-              <a:rPr lang="en-CA" dirty="0"/>
-              <a:t>Send picture</a:t>
-            </a:r>
-          </a:p>
-        </p:txBody>
-      </p:sp>
-      <p:sp>
-        <p:nvSpPr>
-          <p:cNvPr id="12" name="Oval 11">
-            <a:extLst>
-              <a:ext uri="{FF2B5EF4-FFF2-40B4-BE49-F238E27FC236}">
-                <a16:creationId xmlns:a16="http://schemas.microsoft.com/office/drawing/2014/main" id="{A99F0F98-CF70-42B1-A63B-49A2C6C062BF}"/>
-              </a:ext>
-            </a:extLst>
-          </p:cNvPr>
-          <p:cNvSpPr/>
-          <p:nvPr/>
-        </p:nvSpPr>
-        <p:spPr>
-          <a:xfrm>
-            <a:off x="6355499" y="3097194"/>
-            <a:ext cx="1264501" cy="765051"/>
-          </a:xfrm>
-          <a:prstGeom prst="ellipse">
-            <a:avLst/>
-          </a:prstGeom>
-        </p:spPr>
-        <p:style>
-          <a:lnRef idx="2">
-            <a:schemeClr val="accent1">
-              <a:shade val="50000"/>
-            </a:schemeClr>
-          </a:lnRef>
-          <a:fillRef idx="1">
-            <a:schemeClr val="accent1"/>
-          </a:fillRef>
-          <a:effectRef idx="0">
-            <a:schemeClr val="accent1"/>
-          </a:effectRef>
-          <a:fontRef idx="minor">
-            <a:schemeClr val="lt1"/>
-          </a:fontRef>
-        </p:style>
-        <p:txBody>
-          <a:bodyPr rtlCol="0" anchor="ctr"/>
-          <a:lstStyle/>
-          <a:p>
-            <a:pPr algn="ctr"/>
-            <a:r>
-              <a:rPr lang="en-CA" dirty="0"/>
-              <a:t>get </a:t>
-            </a:r>
-            <a:r>
-              <a:rPr lang="en-CA" dirty="0" err="1"/>
-              <a:t>infos</a:t>
-            </a:r>
-            <a:endParaRPr lang="en-CA" dirty="0"/>
-          </a:p>
-        </p:txBody>
-      </p:sp>
-      <p:cxnSp>
-        <p:nvCxnSpPr>
-          <p:cNvPr id="13" name="Straight Arrow Connector 12">
-            <a:extLst>
-              <a:ext uri="{FF2B5EF4-FFF2-40B4-BE49-F238E27FC236}">
-                <a16:creationId xmlns:a16="http://schemas.microsoft.com/office/drawing/2014/main" id="{72510232-2ABC-4987-8EDB-269689E19432}"/>
-              </a:ext>
-            </a:extLst>
-          </p:cNvPr>
-          <p:cNvCxnSpPr>
-            <a:cxnSpLocks/>
-          </p:cNvCxnSpPr>
-          <p:nvPr/>
-        </p:nvCxnSpPr>
-        <p:spPr>
-          <a:xfrm>
-            <a:off x="6085112" y="3456764"/>
-            <a:ext cx="1805275" cy="0"/>
-          </a:xfrm>
-          <a:prstGeom prst="straightConnector1">
-            <a:avLst/>
-          </a:prstGeom>
-          <a:ln>
-            <a:tailEnd type="triangle"/>
-          </a:ln>
-        </p:spPr>
-        <p:style>
-          <a:lnRef idx="1">
-            <a:schemeClr val="accent1"/>
-          </a:lnRef>
-          <a:fillRef idx="0">
-            <a:schemeClr val="accent1"/>
-          </a:fillRef>
-          <a:effectRef idx="0">
-            <a:schemeClr val="accent1"/>
-          </a:effectRef>
-          <a:fontRef idx="minor">
-            <a:schemeClr val="tx1"/>
-          </a:fontRef>
-        </p:style>
-      </p:cxnSp>
     </p:spTree>
   </p:cSld>
   <p:clrMapOvr>
@@ -4046,6 +3949,509 @@
       </p:grpSpPr>
       <p:sp>
         <p:nvSpPr>
+          <p:cNvPr id="40" name="Titel 5"/>
+          <p:cNvSpPr txBox="1"/>
+          <p:nvPr/>
+        </p:nvSpPr>
+        <p:spPr>
+          <a:xfrm>
+            <a:off x="503640" y="225720"/>
+            <a:ext cx="9070200" cy="945720"/>
+          </a:xfrm>
+          <a:prstGeom prst="rect">
+            <a:avLst/>
+          </a:prstGeom>
+          <a:noFill/>
+          <a:ln w="0">
+            <a:noFill/>
+          </a:ln>
+        </p:spPr>
+        <p:txBody>
+          <a:bodyPr lIns="0" tIns="0" rIns="0" bIns="0" anchor="ctr">
+            <a:noAutofit/>
+          </a:bodyPr>
+          <a:lstStyle/>
+          <a:p>
+            <a:pPr>
+              <a:lnSpc>
+                <a:spcPct val="100000"/>
+              </a:lnSpc>
+            </a:pPr>
+            <a:r>
+              <a:rPr lang="en-GB" sz="3200" spc="-1" dirty="0">
+                <a:solidFill>
+                  <a:srgbClr val="F2F2F2"/>
+                </a:solidFill>
+                <a:latin typeface="Open Sans SemiBold"/>
+              </a:rPr>
+              <a:t>Technical implementation</a:t>
+            </a:r>
+            <a:endParaRPr lang="de-DE" sz="3200" b="0" strike="noStrike" spc="-1" dirty="0">
+              <a:solidFill>
+                <a:srgbClr val="FFFFFF"/>
+              </a:solidFill>
+              <a:latin typeface="Open Sans"/>
+            </a:endParaRPr>
+          </a:p>
+        </p:txBody>
+      </p:sp>
+      <p:sp>
+        <p:nvSpPr>
+          <p:cNvPr id="2" name="Rectangle 1">
+            <a:extLst>
+              <a:ext uri="{FF2B5EF4-FFF2-40B4-BE49-F238E27FC236}">
+                <a16:creationId xmlns:a16="http://schemas.microsoft.com/office/drawing/2014/main" id="{E7AD708C-BC4E-4594-97B8-E8AFE9B837C7}"/>
+              </a:ext>
+            </a:extLst>
+          </p:cNvPr>
+          <p:cNvSpPr/>
+          <p:nvPr/>
+        </p:nvSpPr>
+        <p:spPr>
+          <a:xfrm>
+            <a:off x="3538312" y="1823781"/>
+            <a:ext cx="2546800" cy="2022987"/>
+          </a:xfrm>
+          <a:prstGeom prst="rect">
+            <a:avLst/>
+          </a:prstGeom>
+        </p:spPr>
+        <p:style>
+          <a:lnRef idx="2">
+            <a:schemeClr val="accent5">
+              <a:shade val="50000"/>
+            </a:schemeClr>
+          </a:lnRef>
+          <a:fillRef idx="1">
+            <a:schemeClr val="accent5"/>
+          </a:fillRef>
+          <a:effectRef idx="0">
+            <a:schemeClr val="accent5"/>
+          </a:effectRef>
+          <a:fontRef idx="minor">
+            <a:schemeClr val="lt1"/>
+          </a:fontRef>
+        </p:style>
+        <p:txBody>
+          <a:bodyPr rtlCol="0" anchor="ctr"/>
+          <a:lstStyle/>
+          <a:p>
+            <a:pPr algn="ctr"/>
+            <a:r>
+              <a:rPr lang="en-CA" dirty="0"/>
+              <a:t>Cloud Vision API</a:t>
+            </a:r>
+            <a:br>
+              <a:rPr lang="en-CA" dirty="0"/>
+            </a:br>
+            <a:r>
+              <a:rPr lang="en-CA" dirty="0"/>
+              <a:t>Google</a:t>
+            </a:r>
+          </a:p>
+        </p:txBody>
+      </p:sp>
+      <p:sp>
+        <p:nvSpPr>
+          <p:cNvPr id="3" name="Rectangle 2">
+            <a:extLst>
+              <a:ext uri="{FF2B5EF4-FFF2-40B4-BE49-F238E27FC236}">
+                <a16:creationId xmlns:a16="http://schemas.microsoft.com/office/drawing/2014/main" id="{C811FE27-D118-4E8B-846E-00BCF4E8D9B0}"/>
+              </a:ext>
+            </a:extLst>
+          </p:cNvPr>
+          <p:cNvSpPr/>
+          <p:nvPr/>
+        </p:nvSpPr>
+        <p:spPr>
+          <a:xfrm>
+            <a:off x="592130" y="1893784"/>
+            <a:ext cx="1362031" cy="1882980"/>
+          </a:xfrm>
+          <a:prstGeom prst="rect">
+            <a:avLst/>
+          </a:prstGeom>
+        </p:spPr>
+        <p:style>
+          <a:lnRef idx="2">
+            <a:schemeClr val="accent1">
+              <a:shade val="50000"/>
+            </a:schemeClr>
+          </a:lnRef>
+          <a:fillRef idx="1">
+            <a:schemeClr val="accent1"/>
+          </a:fillRef>
+          <a:effectRef idx="0">
+            <a:schemeClr val="accent1"/>
+          </a:effectRef>
+          <a:fontRef idx="minor">
+            <a:schemeClr val="lt1"/>
+          </a:fontRef>
+        </p:style>
+        <p:txBody>
+          <a:bodyPr rtlCol="0" anchor="ctr"/>
+          <a:lstStyle/>
+          <a:p>
+            <a:pPr algn="ctr"/>
+            <a:r>
+              <a:rPr lang="en-CA" dirty="0"/>
+              <a:t>Annotated stock pictures</a:t>
+            </a:r>
+          </a:p>
+        </p:txBody>
+      </p:sp>
+      <p:cxnSp>
+        <p:nvCxnSpPr>
+          <p:cNvPr id="5" name="Straight Arrow Connector 4">
+            <a:extLst>
+              <a:ext uri="{FF2B5EF4-FFF2-40B4-BE49-F238E27FC236}">
+                <a16:creationId xmlns:a16="http://schemas.microsoft.com/office/drawing/2014/main" id="{29D939ED-A1C3-47A7-8726-5F8B3BA8C12E}"/>
+              </a:ext>
+            </a:extLst>
+          </p:cNvPr>
+          <p:cNvCxnSpPr>
+            <a:stCxn id="3" idx="3"/>
+            <a:endCxn id="2" idx="1"/>
+          </p:cNvCxnSpPr>
+          <p:nvPr/>
+        </p:nvCxnSpPr>
+        <p:spPr>
+          <a:xfrm>
+            <a:off x="1954161" y="2835274"/>
+            <a:ext cx="1584151" cy="1"/>
+          </a:xfrm>
+          <a:prstGeom prst="straightConnector1">
+            <a:avLst/>
+          </a:prstGeom>
+          <a:ln>
+            <a:tailEnd type="triangle"/>
+          </a:ln>
+        </p:spPr>
+        <p:style>
+          <a:lnRef idx="1">
+            <a:schemeClr val="accent1"/>
+          </a:lnRef>
+          <a:fillRef idx="0">
+            <a:schemeClr val="accent1"/>
+          </a:fillRef>
+          <a:effectRef idx="0">
+            <a:schemeClr val="accent1"/>
+          </a:effectRef>
+          <a:fontRef idx="minor">
+            <a:schemeClr val="tx1"/>
+          </a:fontRef>
+        </p:style>
+      </p:cxnSp>
+      <p:sp>
+        <p:nvSpPr>
+          <p:cNvPr id="6" name="Oval 5">
+            <a:extLst>
+              <a:ext uri="{FF2B5EF4-FFF2-40B4-BE49-F238E27FC236}">
+                <a16:creationId xmlns:a16="http://schemas.microsoft.com/office/drawing/2014/main" id="{934DA100-814C-4B06-80B0-5834D2500A50}"/>
+              </a:ext>
+            </a:extLst>
+          </p:cNvPr>
+          <p:cNvSpPr/>
+          <p:nvPr/>
+        </p:nvSpPr>
+        <p:spPr>
+          <a:xfrm>
+            <a:off x="2274287" y="2654606"/>
+            <a:ext cx="943897" cy="361335"/>
+          </a:xfrm>
+          <a:prstGeom prst="ellipse">
+            <a:avLst/>
+          </a:prstGeom>
+        </p:spPr>
+        <p:style>
+          <a:lnRef idx="2">
+            <a:schemeClr val="accent1">
+              <a:shade val="50000"/>
+            </a:schemeClr>
+          </a:lnRef>
+          <a:fillRef idx="1">
+            <a:schemeClr val="accent1"/>
+          </a:fillRef>
+          <a:effectRef idx="0">
+            <a:schemeClr val="accent1"/>
+          </a:effectRef>
+          <a:fontRef idx="minor">
+            <a:schemeClr val="lt1"/>
+          </a:fontRef>
+        </p:style>
+        <p:txBody>
+          <a:bodyPr rtlCol="0" anchor="ctr"/>
+          <a:lstStyle/>
+          <a:p>
+            <a:pPr algn="ctr"/>
+            <a:r>
+              <a:rPr lang="en-CA" dirty="0"/>
+              <a:t>train</a:t>
+            </a:r>
+          </a:p>
+        </p:txBody>
+      </p:sp>
+      <p:sp>
+        <p:nvSpPr>
+          <p:cNvPr id="7" name="Rectangle 6">
+            <a:extLst>
+              <a:ext uri="{FF2B5EF4-FFF2-40B4-BE49-F238E27FC236}">
+                <a16:creationId xmlns:a16="http://schemas.microsoft.com/office/drawing/2014/main" id="{BBB31161-C0CA-48DD-9003-8C5BEB314870}"/>
+              </a:ext>
+            </a:extLst>
+          </p:cNvPr>
+          <p:cNvSpPr/>
+          <p:nvPr/>
+        </p:nvSpPr>
+        <p:spPr>
+          <a:xfrm>
+            <a:off x="7890387" y="1823781"/>
+            <a:ext cx="1683453" cy="2099290"/>
+          </a:xfrm>
+          <a:prstGeom prst="rect">
+            <a:avLst/>
+          </a:prstGeom>
+        </p:spPr>
+        <p:style>
+          <a:lnRef idx="2">
+            <a:schemeClr val="accent1">
+              <a:shade val="50000"/>
+            </a:schemeClr>
+          </a:lnRef>
+          <a:fillRef idx="1">
+            <a:schemeClr val="accent1"/>
+          </a:fillRef>
+          <a:effectRef idx="0">
+            <a:schemeClr val="accent1"/>
+          </a:effectRef>
+          <a:fontRef idx="minor">
+            <a:schemeClr val="lt1"/>
+          </a:fontRef>
+        </p:style>
+        <p:txBody>
+          <a:bodyPr rtlCol="0" anchor="ctr"/>
+          <a:lstStyle/>
+          <a:p>
+            <a:pPr algn="ctr"/>
+            <a:r>
+              <a:rPr lang="en-CA" dirty="0"/>
+              <a:t>User</a:t>
+            </a:r>
+          </a:p>
+        </p:txBody>
+      </p:sp>
+      <p:cxnSp>
+        <p:nvCxnSpPr>
+          <p:cNvPr id="9" name="Straight Arrow Connector 8">
+            <a:extLst>
+              <a:ext uri="{FF2B5EF4-FFF2-40B4-BE49-F238E27FC236}">
+                <a16:creationId xmlns:a16="http://schemas.microsoft.com/office/drawing/2014/main" id="{C4B1597F-E4C8-4E11-A06E-5A0E647EE514}"/>
+              </a:ext>
+            </a:extLst>
+          </p:cNvPr>
+          <p:cNvCxnSpPr>
+            <a:cxnSpLocks/>
+          </p:cNvCxnSpPr>
+          <p:nvPr/>
+        </p:nvCxnSpPr>
+        <p:spPr>
+          <a:xfrm flipH="1">
+            <a:off x="6085112" y="2160639"/>
+            <a:ext cx="1805276" cy="0"/>
+          </a:xfrm>
+          <a:prstGeom prst="straightConnector1">
+            <a:avLst/>
+          </a:prstGeom>
+          <a:ln>
+            <a:tailEnd type="triangle"/>
+          </a:ln>
+        </p:spPr>
+        <p:style>
+          <a:lnRef idx="1">
+            <a:schemeClr val="accent1"/>
+          </a:lnRef>
+          <a:fillRef idx="0">
+            <a:schemeClr val="accent1"/>
+          </a:fillRef>
+          <a:effectRef idx="0">
+            <a:schemeClr val="accent1"/>
+          </a:effectRef>
+          <a:fontRef idx="minor">
+            <a:schemeClr val="tx1"/>
+          </a:fontRef>
+        </p:style>
+      </p:cxnSp>
+      <p:sp>
+        <p:nvSpPr>
+          <p:cNvPr id="11" name="Oval 10">
+            <a:extLst>
+              <a:ext uri="{FF2B5EF4-FFF2-40B4-BE49-F238E27FC236}">
+                <a16:creationId xmlns:a16="http://schemas.microsoft.com/office/drawing/2014/main" id="{9B30D5FF-2190-4106-BD72-88020D4A0473}"/>
+              </a:ext>
+            </a:extLst>
+          </p:cNvPr>
+          <p:cNvSpPr/>
+          <p:nvPr/>
+        </p:nvSpPr>
+        <p:spPr>
+          <a:xfrm>
+            <a:off x="6355499" y="1778113"/>
+            <a:ext cx="1264501" cy="765051"/>
+          </a:xfrm>
+          <a:prstGeom prst="ellipse">
+            <a:avLst/>
+          </a:prstGeom>
+        </p:spPr>
+        <p:style>
+          <a:lnRef idx="2">
+            <a:schemeClr val="accent1">
+              <a:shade val="50000"/>
+            </a:schemeClr>
+          </a:lnRef>
+          <a:fillRef idx="1">
+            <a:schemeClr val="accent1"/>
+          </a:fillRef>
+          <a:effectRef idx="0">
+            <a:schemeClr val="accent1"/>
+          </a:effectRef>
+          <a:fontRef idx="minor">
+            <a:schemeClr val="lt1"/>
+          </a:fontRef>
+        </p:style>
+        <p:txBody>
+          <a:bodyPr rtlCol="0" anchor="ctr"/>
+          <a:lstStyle/>
+          <a:p>
+            <a:pPr algn="ctr"/>
+            <a:r>
+              <a:rPr lang="en-CA" dirty="0"/>
+              <a:t>Send picture</a:t>
+            </a:r>
+          </a:p>
+        </p:txBody>
+      </p:sp>
+      <p:sp>
+        <p:nvSpPr>
+          <p:cNvPr id="12" name="Oval 11">
+            <a:extLst>
+              <a:ext uri="{FF2B5EF4-FFF2-40B4-BE49-F238E27FC236}">
+                <a16:creationId xmlns:a16="http://schemas.microsoft.com/office/drawing/2014/main" id="{A99F0F98-CF70-42B1-A63B-49A2C6C062BF}"/>
+              </a:ext>
+            </a:extLst>
+          </p:cNvPr>
+          <p:cNvSpPr/>
+          <p:nvPr/>
+        </p:nvSpPr>
+        <p:spPr>
+          <a:xfrm>
+            <a:off x="6355499" y="3097194"/>
+            <a:ext cx="1264501" cy="765051"/>
+          </a:xfrm>
+          <a:prstGeom prst="ellipse">
+            <a:avLst/>
+          </a:prstGeom>
+        </p:spPr>
+        <p:style>
+          <a:lnRef idx="2">
+            <a:schemeClr val="accent1">
+              <a:shade val="50000"/>
+            </a:schemeClr>
+          </a:lnRef>
+          <a:fillRef idx="1">
+            <a:schemeClr val="accent1"/>
+          </a:fillRef>
+          <a:effectRef idx="0">
+            <a:schemeClr val="accent1"/>
+          </a:effectRef>
+          <a:fontRef idx="minor">
+            <a:schemeClr val="lt1"/>
+          </a:fontRef>
+        </p:style>
+        <p:txBody>
+          <a:bodyPr rtlCol="0" anchor="ctr"/>
+          <a:lstStyle/>
+          <a:p>
+            <a:pPr algn="ctr"/>
+            <a:r>
+              <a:rPr lang="en-CA" dirty="0"/>
+              <a:t>get </a:t>
+            </a:r>
+            <a:r>
+              <a:rPr lang="en-CA" dirty="0" err="1"/>
+              <a:t>infos</a:t>
+            </a:r>
+            <a:endParaRPr lang="en-CA" dirty="0"/>
+          </a:p>
+        </p:txBody>
+      </p:sp>
+      <p:cxnSp>
+        <p:nvCxnSpPr>
+          <p:cNvPr id="13" name="Straight Arrow Connector 12">
+            <a:extLst>
+              <a:ext uri="{FF2B5EF4-FFF2-40B4-BE49-F238E27FC236}">
+                <a16:creationId xmlns:a16="http://schemas.microsoft.com/office/drawing/2014/main" id="{72510232-2ABC-4987-8EDB-269689E19432}"/>
+              </a:ext>
+            </a:extLst>
+          </p:cNvPr>
+          <p:cNvCxnSpPr>
+            <a:cxnSpLocks/>
+          </p:cNvCxnSpPr>
+          <p:nvPr/>
+        </p:nvCxnSpPr>
+        <p:spPr>
+          <a:xfrm>
+            <a:off x="6085112" y="3456764"/>
+            <a:ext cx="1805275" cy="0"/>
+          </a:xfrm>
+          <a:prstGeom prst="straightConnector1">
+            <a:avLst/>
+          </a:prstGeom>
+          <a:ln>
+            <a:tailEnd type="triangle"/>
+          </a:ln>
+        </p:spPr>
+        <p:style>
+          <a:lnRef idx="1">
+            <a:schemeClr val="accent1"/>
+          </a:lnRef>
+          <a:fillRef idx="0">
+            <a:schemeClr val="accent1"/>
+          </a:fillRef>
+          <a:effectRef idx="0">
+            <a:schemeClr val="accent1"/>
+          </a:effectRef>
+          <a:fontRef idx="minor">
+            <a:schemeClr val="tx1"/>
+          </a:fontRef>
+        </p:style>
+      </p:cxnSp>
+    </p:spTree>
+  </p:cSld>
+  <p:clrMapOvr>
+    <a:masterClrMapping/>
+  </p:clrMapOvr>
+</p:sld>
+</file>
+
+<file path=ppt/slides/slide7.xml><?xml version="1.0" encoding="utf-8"?>
+<p:sld xmlns:a="http://schemas.openxmlformats.org/drawingml/2006/main" xmlns:r="http://schemas.openxmlformats.org/officeDocument/2006/relationships" xmlns:p="http://schemas.openxmlformats.org/presentationml/2006/main">
+  <p:cSld>
+    <p:spTree>
+      <p:nvGrpSpPr>
+        <p:cNvPr id="1" name=""/>
+        <p:cNvGrpSpPr/>
+        <p:nvPr/>
+      </p:nvGrpSpPr>
+      <p:grpSpPr>
+        <a:xfrm>
+          <a:off x="0" y="0"/>
+          <a:ext cx="0" cy="0"/>
+          <a:chOff x="0" y="0"/>
+          <a:chExt cx="0" cy="0"/>
+        </a:xfrm>
+      </p:grpSpPr>
+      <p:sp>
+        <p:nvSpPr>
           <p:cNvPr id="48" name="Titel 5"/>
           <p:cNvSpPr txBox="1"/>
           <p:nvPr/>
@@ -4208,7 +4614,7 @@
         </p:nvSpPr>
         <p:spPr>
           <a:xfrm>
-            <a:off x="6275146" y="2584655"/>
+            <a:off x="6651493" y="2802091"/>
             <a:ext cx="1858297" cy="1806678"/>
           </a:xfrm>
           <a:prstGeom prst="foldedCorner">
@@ -4260,7 +4666,7 @@
 </p:sld>
 </file>
 
-<file path=ppt/slides/slide7.xml><?xml version="1.0" encoding="utf-8"?>
+<file path=ppt/slides/slide8.xml><?xml version="1.0" encoding="utf-8"?>
 <p:sld xmlns:a="http://schemas.openxmlformats.org/drawingml/2006/main" xmlns:r="http://schemas.openxmlformats.org/officeDocument/2006/relationships" xmlns:p="http://schemas.openxmlformats.org/presentationml/2006/main">
   <p:cSld>
     <p:bg>

</xml_diff>